<commit_message>
Added a new system design for bump w/light plant
  - Added I2C expander datasheet to refs
  - Used the Glow_worm light_plant to add lights to
  the reaction when a bumper gets pressed.
</commit_message>
<xml_diff>
--- a/System_diagrams.pptx
+++ b/System_diagrams.pptx
@@ -6,6 +6,7 @@
   </p:sldMasterIdLst>
   <p:sldIdLst>
     <p:sldId id="257" r:id="rId2"/>
+    <p:sldId id="258" r:id="rId3"/>
   </p:sldIdLst>
   <p:sldSz cx="9144000" cy="6858000" type="screen4x3"/>
   <p:notesSz cx="6894513" cy="9180513"/>
@@ -3488,37 +3489,6 @@
       </p:grpSp>
       <p:sp>
         <p:nvSpPr>
-          <p:cNvPr id="9" name="TextBox 8"/>
-          <p:cNvSpPr txBox="1"/>
-          <p:nvPr/>
-        </p:nvSpPr>
-        <p:spPr>
-          <a:xfrm>
-            <a:off x="6488989" y="3581400"/>
-            <a:ext cx="1280160" cy="274320"/>
-          </a:xfrm>
-          <a:prstGeom prst="rect">
-            <a:avLst/>
-          </a:prstGeom>
-          <a:noFill/>
-        </p:spPr>
-        <p:txBody>
-          <a:bodyPr wrap="square" rtlCol="0">
-            <a:spAutoFit/>
-          </a:bodyPr>
-          <a:lstStyle/>
-          <a:p>
-            <a:pPr algn="ctr"/>
-            <a:r>
-              <a:rPr lang="en-US" sz="1200" b="1" dirty="0" err="1" smtClean="0"/>
-              <a:t>Rover_plant</a:t>
-            </a:r>
-            <a:endParaRPr lang="en-US" sz="1200" b="1" dirty="0" smtClean="0"/>
-          </a:p>
-        </p:txBody>
-      </p:sp>
-      <p:sp>
-        <p:nvSpPr>
           <p:cNvPr id="13" name="TextBox 12"/>
           <p:cNvSpPr txBox="1"/>
           <p:nvPr/>
@@ -3546,7 +3516,7 @@
       </p:sp>
       <p:grpSp>
         <p:nvGrpSpPr>
-          <p:cNvPr id="22" name="Group 21"/>
+          <p:cNvPr id="2" name="Group 1"/>
           <p:cNvGrpSpPr/>
           <p:nvPr/>
         </p:nvGrpSpPr>
@@ -3554,66 +3524,20 @@
           <a:xfrm>
             <a:off x="6344101" y="2591909"/>
             <a:ext cx="1569936" cy="1277617"/>
-            <a:chOff x="6338034" y="2591909"/>
+            <a:chOff x="6344101" y="2591909"/>
             <a:chExt cx="1569936" cy="1277617"/>
           </a:xfrm>
         </p:grpSpPr>
         <p:sp>
           <p:nvSpPr>
-            <p:cNvPr id="6" name="Rectangle 5"/>
-            <p:cNvSpPr/>
-            <p:nvPr/>
-          </p:nvSpPr>
-          <p:spPr>
-            <a:xfrm>
-              <a:off x="6338034" y="2591909"/>
-              <a:ext cx="1569936" cy="1277617"/>
-            </a:xfrm>
-            <a:prstGeom prst="rect">
-              <a:avLst/>
-            </a:prstGeom>
-            <a:noFill/>
-          </p:spPr>
-          <p:style>
-            <a:lnRef idx="2">
-              <a:schemeClr val="accent1">
-                <a:shade val="50000"/>
-              </a:schemeClr>
-            </a:lnRef>
-            <a:fillRef idx="1">
-              <a:schemeClr val="accent1"/>
-            </a:fillRef>
-            <a:effectRef idx="0">
-              <a:schemeClr val="accent1"/>
-            </a:effectRef>
-            <a:fontRef idx="minor">
-              <a:schemeClr val="lt1"/>
-            </a:fontRef>
-          </p:style>
-          <p:txBody>
-            <a:bodyPr rot="0" spcFirstLastPara="0" vertOverflow="overflow" horzOverflow="overflow" vert="horz" wrap="square" lIns="91440" tIns="45720" rIns="91440" bIns="45720" numCol="1" spcCol="0" rtlCol="0" fromWordArt="0" anchor="ctr" anchorCtr="0" forceAA="0" compatLnSpc="1">
-              <a:prstTxWarp prst="textNoShape">
-                <a:avLst/>
-              </a:prstTxWarp>
-              <a:noAutofit/>
-            </a:bodyPr>
-            <a:lstStyle/>
-            <a:p>
-              <a:pPr algn="ctr"/>
-              <a:endParaRPr lang="en-US"/>
-            </a:p>
-          </p:txBody>
-        </p:sp>
-        <p:sp>
-          <p:nvSpPr>
-            <p:cNvPr id="38" name="TextBox 37"/>
+            <p:cNvPr id="9" name="TextBox 8"/>
             <p:cNvSpPr txBox="1"/>
             <p:nvPr/>
           </p:nvSpPr>
           <p:spPr>
             <a:xfrm>
-              <a:off x="6382054" y="3091190"/>
-              <a:ext cx="1392920" cy="261610"/>
+              <a:off x="6488989" y="3581400"/>
+              <a:ext cx="1280160" cy="274320"/>
             </a:xfrm>
             <a:prstGeom prst="rect">
               <a:avLst/>
@@ -3626,17 +3550,109 @@
             </a:bodyPr>
             <a:lstStyle/>
             <a:p>
+              <a:pPr algn="ctr"/>
               <a:r>
-                <a:rPr lang="en-US" sz="1100" i="1" dirty="0" err="1" smtClean="0"/>
-                <a:t>gw</a:t>
+                <a:rPr lang="en-US" sz="1200" b="1" dirty="0" err="1" smtClean="0"/>
+                <a:t>Rover_plant</a:t>
               </a:r>
-              <a:r>
-                <a:rPr lang="en-US" sz="1100" i="1" dirty="0" smtClean="0"/>
-                <a:t>::Motor*  2 </a:t>
-              </a:r>
+              <a:endParaRPr lang="en-US" sz="1200" b="1" dirty="0" smtClean="0"/>
             </a:p>
           </p:txBody>
         </p:sp>
+        <p:grpSp>
+          <p:nvGrpSpPr>
+            <p:cNvPr id="22" name="Group 21"/>
+            <p:cNvGrpSpPr/>
+            <p:nvPr/>
+          </p:nvGrpSpPr>
+          <p:grpSpPr>
+            <a:xfrm>
+              <a:off x="6344101" y="2591909"/>
+              <a:ext cx="1569936" cy="1277617"/>
+              <a:chOff x="6338034" y="2591909"/>
+              <a:chExt cx="1569936" cy="1277617"/>
+            </a:xfrm>
+          </p:grpSpPr>
+          <p:sp>
+            <p:nvSpPr>
+              <p:cNvPr id="6" name="Rectangle 5"/>
+              <p:cNvSpPr/>
+              <p:nvPr/>
+            </p:nvSpPr>
+            <p:spPr>
+              <a:xfrm>
+                <a:off x="6338034" y="2591909"/>
+                <a:ext cx="1569936" cy="1277617"/>
+              </a:xfrm>
+              <a:prstGeom prst="rect">
+                <a:avLst/>
+              </a:prstGeom>
+              <a:noFill/>
+            </p:spPr>
+            <p:style>
+              <a:lnRef idx="2">
+                <a:schemeClr val="accent1">
+                  <a:shade val="50000"/>
+                </a:schemeClr>
+              </a:lnRef>
+              <a:fillRef idx="1">
+                <a:schemeClr val="accent1"/>
+              </a:fillRef>
+              <a:effectRef idx="0">
+                <a:schemeClr val="accent1"/>
+              </a:effectRef>
+              <a:fontRef idx="minor">
+                <a:schemeClr val="lt1"/>
+              </a:fontRef>
+            </p:style>
+            <p:txBody>
+              <a:bodyPr rot="0" spcFirstLastPara="0" vertOverflow="overflow" horzOverflow="overflow" vert="horz" wrap="square" lIns="91440" tIns="45720" rIns="91440" bIns="45720" numCol="1" spcCol="0" rtlCol="0" fromWordArt="0" anchor="ctr" anchorCtr="0" forceAA="0" compatLnSpc="1">
+                <a:prstTxWarp prst="textNoShape">
+                  <a:avLst/>
+                </a:prstTxWarp>
+                <a:noAutofit/>
+              </a:bodyPr>
+              <a:lstStyle/>
+              <a:p>
+                <a:pPr algn="ctr"/>
+                <a:endParaRPr lang="en-US"/>
+              </a:p>
+            </p:txBody>
+          </p:sp>
+          <p:sp>
+            <p:nvSpPr>
+              <p:cNvPr id="38" name="TextBox 37"/>
+              <p:cNvSpPr txBox="1"/>
+              <p:nvPr/>
+            </p:nvSpPr>
+            <p:spPr>
+              <a:xfrm>
+                <a:off x="6382054" y="3091190"/>
+                <a:ext cx="1392920" cy="261610"/>
+              </a:xfrm>
+              <a:prstGeom prst="rect">
+                <a:avLst/>
+              </a:prstGeom>
+              <a:noFill/>
+            </p:spPr>
+            <p:txBody>
+              <a:bodyPr wrap="square" rtlCol="0">
+                <a:spAutoFit/>
+              </a:bodyPr>
+              <a:lstStyle/>
+              <a:p>
+                <a:r>
+                  <a:rPr lang="en-US" sz="1100" i="1" dirty="0" err="1" smtClean="0"/>
+                  <a:t>gw</a:t>
+                </a:r>
+                <a:r>
+                  <a:rPr lang="en-US" sz="1100" i="1" dirty="0" smtClean="0"/>
+                  <a:t>::Motor*  2 </a:t>
+                </a:r>
+              </a:p>
+            </p:txBody>
+          </p:sp>
+        </p:grpSp>
       </p:grpSp>
       <p:cxnSp>
         <p:nvCxnSpPr>
@@ -3708,6 +3724,961 @@
     <p:extLst>
       <p:ext uri="{BB962C8B-B14F-4D97-AF65-F5344CB8AC3E}">
         <p14:creationId xmlns:p14="http://schemas.microsoft.com/office/powerpoint/2010/main" val="3275000954"/>
+      </p:ext>
+    </p:extLst>
+  </p:cSld>
+  <p:clrMapOvr>
+    <a:masterClrMapping/>
+  </p:clrMapOvr>
+</p:sld>
+</file>
+
+<file path=ppt/slides/slide2.xml><?xml version="1.0" encoding="utf-8"?>
+<p:sld xmlns:a="http://schemas.openxmlformats.org/drawingml/2006/main" xmlns:r="http://schemas.openxmlformats.org/officeDocument/2006/relationships" xmlns:p="http://schemas.openxmlformats.org/presentationml/2006/main">
+  <p:cSld>
+    <p:spTree>
+      <p:nvGrpSpPr>
+        <p:cNvPr id="1" name=""/>
+        <p:cNvGrpSpPr/>
+        <p:nvPr/>
+      </p:nvGrpSpPr>
+      <p:grpSpPr>
+        <a:xfrm>
+          <a:off x="0" y="0"/>
+          <a:ext cx="0" cy="0"/>
+          <a:chOff x="0" y="0"/>
+          <a:chExt cx="0" cy="0"/>
+        </a:xfrm>
+      </p:grpSpPr>
+      <p:sp>
+        <p:nvSpPr>
+          <p:cNvPr id="72" name="Title 71"/>
+          <p:cNvSpPr>
+            <a:spLocks noGrp="1"/>
+          </p:cNvSpPr>
+          <p:nvPr>
+            <p:ph type="title"/>
+          </p:nvPr>
+        </p:nvSpPr>
+        <p:spPr>
+          <a:xfrm>
+            <a:off x="457200" y="76200"/>
+            <a:ext cx="8229600" cy="1143000"/>
+          </a:xfrm>
+        </p:spPr>
+        <p:txBody>
+          <a:bodyPr>
+            <a:normAutofit fontScale="90000"/>
+          </a:bodyPr>
+          <a:lstStyle/>
+          <a:p>
+            <a:r>
+              <a:rPr lang="en-US" dirty="0" smtClean="0"/>
+              <a:t>ALFRED: Bump and Wander </a:t>
+            </a:r>
+            <a:r>
+              <a:rPr lang="en-US" dirty="0" smtClean="0"/>
+              <a:t/>
+            </a:r>
+            <a:br>
+              <a:rPr lang="en-US" dirty="0" smtClean="0"/>
+            </a:br>
+            <a:r>
+              <a:rPr lang="en-US" dirty="0" smtClean="0"/>
+              <a:t>with Light Plant</a:t>
+            </a:r>
+            <a:endParaRPr lang="en-US" dirty="0"/>
+          </a:p>
+        </p:txBody>
+      </p:sp>
+      <p:grpSp>
+        <p:nvGrpSpPr>
+          <p:cNvPr id="20" name="Group 19"/>
+          <p:cNvGrpSpPr/>
+          <p:nvPr/>
+        </p:nvGrpSpPr>
+        <p:grpSpPr>
+          <a:xfrm>
+            <a:off x="3584240" y="3126647"/>
+            <a:ext cx="1646136" cy="1277619"/>
+            <a:chOff x="3584240" y="2600379"/>
+            <a:chExt cx="1646136" cy="1277619"/>
+          </a:xfrm>
+        </p:grpSpPr>
+        <p:sp>
+          <p:nvSpPr>
+            <p:cNvPr id="49" name="TextBox 48"/>
+            <p:cNvSpPr txBox="1"/>
+            <p:nvPr/>
+          </p:nvSpPr>
+          <p:spPr>
+            <a:xfrm>
+              <a:off x="3767228" y="3581400"/>
+              <a:ext cx="1280160" cy="274320"/>
+            </a:xfrm>
+            <a:prstGeom prst="rect">
+              <a:avLst/>
+            </a:prstGeom>
+            <a:noFill/>
+          </p:spPr>
+          <p:txBody>
+            <a:bodyPr wrap="square" rtlCol="0">
+              <a:spAutoFit/>
+            </a:bodyPr>
+            <a:lstStyle/>
+            <a:p>
+              <a:pPr algn="ctr"/>
+              <a:r>
+                <a:rPr lang="en-US" sz="1200" b="1" dirty="0" err="1" smtClean="0"/>
+                <a:t>Helen_controller</a:t>
+              </a:r>
+              <a:endParaRPr lang="en-US" sz="1200" b="1" dirty="0" smtClean="0"/>
+            </a:p>
+          </p:txBody>
+        </p:sp>
+        <p:grpSp>
+          <p:nvGrpSpPr>
+            <p:cNvPr id="19" name="Group 18"/>
+            <p:cNvGrpSpPr/>
+            <p:nvPr/>
+          </p:nvGrpSpPr>
+          <p:grpSpPr>
+            <a:xfrm>
+              <a:off x="3584240" y="2600379"/>
+              <a:ext cx="1646136" cy="1277619"/>
+              <a:chOff x="3584240" y="2600379"/>
+              <a:chExt cx="1646136" cy="1277619"/>
+            </a:xfrm>
+          </p:grpSpPr>
+          <p:sp>
+            <p:nvSpPr>
+              <p:cNvPr id="48" name="Rectangle 47"/>
+              <p:cNvSpPr/>
+              <p:nvPr/>
+            </p:nvSpPr>
+            <p:spPr>
+              <a:xfrm>
+                <a:off x="3584240" y="2600379"/>
+                <a:ext cx="1569936" cy="1277619"/>
+              </a:xfrm>
+              <a:prstGeom prst="rect">
+                <a:avLst/>
+              </a:prstGeom>
+              <a:noFill/>
+            </p:spPr>
+            <p:style>
+              <a:lnRef idx="2">
+                <a:schemeClr val="accent1">
+                  <a:shade val="50000"/>
+                </a:schemeClr>
+              </a:lnRef>
+              <a:fillRef idx="1">
+                <a:schemeClr val="accent1"/>
+              </a:fillRef>
+              <a:effectRef idx="0">
+                <a:schemeClr val="accent1"/>
+              </a:effectRef>
+              <a:fontRef idx="minor">
+                <a:schemeClr val="lt1"/>
+              </a:fontRef>
+            </p:style>
+            <p:txBody>
+              <a:bodyPr rot="0" spcFirstLastPara="0" vertOverflow="overflow" horzOverflow="overflow" vert="horz" wrap="square" lIns="91440" tIns="45720" rIns="91440" bIns="45720" numCol="1" spcCol="0" rtlCol="0" fromWordArt="0" anchor="ctr" anchorCtr="0" forceAA="0" compatLnSpc="1">
+                <a:prstTxWarp prst="textNoShape">
+                  <a:avLst/>
+                </a:prstTxWarp>
+                <a:noAutofit/>
+              </a:bodyPr>
+              <a:lstStyle/>
+              <a:p>
+                <a:pPr algn="ctr"/>
+                <a:endParaRPr lang="en-US"/>
+              </a:p>
+            </p:txBody>
+          </p:sp>
+          <p:sp>
+            <p:nvSpPr>
+              <p:cNvPr id="50" name="TextBox 49"/>
+              <p:cNvSpPr txBox="1"/>
+              <p:nvPr/>
+            </p:nvSpPr>
+            <p:spPr>
+              <a:xfrm>
+                <a:off x="3809654" y="2791265"/>
+                <a:ext cx="1420722" cy="461665"/>
+              </a:xfrm>
+              <a:prstGeom prst="rect">
+                <a:avLst/>
+              </a:prstGeom>
+              <a:noFill/>
+            </p:spPr>
+            <p:txBody>
+              <a:bodyPr wrap="square" rtlCol="0">
+                <a:spAutoFit/>
+              </a:bodyPr>
+              <a:lstStyle/>
+              <a:p>
+                <a:pPr algn="r"/>
+                <a:r>
+                  <a:rPr lang="en-US" sz="1200" dirty="0" err="1" smtClean="0"/>
+                  <a:t>Cmd_led_msg</a:t>
+                </a:r>
+                <a:endParaRPr lang="en-US" sz="1200" dirty="0" smtClean="0"/>
+              </a:p>
+              <a:p>
+                <a:pPr algn="r"/>
+                <a:r>
+                  <a:rPr lang="en-US" sz="1200" dirty="0" err="1" smtClean="0"/>
+                  <a:t>Cmd_velocity_msg</a:t>
+                </a:r>
+                <a:endParaRPr lang="en-US" sz="1200" dirty="0" smtClean="0"/>
+              </a:p>
+            </p:txBody>
+          </p:sp>
+        </p:grpSp>
+      </p:grpSp>
+      <p:sp>
+        <p:nvSpPr>
+          <p:cNvPr id="108" name="TextBox 107"/>
+          <p:cNvSpPr txBox="1"/>
+          <p:nvPr/>
+        </p:nvSpPr>
+        <p:spPr>
+          <a:xfrm>
+            <a:off x="913410" y="4953000"/>
+            <a:ext cx="3429001" cy="1200329"/>
+          </a:xfrm>
+          <a:prstGeom prst="rect">
+            <a:avLst/>
+          </a:prstGeom>
+          <a:noFill/>
+          <a:ln>
+            <a:solidFill>
+              <a:schemeClr val="bg2">
+                <a:lumMod val="50000"/>
+              </a:schemeClr>
+            </a:solidFill>
+          </a:ln>
+        </p:spPr>
+        <p:txBody>
+          <a:bodyPr wrap="square" rtlCol="0">
+            <a:spAutoFit/>
+          </a:bodyPr>
+          <a:lstStyle/>
+          <a:p>
+            <a:r>
+              <a:rPr lang="en-US" sz="1200" dirty="0" smtClean="0"/>
+              <a:t>NOTES:</a:t>
+            </a:r>
+          </a:p>
+          <a:p>
+            <a:pPr marL="171450" indent="-171450">
+              <a:buFontTx/>
+              <a:buChar char="-"/>
+            </a:pPr>
+            <a:r>
+              <a:rPr lang="en-US" sz="1200" dirty="0" smtClean="0"/>
+              <a:t>The addition of the light plant requires the </a:t>
+            </a:r>
+            <a:r>
+              <a:rPr lang="en-US" sz="1200" dirty="0" err="1" smtClean="0"/>
+              <a:t>Helen_controller</a:t>
+            </a:r>
+            <a:r>
+              <a:rPr lang="en-US" sz="1200" dirty="0" smtClean="0"/>
+              <a:t> to publish two messages.</a:t>
+            </a:r>
+          </a:p>
+          <a:p>
+            <a:pPr marL="171450" indent="-171450">
+              <a:buFontTx/>
+              <a:buChar char="-"/>
+            </a:pPr>
+            <a:r>
+              <a:rPr lang="en-US" sz="1200" dirty="0" smtClean="0"/>
+              <a:t>The light plant also uses the I2C digital I/O expander and requires the Wire library which is a memory hog.</a:t>
+            </a:r>
+            <a:endParaRPr lang="en-US" sz="1200" dirty="0" smtClean="0"/>
+          </a:p>
+        </p:txBody>
+      </p:sp>
+      <p:grpSp>
+        <p:nvGrpSpPr>
+          <p:cNvPr id="21" name="Group 20"/>
+          <p:cNvGrpSpPr/>
+          <p:nvPr/>
+        </p:nvGrpSpPr>
+        <p:grpSpPr>
+          <a:xfrm>
+            <a:off x="838200" y="3141982"/>
+            <a:ext cx="1638381" cy="1277618"/>
+            <a:chOff x="838200" y="2615714"/>
+            <a:chExt cx="1638381" cy="1277618"/>
+          </a:xfrm>
+        </p:grpSpPr>
+        <p:sp>
+          <p:nvSpPr>
+            <p:cNvPr id="42" name="TextBox 41"/>
+            <p:cNvSpPr txBox="1"/>
+            <p:nvPr/>
+          </p:nvSpPr>
+          <p:spPr>
+            <a:xfrm>
+              <a:off x="1017310" y="3581400"/>
+              <a:ext cx="1280160" cy="274320"/>
+            </a:xfrm>
+            <a:prstGeom prst="rect">
+              <a:avLst/>
+            </a:prstGeom>
+            <a:noFill/>
+          </p:spPr>
+          <p:txBody>
+            <a:bodyPr wrap="square" rtlCol="0">
+              <a:spAutoFit/>
+            </a:bodyPr>
+            <a:lstStyle/>
+            <a:p>
+              <a:pPr algn="ctr"/>
+              <a:r>
+                <a:rPr lang="en-US" sz="1200" b="1" dirty="0" err="1" smtClean="0"/>
+                <a:t>Bumper_plant</a:t>
+              </a:r>
+              <a:endParaRPr lang="en-US" sz="1200" b="1" dirty="0" smtClean="0"/>
+            </a:p>
+          </p:txBody>
+        </p:sp>
+        <p:grpSp>
+          <p:nvGrpSpPr>
+            <p:cNvPr id="18" name="Group 17"/>
+            <p:cNvGrpSpPr/>
+            <p:nvPr/>
+          </p:nvGrpSpPr>
+          <p:grpSpPr>
+            <a:xfrm>
+              <a:off x="838200" y="2615714"/>
+              <a:ext cx="1638381" cy="1277618"/>
+              <a:chOff x="838200" y="2615714"/>
+              <a:chExt cx="1638381" cy="1277618"/>
+            </a:xfrm>
+          </p:grpSpPr>
+          <p:sp>
+            <p:nvSpPr>
+              <p:cNvPr id="41" name="Rectangle 40"/>
+              <p:cNvSpPr/>
+              <p:nvPr/>
+            </p:nvSpPr>
+            <p:spPr>
+              <a:xfrm>
+                <a:off x="838200" y="2615714"/>
+                <a:ext cx="1569938" cy="1277618"/>
+              </a:xfrm>
+              <a:prstGeom prst="rect">
+                <a:avLst/>
+              </a:prstGeom>
+              <a:noFill/>
+            </p:spPr>
+            <p:style>
+              <a:lnRef idx="2">
+                <a:schemeClr val="accent1">
+                  <a:shade val="50000"/>
+                </a:schemeClr>
+              </a:lnRef>
+              <a:fillRef idx="1">
+                <a:schemeClr val="accent1"/>
+              </a:fillRef>
+              <a:effectRef idx="0">
+                <a:schemeClr val="accent1"/>
+              </a:effectRef>
+              <a:fontRef idx="minor">
+                <a:schemeClr val="lt1"/>
+              </a:fontRef>
+            </p:style>
+            <p:txBody>
+              <a:bodyPr rot="0" spcFirstLastPara="0" vertOverflow="overflow" horzOverflow="overflow" vert="horz" wrap="square" lIns="91440" tIns="45720" rIns="91440" bIns="45720" numCol="1" spcCol="0" rtlCol="0" fromWordArt="0" anchor="ctr" anchorCtr="0" forceAA="0" compatLnSpc="1">
+                <a:prstTxWarp prst="textNoShape">
+                  <a:avLst/>
+                </a:prstTxWarp>
+                <a:noAutofit/>
+              </a:bodyPr>
+              <a:lstStyle/>
+              <a:p>
+                <a:pPr algn="ctr"/>
+                <a:endParaRPr lang="en-US"/>
+              </a:p>
+            </p:txBody>
+          </p:sp>
+          <p:sp>
+            <p:nvSpPr>
+              <p:cNvPr id="43" name="TextBox 42"/>
+              <p:cNvSpPr txBox="1"/>
+              <p:nvPr/>
+            </p:nvSpPr>
+            <p:spPr>
+              <a:xfrm>
+                <a:off x="1006736" y="2806600"/>
+                <a:ext cx="1469845" cy="276999"/>
+              </a:xfrm>
+              <a:prstGeom prst="rect">
+                <a:avLst/>
+              </a:prstGeom>
+              <a:noFill/>
+            </p:spPr>
+            <p:txBody>
+              <a:bodyPr wrap="square" rtlCol="0">
+                <a:spAutoFit/>
+              </a:bodyPr>
+              <a:lstStyle/>
+              <a:p>
+                <a:pPr algn="r"/>
+                <a:r>
+                  <a:rPr lang="en-US" sz="1200" dirty="0" err="1" smtClean="0"/>
+                  <a:t>Two_bumper_msg</a:t>
+                </a:r>
+                <a:endParaRPr lang="en-US" sz="1200" dirty="0" smtClean="0"/>
+              </a:p>
+            </p:txBody>
+          </p:sp>
+          <p:sp>
+            <p:nvSpPr>
+              <p:cNvPr id="111" name="TextBox 110"/>
+              <p:cNvSpPr txBox="1"/>
+              <p:nvPr/>
+            </p:nvSpPr>
+            <p:spPr>
+              <a:xfrm>
+                <a:off x="926709" y="3130118"/>
+                <a:ext cx="1392920" cy="261610"/>
+              </a:xfrm>
+              <a:prstGeom prst="rect">
+                <a:avLst/>
+              </a:prstGeom>
+              <a:noFill/>
+            </p:spPr>
+            <p:txBody>
+              <a:bodyPr wrap="square" rtlCol="0">
+                <a:spAutoFit/>
+              </a:bodyPr>
+              <a:lstStyle/>
+              <a:p>
+                <a:r>
+                  <a:rPr lang="en-US" sz="1100" i="1" dirty="0" err="1" smtClean="0"/>
+                  <a:t>gw</a:t>
+                </a:r>
+                <a:r>
+                  <a:rPr lang="en-US" sz="1100" i="1" dirty="0" smtClean="0"/>
+                  <a:t>::Bumper* x2</a:t>
+                </a:r>
+              </a:p>
+            </p:txBody>
+          </p:sp>
+        </p:grpSp>
+      </p:grpSp>
+      <p:sp>
+        <p:nvSpPr>
+          <p:cNvPr id="13" name="TextBox 12"/>
+          <p:cNvSpPr txBox="1"/>
+          <p:nvPr/>
+        </p:nvSpPr>
+        <p:spPr>
+          <a:xfrm>
+            <a:off x="7013678" y="3309063"/>
+            <a:ext cx="954977" cy="276999"/>
+          </a:xfrm>
+          <a:prstGeom prst="rect">
+            <a:avLst/>
+          </a:prstGeom>
+          <a:noFill/>
+        </p:spPr>
+        <p:txBody>
+          <a:bodyPr wrap="square" rtlCol="0">
+            <a:spAutoFit/>
+          </a:bodyPr>
+          <a:lstStyle/>
+          <a:p>
+            <a:pPr algn="r"/>
+            <a:endParaRPr lang="en-US" sz="1200" dirty="0" smtClean="0"/>
+          </a:p>
+        </p:txBody>
+      </p:sp>
+      <p:grpSp>
+        <p:nvGrpSpPr>
+          <p:cNvPr id="2" name="Group 1"/>
+          <p:cNvGrpSpPr/>
+          <p:nvPr/>
+        </p:nvGrpSpPr>
+        <p:grpSpPr>
+          <a:xfrm>
+            <a:off x="6344101" y="3118177"/>
+            <a:ext cx="1569936" cy="1277617"/>
+            <a:chOff x="6344101" y="3118177"/>
+            <a:chExt cx="1569936" cy="1277617"/>
+          </a:xfrm>
+        </p:grpSpPr>
+        <p:sp>
+          <p:nvSpPr>
+            <p:cNvPr id="9" name="TextBox 8"/>
+            <p:cNvSpPr txBox="1"/>
+            <p:nvPr/>
+          </p:nvSpPr>
+          <p:spPr>
+            <a:xfrm>
+              <a:off x="6488989" y="4107668"/>
+              <a:ext cx="1280160" cy="274320"/>
+            </a:xfrm>
+            <a:prstGeom prst="rect">
+              <a:avLst/>
+            </a:prstGeom>
+            <a:noFill/>
+          </p:spPr>
+          <p:txBody>
+            <a:bodyPr wrap="square" rtlCol="0">
+              <a:spAutoFit/>
+            </a:bodyPr>
+            <a:lstStyle/>
+            <a:p>
+              <a:pPr algn="ctr"/>
+              <a:r>
+                <a:rPr lang="en-US" sz="1200" b="1" dirty="0" err="1" smtClean="0"/>
+                <a:t>Rover_plant</a:t>
+              </a:r>
+              <a:endParaRPr lang="en-US" sz="1200" b="1" dirty="0" smtClean="0"/>
+            </a:p>
+          </p:txBody>
+        </p:sp>
+        <p:grpSp>
+          <p:nvGrpSpPr>
+            <p:cNvPr id="22" name="Group 21"/>
+            <p:cNvGrpSpPr/>
+            <p:nvPr/>
+          </p:nvGrpSpPr>
+          <p:grpSpPr>
+            <a:xfrm>
+              <a:off x="6344101" y="3118177"/>
+              <a:ext cx="1569936" cy="1277617"/>
+              <a:chOff x="6338034" y="2591909"/>
+              <a:chExt cx="1569936" cy="1277617"/>
+            </a:xfrm>
+          </p:grpSpPr>
+          <p:sp>
+            <p:nvSpPr>
+              <p:cNvPr id="6" name="Rectangle 5"/>
+              <p:cNvSpPr/>
+              <p:nvPr/>
+            </p:nvSpPr>
+            <p:spPr>
+              <a:xfrm>
+                <a:off x="6338034" y="2591909"/>
+                <a:ext cx="1569936" cy="1277617"/>
+              </a:xfrm>
+              <a:prstGeom prst="rect">
+                <a:avLst/>
+              </a:prstGeom>
+              <a:noFill/>
+            </p:spPr>
+            <p:style>
+              <a:lnRef idx="2">
+                <a:schemeClr val="accent1">
+                  <a:shade val="50000"/>
+                </a:schemeClr>
+              </a:lnRef>
+              <a:fillRef idx="1">
+                <a:schemeClr val="accent1"/>
+              </a:fillRef>
+              <a:effectRef idx="0">
+                <a:schemeClr val="accent1"/>
+              </a:effectRef>
+              <a:fontRef idx="minor">
+                <a:schemeClr val="lt1"/>
+              </a:fontRef>
+            </p:style>
+            <p:txBody>
+              <a:bodyPr rot="0" spcFirstLastPara="0" vertOverflow="overflow" horzOverflow="overflow" vert="horz" wrap="square" lIns="91440" tIns="45720" rIns="91440" bIns="45720" numCol="1" spcCol="0" rtlCol="0" fromWordArt="0" anchor="ctr" anchorCtr="0" forceAA="0" compatLnSpc="1">
+                <a:prstTxWarp prst="textNoShape">
+                  <a:avLst/>
+                </a:prstTxWarp>
+                <a:noAutofit/>
+              </a:bodyPr>
+              <a:lstStyle/>
+              <a:p>
+                <a:pPr algn="ctr"/>
+                <a:endParaRPr lang="en-US"/>
+              </a:p>
+            </p:txBody>
+          </p:sp>
+          <p:sp>
+            <p:nvSpPr>
+              <p:cNvPr id="38" name="TextBox 37"/>
+              <p:cNvSpPr txBox="1"/>
+              <p:nvPr/>
+            </p:nvSpPr>
+            <p:spPr>
+              <a:xfrm>
+                <a:off x="6382054" y="3091190"/>
+                <a:ext cx="1392920" cy="261610"/>
+              </a:xfrm>
+              <a:prstGeom prst="rect">
+                <a:avLst/>
+              </a:prstGeom>
+              <a:noFill/>
+            </p:spPr>
+            <p:txBody>
+              <a:bodyPr wrap="square" rtlCol="0">
+                <a:spAutoFit/>
+              </a:bodyPr>
+              <a:lstStyle/>
+              <a:p>
+                <a:r>
+                  <a:rPr lang="en-US" sz="1100" i="1" dirty="0" err="1" smtClean="0"/>
+                  <a:t>gw</a:t>
+                </a:r>
+                <a:r>
+                  <a:rPr lang="en-US" sz="1100" i="1" dirty="0" smtClean="0"/>
+                  <a:t>::Motor*  2 </a:t>
+                </a:r>
+              </a:p>
+            </p:txBody>
+          </p:sp>
+        </p:grpSp>
+      </p:grpSp>
+      <p:cxnSp>
+        <p:nvCxnSpPr>
+          <p:cNvPr id="16" name="Straight Arrow Connector 15"/>
+          <p:cNvCxnSpPr/>
+          <p:nvPr/>
+        </p:nvCxnSpPr>
+        <p:spPr>
+          <a:xfrm>
+            <a:off x="2408138" y="3498068"/>
+            <a:ext cx="1176102" cy="0"/>
+          </a:xfrm>
+          <a:prstGeom prst="straightConnector1">
+            <a:avLst/>
+          </a:prstGeom>
+          <a:ln>
+            <a:tailEnd type="arrow"/>
+          </a:ln>
+        </p:spPr>
+        <p:style>
+          <a:lnRef idx="1">
+            <a:schemeClr val="accent1"/>
+          </a:lnRef>
+          <a:fillRef idx="0">
+            <a:schemeClr val="accent1"/>
+          </a:fillRef>
+          <a:effectRef idx="0">
+            <a:schemeClr val="accent1"/>
+          </a:effectRef>
+          <a:fontRef idx="minor">
+            <a:schemeClr val="tx1"/>
+          </a:fontRef>
+        </p:style>
+      </p:cxnSp>
+      <p:cxnSp>
+        <p:nvCxnSpPr>
+          <p:cNvPr id="54" name="Straight Arrow Connector 53"/>
+          <p:cNvCxnSpPr/>
+          <p:nvPr/>
+        </p:nvCxnSpPr>
+        <p:spPr>
+          <a:xfrm>
+            <a:off x="5139062" y="3656386"/>
+            <a:ext cx="1203526" cy="1214"/>
+          </a:xfrm>
+          <a:prstGeom prst="straightConnector1">
+            <a:avLst/>
+          </a:prstGeom>
+          <a:ln>
+            <a:tailEnd type="arrow"/>
+          </a:ln>
+        </p:spPr>
+        <p:style>
+          <a:lnRef idx="1">
+            <a:schemeClr val="accent1"/>
+          </a:lnRef>
+          <a:fillRef idx="0">
+            <a:schemeClr val="accent1"/>
+          </a:fillRef>
+          <a:effectRef idx="0">
+            <a:schemeClr val="accent1"/>
+          </a:effectRef>
+          <a:fontRef idx="minor">
+            <a:schemeClr val="tx1"/>
+          </a:fontRef>
+        </p:style>
+      </p:cxnSp>
+      <p:grpSp>
+        <p:nvGrpSpPr>
+          <p:cNvPr id="26" name="Group 25"/>
+          <p:cNvGrpSpPr/>
+          <p:nvPr/>
+        </p:nvGrpSpPr>
+        <p:grpSpPr>
+          <a:xfrm>
+            <a:off x="6354864" y="1600200"/>
+            <a:ext cx="1569936" cy="1277617"/>
+            <a:chOff x="6344101" y="3118177"/>
+            <a:chExt cx="1569936" cy="1277617"/>
+          </a:xfrm>
+        </p:grpSpPr>
+        <p:sp>
+          <p:nvSpPr>
+            <p:cNvPr id="27" name="TextBox 26"/>
+            <p:cNvSpPr txBox="1"/>
+            <p:nvPr/>
+          </p:nvSpPr>
+          <p:spPr>
+            <a:xfrm>
+              <a:off x="6488989" y="4107668"/>
+              <a:ext cx="1280160" cy="274320"/>
+            </a:xfrm>
+            <a:prstGeom prst="rect">
+              <a:avLst/>
+            </a:prstGeom>
+            <a:noFill/>
+          </p:spPr>
+          <p:txBody>
+            <a:bodyPr wrap="square" rtlCol="0">
+              <a:spAutoFit/>
+            </a:bodyPr>
+            <a:lstStyle/>
+            <a:p>
+              <a:pPr algn="ctr"/>
+              <a:r>
+                <a:rPr lang="en-US" sz="1200" b="1" dirty="0" err="1" smtClean="0"/>
+                <a:t>Light</a:t>
+              </a:r>
+              <a:r>
+                <a:rPr lang="en-US" sz="1200" b="1" dirty="0" err="1" smtClean="0"/>
+                <a:t>_plant</a:t>
+              </a:r>
+              <a:endParaRPr lang="en-US" sz="1200" b="1" dirty="0" smtClean="0"/>
+            </a:p>
+          </p:txBody>
+        </p:sp>
+        <p:grpSp>
+          <p:nvGrpSpPr>
+            <p:cNvPr id="28" name="Group 27"/>
+            <p:cNvGrpSpPr/>
+            <p:nvPr/>
+          </p:nvGrpSpPr>
+          <p:grpSpPr>
+            <a:xfrm>
+              <a:off x="6344101" y="3118177"/>
+              <a:ext cx="1569936" cy="1277617"/>
+              <a:chOff x="6338034" y="2591909"/>
+              <a:chExt cx="1569936" cy="1277617"/>
+            </a:xfrm>
+          </p:grpSpPr>
+          <p:sp>
+            <p:nvSpPr>
+              <p:cNvPr id="29" name="Rectangle 28"/>
+              <p:cNvSpPr/>
+              <p:nvPr/>
+            </p:nvSpPr>
+            <p:spPr>
+              <a:xfrm>
+                <a:off x="6338034" y="2591909"/>
+                <a:ext cx="1569936" cy="1277617"/>
+              </a:xfrm>
+              <a:prstGeom prst="rect">
+                <a:avLst/>
+              </a:prstGeom>
+              <a:noFill/>
+            </p:spPr>
+            <p:style>
+              <a:lnRef idx="2">
+                <a:schemeClr val="accent1">
+                  <a:shade val="50000"/>
+                </a:schemeClr>
+              </a:lnRef>
+              <a:fillRef idx="1">
+                <a:schemeClr val="accent1"/>
+              </a:fillRef>
+              <a:effectRef idx="0">
+                <a:schemeClr val="accent1"/>
+              </a:effectRef>
+              <a:fontRef idx="minor">
+                <a:schemeClr val="lt1"/>
+              </a:fontRef>
+            </p:style>
+            <p:txBody>
+              <a:bodyPr rot="0" spcFirstLastPara="0" vertOverflow="overflow" horzOverflow="overflow" vert="horz" wrap="square" lIns="91440" tIns="45720" rIns="91440" bIns="45720" numCol="1" spcCol="0" rtlCol="0" fromWordArt="0" anchor="ctr" anchorCtr="0" forceAA="0" compatLnSpc="1">
+                <a:prstTxWarp prst="textNoShape">
+                  <a:avLst/>
+                </a:prstTxWarp>
+                <a:noAutofit/>
+              </a:bodyPr>
+              <a:lstStyle/>
+              <a:p>
+                <a:pPr algn="ctr"/>
+                <a:endParaRPr lang="en-US"/>
+              </a:p>
+            </p:txBody>
+          </p:sp>
+          <p:sp>
+            <p:nvSpPr>
+              <p:cNvPr id="30" name="TextBox 29"/>
+              <p:cNvSpPr txBox="1"/>
+              <p:nvPr/>
+            </p:nvSpPr>
+            <p:spPr>
+              <a:xfrm>
+                <a:off x="6382054" y="3091190"/>
+                <a:ext cx="1392920" cy="261610"/>
+              </a:xfrm>
+              <a:prstGeom prst="rect">
+                <a:avLst/>
+              </a:prstGeom>
+              <a:noFill/>
+            </p:spPr>
+            <p:txBody>
+              <a:bodyPr wrap="square" rtlCol="0">
+                <a:spAutoFit/>
+              </a:bodyPr>
+              <a:lstStyle/>
+              <a:p>
+                <a:r>
+                  <a:rPr lang="en-US" sz="1100" i="1" dirty="0" err="1" smtClean="0"/>
+                  <a:t>gw</a:t>
+                </a:r>
+                <a:r>
+                  <a:rPr lang="en-US" sz="1100" i="1" dirty="0" smtClean="0"/>
+                  <a:t>::</a:t>
+                </a:r>
+                <a:r>
+                  <a:rPr lang="en-US" sz="1100" i="1" dirty="0" smtClean="0"/>
+                  <a:t>Led</a:t>
+                </a:r>
+                <a:r>
+                  <a:rPr lang="en-US" sz="1100" i="1" dirty="0" smtClean="0"/>
+                  <a:t>*  </a:t>
+                </a:r>
+                <a:r>
+                  <a:rPr lang="en-US" sz="1100" i="1" dirty="0" smtClean="0"/>
+                  <a:t>5</a:t>
+                </a:r>
+                <a:r>
+                  <a:rPr lang="en-US" sz="1100" i="1" dirty="0" smtClean="0"/>
+                  <a:t> </a:t>
+                </a:r>
+                <a:endParaRPr lang="en-US" sz="1100" i="1" dirty="0" smtClean="0"/>
+              </a:p>
+            </p:txBody>
+          </p:sp>
+        </p:grpSp>
+      </p:grpSp>
+      <p:grpSp>
+        <p:nvGrpSpPr>
+          <p:cNvPr id="34" name="Group 33"/>
+          <p:cNvGrpSpPr/>
+          <p:nvPr/>
+        </p:nvGrpSpPr>
+        <p:grpSpPr>
+          <a:xfrm>
+            <a:off x="5154176" y="1954656"/>
+            <a:ext cx="1170424" cy="1535430"/>
+            <a:chOff x="5154176" y="1912132"/>
+            <a:chExt cx="1170424" cy="1535430"/>
+          </a:xfrm>
+        </p:grpSpPr>
+        <p:cxnSp>
+          <p:nvCxnSpPr>
+            <p:cNvPr id="10" name="Straight Connector 9"/>
+            <p:cNvCxnSpPr/>
+            <p:nvPr/>
+          </p:nvCxnSpPr>
+          <p:spPr>
+            <a:xfrm flipV="1">
+              <a:off x="5638800" y="1912132"/>
+              <a:ext cx="0" cy="1535430"/>
+            </a:xfrm>
+            <a:prstGeom prst="line">
+              <a:avLst/>
+            </a:prstGeom>
+          </p:spPr>
+          <p:style>
+            <a:lnRef idx="1">
+              <a:schemeClr val="accent1"/>
+            </a:lnRef>
+            <a:fillRef idx="0">
+              <a:schemeClr val="accent1"/>
+            </a:fillRef>
+            <a:effectRef idx="0">
+              <a:schemeClr val="accent1"/>
+            </a:effectRef>
+            <a:fontRef idx="minor">
+              <a:schemeClr val="tx1"/>
+            </a:fontRef>
+          </p:style>
+        </p:cxnSp>
+        <p:cxnSp>
+          <p:nvCxnSpPr>
+            <p:cNvPr id="12" name="Straight Arrow Connector 11"/>
+            <p:cNvCxnSpPr/>
+            <p:nvPr/>
+          </p:nvCxnSpPr>
+          <p:spPr>
+            <a:xfrm>
+              <a:off x="5638800" y="1912132"/>
+              <a:ext cx="685800" cy="0"/>
+            </a:xfrm>
+            <a:prstGeom prst="straightConnector1">
+              <a:avLst/>
+            </a:prstGeom>
+            <a:ln>
+              <a:tailEnd type="arrow"/>
+            </a:ln>
+          </p:spPr>
+          <p:style>
+            <a:lnRef idx="1">
+              <a:schemeClr val="accent1"/>
+            </a:lnRef>
+            <a:fillRef idx="0">
+              <a:schemeClr val="accent1"/>
+            </a:fillRef>
+            <a:effectRef idx="0">
+              <a:schemeClr val="accent1"/>
+            </a:effectRef>
+            <a:fontRef idx="minor">
+              <a:schemeClr val="tx1"/>
+            </a:fontRef>
+          </p:style>
+        </p:cxnSp>
+        <p:cxnSp>
+          <p:nvCxnSpPr>
+            <p:cNvPr id="17" name="Straight Connector 16"/>
+            <p:cNvCxnSpPr/>
+            <p:nvPr/>
+          </p:nvCxnSpPr>
+          <p:spPr>
+            <a:xfrm>
+              <a:off x="5154176" y="3447562"/>
+              <a:ext cx="484624" cy="0"/>
+            </a:xfrm>
+            <a:prstGeom prst="line">
+              <a:avLst/>
+            </a:prstGeom>
+          </p:spPr>
+          <p:style>
+            <a:lnRef idx="1">
+              <a:schemeClr val="accent1"/>
+            </a:lnRef>
+            <a:fillRef idx="0">
+              <a:schemeClr val="accent1"/>
+            </a:fillRef>
+            <a:effectRef idx="0">
+              <a:schemeClr val="accent1"/>
+            </a:effectRef>
+            <a:fontRef idx="minor">
+              <a:schemeClr val="tx1"/>
+            </a:fontRef>
+          </p:style>
+        </p:cxnSp>
+      </p:grpSp>
+    </p:spTree>
+    <p:extLst>
+      <p:ext uri="{BB962C8B-B14F-4D97-AF65-F5344CB8AC3E}">
+        <p14:creationId xmlns:p14="http://schemas.microsoft.com/office/powerpoint/2010/main" val="4246061431"/>
       </p:ext>
     </p:extLst>
   </p:cSld>

</xml_diff>

<commit_message>
updated system diagram to include Whisker_bot
</commit_message>
<xml_diff>
--- a/System_diagrams.pptx
+++ b/System_diagrams.pptx
@@ -7,6 +7,7 @@
   <p:sldIdLst>
     <p:sldId id="257" r:id="rId2"/>
     <p:sldId id="258" r:id="rId3"/>
+    <p:sldId id="259" r:id="rId4"/>
   </p:sldIdLst>
   <p:sldSz cx="9144000" cy="6858000" type="screen4x3"/>
   <p:notesSz cx="6894513" cy="9180513"/>
@@ -289,7 +290,7 @@
           <a:p>
             <a:fld id="{4DD00C69-B510-4436-9533-A615A6B020D7}" type="datetimeFigureOut">
               <a:rPr lang="en-US" smtClean="0"/>
-              <a:t>10/31/2014</a:t>
+              <a:t>11/1/2014</a:t>
             </a:fld>
             <a:endParaRPr lang="en-US"/>
           </a:p>
@@ -459,7 +460,7 @@
           <a:p>
             <a:fld id="{4DD00C69-B510-4436-9533-A615A6B020D7}" type="datetimeFigureOut">
               <a:rPr lang="en-US" smtClean="0"/>
-              <a:t>10/31/2014</a:t>
+              <a:t>11/1/2014</a:t>
             </a:fld>
             <a:endParaRPr lang="en-US"/>
           </a:p>
@@ -639,7 +640,7 @@
           <a:p>
             <a:fld id="{4DD00C69-B510-4436-9533-A615A6B020D7}" type="datetimeFigureOut">
               <a:rPr lang="en-US" smtClean="0"/>
-              <a:t>10/31/2014</a:t>
+              <a:t>11/1/2014</a:t>
             </a:fld>
             <a:endParaRPr lang="en-US"/>
           </a:p>
@@ -809,7 +810,7 @@
           <a:p>
             <a:fld id="{4DD00C69-B510-4436-9533-A615A6B020D7}" type="datetimeFigureOut">
               <a:rPr lang="en-US" smtClean="0"/>
-              <a:t>10/31/2014</a:t>
+              <a:t>11/1/2014</a:t>
             </a:fld>
             <a:endParaRPr lang="en-US"/>
           </a:p>
@@ -1055,7 +1056,7 @@
           <a:p>
             <a:fld id="{4DD00C69-B510-4436-9533-A615A6B020D7}" type="datetimeFigureOut">
               <a:rPr lang="en-US" smtClean="0"/>
-              <a:t>10/31/2014</a:t>
+              <a:t>11/1/2014</a:t>
             </a:fld>
             <a:endParaRPr lang="en-US"/>
           </a:p>
@@ -1343,7 +1344,7 @@
           <a:p>
             <a:fld id="{4DD00C69-B510-4436-9533-A615A6B020D7}" type="datetimeFigureOut">
               <a:rPr lang="en-US" smtClean="0"/>
-              <a:t>10/31/2014</a:t>
+              <a:t>11/1/2014</a:t>
             </a:fld>
             <a:endParaRPr lang="en-US"/>
           </a:p>
@@ -1765,7 +1766,7 @@
           <a:p>
             <a:fld id="{4DD00C69-B510-4436-9533-A615A6B020D7}" type="datetimeFigureOut">
               <a:rPr lang="en-US" smtClean="0"/>
-              <a:t>10/31/2014</a:t>
+              <a:t>11/1/2014</a:t>
             </a:fld>
             <a:endParaRPr lang="en-US"/>
           </a:p>
@@ -1883,7 +1884,7 @@
           <a:p>
             <a:fld id="{4DD00C69-B510-4436-9533-A615A6B020D7}" type="datetimeFigureOut">
               <a:rPr lang="en-US" smtClean="0"/>
-              <a:t>10/31/2014</a:t>
+              <a:t>11/1/2014</a:t>
             </a:fld>
             <a:endParaRPr lang="en-US"/>
           </a:p>
@@ -1978,7 +1979,7 @@
           <a:p>
             <a:fld id="{4DD00C69-B510-4436-9533-A615A6B020D7}" type="datetimeFigureOut">
               <a:rPr lang="en-US" smtClean="0"/>
-              <a:t>10/31/2014</a:t>
+              <a:t>11/1/2014</a:t>
             </a:fld>
             <a:endParaRPr lang="en-US"/>
           </a:p>
@@ -2255,7 +2256,7 @@
           <a:p>
             <a:fld id="{4DD00C69-B510-4436-9533-A615A6B020D7}" type="datetimeFigureOut">
               <a:rPr lang="en-US" smtClean="0"/>
-              <a:t>10/31/2014</a:t>
+              <a:t>11/1/2014</a:t>
             </a:fld>
             <a:endParaRPr lang="en-US"/>
           </a:p>
@@ -2508,7 +2509,7 @@
           <a:p>
             <a:fld id="{4DD00C69-B510-4436-9533-A615A6B020D7}" type="datetimeFigureOut">
               <a:rPr lang="en-US" smtClean="0"/>
-              <a:t>10/31/2014</a:t>
+              <a:t>11/1/2014</a:t>
             </a:fld>
             <a:endParaRPr lang="en-US"/>
           </a:p>
@@ -2721,7 +2722,7 @@
           <a:p>
             <a:fld id="{4DD00C69-B510-4436-9533-A615A6B020D7}" type="datetimeFigureOut">
               <a:rPr lang="en-US" smtClean="0"/>
-              <a:t>10/31/2014</a:t>
+              <a:t>11/1/2014</a:t>
             </a:fld>
             <a:endParaRPr lang="en-US"/>
           </a:p>
@@ -3720,6 +3721,57 @@
           </a:fontRef>
         </p:style>
       </p:cxnSp>
+      <p:sp>
+        <p:nvSpPr>
+          <p:cNvPr id="23" name="TextBox 22"/>
+          <p:cNvSpPr txBox="1"/>
+          <p:nvPr/>
+        </p:nvSpPr>
+        <p:spPr>
+          <a:xfrm>
+            <a:off x="285790" y="1600199"/>
+            <a:ext cx="2743200" cy="461665"/>
+          </a:xfrm>
+          <a:prstGeom prst="rect">
+            <a:avLst/>
+          </a:prstGeom>
+          <a:noFill/>
+          <a:ln>
+            <a:solidFill>
+              <a:schemeClr val="bg2">
+                <a:lumMod val="75000"/>
+              </a:schemeClr>
+            </a:solidFill>
+          </a:ln>
+        </p:spPr>
+        <p:txBody>
+          <a:bodyPr wrap="square" rtlCol="0">
+            <a:spAutoFit/>
+          </a:bodyPr>
+          <a:lstStyle/>
+          <a:p>
+            <a:r>
+              <a:rPr lang="en-US" sz="2400" dirty="0" err="1" smtClean="0">
+                <a:solidFill>
+                  <a:schemeClr val="bg2">
+                    <a:lumMod val="50000"/>
+                  </a:schemeClr>
+                </a:solidFill>
+                <a:latin typeface="Cooper Black" panose="0208090404030B020404" pitchFamily="18" charset="0"/>
+              </a:rPr>
+              <a:t>Helen_bot.ino</a:t>
+            </a:r>
+            <a:endParaRPr lang="en-US" sz="2400" dirty="0" smtClean="0">
+              <a:solidFill>
+                <a:schemeClr val="bg2">
+                  <a:lumMod val="50000"/>
+                </a:schemeClr>
+              </a:solidFill>
+              <a:latin typeface="Cooper Black" panose="0208090404030B020404" pitchFamily="18" charset="0"/>
+            </a:endParaRPr>
+          </a:p>
+        </p:txBody>
+      </p:sp>
     </p:spTree>
     <p:extLst>
       <p:ext uri="{BB962C8B-B14F-4D97-AF65-F5344CB8AC3E}">
@@ -3775,10 +3827,6 @@
             <a:r>
               <a:rPr lang="en-US" dirty="0" smtClean="0"/>
               <a:t>ALFRED: Bump and Wander </a:t>
-            </a:r>
-            <a:r>
-              <a:rPr lang="en-US" dirty="0" smtClean="0"/>
-              <a:t/>
             </a:r>
             <a:br>
               <a:rPr lang="en-US" dirty="0" smtClean="0"/>
@@ -3998,7 +4046,6 @@
               <a:rPr lang="en-US" sz="1200" dirty="0" smtClean="0"/>
               <a:t>The light plant also uses the I2C digital I/O expander and requires the Wire library which is a memory hog.</a:t>
             </a:r>
-            <a:endParaRPr lang="en-US" sz="1200" dirty="0" smtClean="0"/>
           </a:p>
         </p:txBody>
       </p:sp>
@@ -4445,11 +4492,7 @@
               <a:pPr algn="ctr"/>
               <a:r>
                 <a:rPr lang="en-US" sz="1200" b="1" dirty="0" err="1" smtClean="0"/>
-                <a:t>Light</a:t>
-              </a:r>
-              <a:r>
-                <a:rPr lang="en-US" sz="1200" b="1" dirty="0" err="1" smtClean="0"/>
-                <a:t>_plant</a:t>
+                <a:t>Light_plant</a:t>
               </a:r>
               <a:endParaRPr lang="en-US" sz="1200" b="1" dirty="0" smtClean="0"/>
             </a:p>
@@ -4543,25 +4586,8 @@
                 </a:r>
                 <a:r>
                   <a:rPr lang="en-US" sz="1100" i="1" dirty="0" smtClean="0"/>
-                  <a:t>::</a:t>
+                  <a:t>::Led*  5 </a:t>
                 </a:r>
-                <a:r>
-                  <a:rPr lang="en-US" sz="1100" i="1" dirty="0" smtClean="0"/>
-                  <a:t>Led</a:t>
-                </a:r>
-                <a:r>
-                  <a:rPr lang="en-US" sz="1100" i="1" dirty="0" smtClean="0"/>
-                  <a:t>*  </a:t>
-                </a:r>
-                <a:r>
-                  <a:rPr lang="en-US" sz="1100" i="1" dirty="0" smtClean="0"/>
-                  <a:t>5</a:t>
-                </a:r>
-                <a:r>
-                  <a:rPr lang="en-US" sz="1100" i="1" dirty="0" smtClean="0"/>
-                  <a:t> </a:t>
-                </a:r>
-                <a:endParaRPr lang="en-US" sz="1100" i="1" dirty="0" smtClean="0"/>
               </a:p>
             </p:txBody>
           </p:sp>
@@ -4675,10 +4701,795 @@
           </p:style>
         </p:cxnSp>
       </p:grpSp>
+      <p:sp>
+        <p:nvSpPr>
+          <p:cNvPr id="33" name="TextBox 32"/>
+          <p:cNvSpPr txBox="1"/>
+          <p:nvPr/>
+        </p:nvSpPr>
+        <p:spPr>
+          <a:xfrm>
+            <a:off x="285790" y="1600199"/>
+            <a:ext cx="2743200" cy="461665"/>
+          </a:xfrm>
+          <a:prstGeom prst="rect">
+            <a:avLst/>
+          </a:prstGeom>
+          <a:noFill/>
+          <a:ln>
+            <a:solidFill>
+              <a:schemeClr val="bg2">
+                <a:lumMod val="75000"/>
+              </a:schemeClr>
+            </a:solidFill>
+          </a:ln>
+        </p:spPr>
+        <p:txBody>
+          <a:bodyPr wrap="square" rtlCol="0">
+            <a:spAutoFit/>
+          </a:bodyPr>
+          <a:lstStyle/>
+          <a:p>
+            <a:r>
+              <a:rPr lang="en-US" sz="2400" dirty="0" err="1" smtClean="0">
+                <a:solidFill>
+                  <a:schemeClr val="bg2">
+                    <a:lumMod val="50000"/>
+                  </a:schemeClr>
+                </a:solidFill>
+                <a:latin typeface="Cooper Black" panose="0208090404030B020404" pitchFamily="18" charset="0"/>
+              </a:rPr>
+              <a:t>Helen_bot.ino</a:t>
+            </a:r>
+            <a:endParaRPr lang="en-US" sz="2400" dirty="0" smtClean="0">
+              <a:solidFill>
+                <a:schemeClr val="bg2">
+                  <a:lumMod val="50000"/>
+                </a:schemeClr>
+              </a:solidFill>
+              <a:latin typeface="Cooper Black" panose="0208090404030B020404" pitchFamily="18" charset="0"/>
+            </a:endParaRPr>
+          </a:p>
+        </p:txBody>
+      </p:sp>
     </p:spTree>
     <p:extLst>
       <p:ext uri="{BB962C8B-B14F-4D97-AF65-F5344CB8AC3E}">
         <p14:creationId xmlns:p14="http://schemas.microsoft.com/office/powerpoint/2010/main" val="4246061431"/>
+      </p:ext>
+    </p:extLst>
+  </p:cSld>
+  <p:clrMapOvr>
+    <a:masterClrMapping/>
+  </p:clrMapOvr>
+</p:sld>
+</file>
+
+<file path=ppt/slides/slide3.xml><?xml version="1.0" encoding="utf-8"?>
+<p:sld xmlns:a="http://schemas.openxmlformats.org/drawingml/2006/main" xmlns:r="http://schemas.openxmlformats.org/officeDocument/2006/relationships" xmlns:p="http://schemas.openxmlformats.org/presentationml/2006/main">
+  <p:cSld>
+    <p:spTree>
+      <p:nvGrpSpPr>
+        <p:cNvPr id="1" name=""/>
+        <p:cNvGrpSpPr/>
+        <p:nvPr/>
+      </p:nvGrpSpPr>
+      <p:grpSpPr>
+        <a:xfrm>
+          <a:off x="0" y="0"/>
+          <a:ext cx="0" cy="0"/>
+          <a:chOff x="0" y="0"/>
+          <a:chExt cx="0" cy="0"/>
+        </a:xfrm>
+      </p:grpSpPr>
+      <p:sp>
+        <p:nvSpPr>
+          <p:cNvPr id="72" name="Title 71"/>
+          <p:cNvSpPr>
+            <a:spLocks noGrp="1"/>
+          </p:cNvSpPr>
+          <p:nvPr>
+            <p:ph type="title"/>
+          </p:nvPr>
+        </p:nvSpPr>
+        <p:spPr>
+          <a:xfrm>
+            <a:off x="457200" y="76200"/>
+            <a:ext cx="8229600" cy="1143000"/>
+          </a:xfrm>
+        </p:spPr>
+        <p:txBody>
+          <a:bodyPr/>
+          <a:lstStyle/>
+          <a:p>
+            <a:r>
+              <a:rPr lang="en-US" dirty="0" smtClean="0"/>
+              <a:t>ALFRED: </a:t>
+            </a:r>
+            <a:r>
+              <a:rPr lang="en-US" dirty="0" smtClean="0"/>
+              <a:t>Scan and Wander</a:t>
+            </a:r>
+            <a:endParaRPr lang="en-US" dirty="0"/>
+          </a:p>
+        </p:txBody>
+      </p:sp>
+      <p:grpSp>
+        <p:nvGrpSpPr>
+          <p:cNvPr id="20" name="Group 19"/>
+          <p:cNvGrpSpPr/>
+          <p:nvPr/>
+        </p:nvGrpSpPr>
+        <p:grpSpPr>
+          <a:xfrm>
+            <a:off x="3584240" y="2600379"/>
+            <a:ext cx="1646136" cy="1277619"/>
+            <a:chOff x="3584240" y="2600379"/>
+            <a:chExt cx="1646136" cy="1277619"/>
+          </a:xfrm>
+        </p:grpSpPr>
+        <p:sp>
+          <p:nvSpPr>
+            <p:cNvPr id="49" name="TextBox 48"/>
+            <p:cNvSpPr txBox="1"/>
+            <p:nvPr/>
+          </p:nvSpPr>
+          <p:spPr>
+            <a:xfrm>
+              <a:off x="3637634" y="3581400"/>
+              <a:ext cx="1463148" cy="276999"/>
+            </a:xfrm>
+            <a:prstGeom prst="rect">
+              <a:avLst/>
+            </a:prstGeom>
+            <a:noFill/>
+          </p:spPr>
+          <p:txBody>
+            <a:bodyPr wrap="square" rtlCol="0">
+              <a:spAutoFit/>
+            </a:bodyPr>
+            <a:lstStyle/>
+            <a:p>
+              <a:pPr algn="ctr"/>
+              <a:r>
+                <a:rPr lang="en-US" sz="1200" b="1" dirty="0" err="1" smtClean="0"/>
+                <a:t>Whisker</a:t>
+              </a:r>
+              <a:r>
+                <a:rPr lang="en-US" sz="1200" b="1" dirty="0" err="1" smtClean="0"/>
+                <a:t>_controller</a:t>
+              </a:r>
+              <a:endParaRPr lang="en-US" sz="1200" b="1" dirty="0" smtClean="0"/>
+            </a:p>
+          </p:txBody>
+        </p:sp>
+        <p:grpSp>
+          <p:nvGrpSpPr>
+            <p:cNvPr id="19" name="Group 18"/>
+            <p:cNvGrpSpPr/>
+            <p:nvPr/>
+          </p:nvGrpSpPr>
+          <p:grpSpPr>
+            <a:xfrm>
+              <a:off x="3584240" y="2600379"/>
+              <a:ext cx="1646136" cy="1277619"/>
+              <a:chOff x="3584240" y="2600379"/>
+              <a:chExt cx="1646136" cy="1277619"/>
+            </a:xfrm>
+          </p:grpSpPr>
+          <p:sp>
+            <p:nvSpPr>
+              <p:cNvPr id="48" name="Rectangle 47"/>
+              <p:cNvSpPr/>
+              <p:nvPr/>
+            </p:nvSpPr>
+            <p:spPr>
+              <a:xfrm>
+                <a:off x="3584240" y="2600379"/>
+                <a:ext cx="1569936" cy="1277619"/>
+              </a:xfrm>
+              <a:prstGeom prst="rect">
+                <a:avLst/>
+              </a:prstGeom>
+              <a:noFill/>
+            </p:spPr>
+            <p:style>
+              <a:lnRef idx="2">
+                <a:schemeClr val="accent1">
+                  <a:shade val="50000"/>
+                </a:schemeClr>
+              </a:lnRef>
+              <a:fillRef idx="1">
+                <a:schemeClr val="accent1"/>
+              </a:fillRef>
+              <a:effectRef idx="0">
+                <a:schemeClr val="accent1"/>
+              </a:effectRef>
+              <a:fontRef idx="minor">
+                <a:schemeClr val="lt1"/>
+              </a:fontRef>
+            </p:style>
+            <p:txBody>
+              <a:bodyPr rot="0" spcFirstLastPara="0" vertOverflow="overflow" horzOverflow="overflow" vert="horz" wrap="square" lIns="91440" tIns="45720" rIns="91440" bIns="45720" numCol="1" spcCol="0" rtlCol="0" fromWordArt="0" anchor="ctr" anchorCtr="0" forceAA="0" compatLnSpc="1">
+                <a:prstTxWarp prst="textNoShape">
+                  <a:avLst/>
+                </a:prstTxWarp>
+                <a:noAutofit/>
+              </a:bodyPr>
+              <a:lstStyle/>
+              <a:p>
+                <a:pPr algn="ctr"/>
+                <a:endParaRPr lang="en-US"/>
+              </a:p>
+            </p:txBody>
+          </p:sp>
+          <p:sp>
+            <p:nvSpPr>
+              <p:cNvPr id="50" name="TextBox 49"/>
+              <p:cNvSpPr txBox="1"/>
+              <p:nvPr/>
+            </p:nvSpPr>
+            <p:spPr>
+              <a:xfrm>
+                <a:off x="3809654" y="2791265"/>
+                <a:ext cx="1420722" cy="276999"/>
+              </a:xfrm>
+              <a:prstGeom prst="rect">
+                <a:avLst/>
+              </a:prstGeom>
+              <a:noFill/>
+            </p:spPr>
+            <p:txBody>
+              <a:bodyPr wrap="square" rtlCol="0">
+                <a:spAutoFit/>
+              </a:bodyPr>
+              <a:lstStyle/>
+              <a:p>
+                <a:pPr algn="r"/>
+                <a:r>
+                  <a:rPr lang="en-US" sz="1200" dirty="0" err="1" smtClean="0"/>
+                  <a:t>Cmd_velocity_msg</a:t>
+                </a:r>
+                <a:endParaRPr lang="en-US" sz="1200" dirty="0" smtClean="0"/>
+              </a:p>
+            </p:txBody>
+          </p:sp>
+        </p:grpSp>
+      </p:grpSp>
+      <p:sp>
+        <p:nvSpPr>
+          <p:cNvPr id="108" name="TextBox 107"/>
+          <p:cNvSpPr txBox="1"/>
+          <p:nvPr/>
+        </p:nvSpPr>
+        <p:spPr>
+          <a:xfrm>
+            <a:off x="913410" y="4953000"/>
+            <a:ext cx="3429001" cy="1200329"/>
+          </a:xfrm>
+          <a:prstGeom prst="rect">
+            <a:avLst/>
+          </a:prstGeom>
+          <a:noFill/>
+          <a:ln>
+            <a:solidFill>
+              <a:schemeClr val="bg2">
+                <a:lumMod val="50000"/>
+              </a:schemeClr>
+            </a:solidFill>
+          </a:ln>
+        </p:spPr>
+        <p:txBody>
+          <a:bodyPr wrap="square" rtlCol="0">
+            <a:spAutoFit/>
+          </a:bodyPr>
+          <a:lstStyle/>
+          <a:p>
+            <a:r>
+              <a:rPr lang="en-US" sz="1200" dirty="0" smtClean="0"/>
+              <a:t>NOTES:</a:t>
+            </a:r>
+          </a:p>
+          <a:p>
+            <a:pPr marL="171450" indent="-171450">
+              <a:buFontTx/>
+              <a:buChar char="-"/>
+            </a:pPr>
+            <a:r>
+              <a:rPr lang="en-US" sz="1200" dirty="0" smtClean="0"/>
+              <a:t>This bot implements obstacle avoidance by rotating an ultrasonic sensor with an attached servo.  </a:t>
+            </a:r>
+          </a:p>
+          <a:p>
+            <a:pPr marL="171450" indent="-171450">
+              <a:buFontTx/>
+              <a:buChar char="-"/>
+            </a:pPr>
+            <a:r>
+              <a:rPr lang="en-US" sz="1200" dirty="0" smtClean="0"/>
+              <a:t>The Scanner_5pt block hides the implementation and control details for controlling the scan.</a:t>
+            </a:r>
+            <a:endParaRPr lang="en-US" sz="1200" dirty="0" smtClean="0"/>
+          </a:p>
+        </p:txBody>
+      </p:sp>
+      <p:grpSp>
+        <p:nvGrpSpPr>
+          <p:cNvPr id="21" name="Group 20"/>
+          <p:cNvGrpSpPr/>
+          <p:nvPr/>
+        </p:nvGrpSpPr>
+        <p:grpSpPr>
+          <a:xfrm>
+            <a:off x="838200" y="2608582"/>
+            <a:ext cx="1638381" cy="1277618"/>
+            <a:chOff x="838200" y="2615714"/>
+            <a:chExt cx="1638381" cy="1277618"/>
+          </a:xfrm>
+        </p:grpSpPr>
+        <p:sp>
+          <p:nvSpPr>
+            <p:cNvPr id="42" name="TextBox 41"/>
+            <p:cNvSpPr txBox="1"/>
+            <p:nvPr/>
+          </p:nvSpPr>
+          <p:spPr>
+            <a:xfrm>
+              <a:off x="1017310" y="3581400"/>
+              <a:ext cx="1280160" cy="274320"/>
+            </a:xfrm>
+            <a:prstGeom prst="rect">
+              <a:avLst/>
+            </a:prstGeom>
+            <a:noFill/>
+          </p:spPr>
+          <p:txBody>
+            <a:bodyPr wrap="square" rtlCol="0">
+              <a:spAutoFit/>
+            </a:bodyPr>
+            <a:lstStyle/>
+            <a:p>
+              <a:pPr algn="ctr"/>
+              <a:r>
+                <a:rPr lang="en-US" sz="1200" b="1" dirty="0" smtClean="0"/>
+                <a:t>Scanner_5pt</a:t>
+              </a:r>
+              <a:endParaRPr lang="en-US" sz="1200" b="1" dirty="0" smtClean="0"/>
+            </a:p>
+          </p:txBody>
+        </p:sp>
+        <p:grpSp>
+          <p:nvGrpSpPr>
+            <p:cNvPr id="18" name="Group 17"/>
+            <p:cNvGrpSpPr/>
+            <p:nvPr/>
+          </p:nvGrpSpPr>
+          <p:grpSpPr>
+            <a:xfrm>
+              <a:off x="838200" y="2615714"/>
+              <a:ext cx="1638381" cy="1277618"/>
+              <a:chOff x="838200" y="2615714"/>
+              <a:chExt cx="1638381" cy="1277618"/>
+            </a:xfrm>
+          </p:grpSpPr>
+          <p:sp>
+            <p:nvSpPr>
+              <p:cNvPr id="41" name="Rectangle 40"/>
+              <p:cNvSpPr/>
+              <p:nvPr/>
+            </p:nvSpPr>
+            <p:spPr>
+              <a:xfrm>
+                <a:off x="838200" y="2615714"/>
+                <a:ext cx="1569938" cy="1277618"/>
+              </a:xfrm>
+              <a:prstGeom prst="rect">
+                <a:avLst/>
+              </a:prstGeom>
+              <a:noFill/>
+            </p:spPr>
+            <p:style>
+              <a:lnRef idx="2">
+                <a:schemeClr val="accent1">
+                  <a:shade val="50000"/>
+                </a:schemeClr>
+              </a:lnRef>
+              <a:fillRef idx="1">
+                <a:schemeClr val="accent1"/>
+              </a:fillRef>
+              <a:effectRef idx="0">
+                <a:schemeClr val="accent1"/>
+              </a:effectRef>
+              <a:fontRef idx="minor">
+                <a:schemeClr val="lt1"/>
+              </a:fontRef>
+            </p:style>
+            <p:txBody>
+              <a:bodyPr rot="0" spcFirstLastPara="0" vertOverflow="overflow" horzOverflow="overflow" vert="horz" wrap="square" lIns="91440" tIns="45720" rIns="91440" bIns="45720" numCol="1" spcCol="0" rtlCol="0" fromWordArt="0" anchor="ctr" anchorCtr="0" forceAA="0" compatLnSpc="1">
+                <a:prstTxWarp prst="textNoShape">
+                  <a:avLst/>
+                </a:prstTxWarp>
+                <a:noAutofit/>
+              </a:bodyPr>
+              <a:lstStyle/>
+              <a:p>
+                <a:pPr algn="ctr"/>
+                <a:endParaRPr lang="en-US"/>
+              </a:p>
+            </p:txBody>
+          </p:sp>
+          <p:sp>
+            <p:nvSpPr>
+              <p:cNvPr id="43" name="TextBox 42"/>
+              <p:cNvSpPr txBox="1"/>
+              <p:nvPr/>
+            </p:nvSpPr>
+            <p:spPr>
+              <a:xfrm>
+                <a:off x="1006736" y="2806600"/>
+                <a:ext cx="1469845" cy="276999"/>
+              </a:xfrm>
+              <a:prstGeom prst="rect">
+                <a:avLst/>
+              </a:prstGeom>
+              <a:noFill/>
+            </p:spPr>
+            <p:txBody>
+              <a:bodyPr wrap="square" rtlCol="0">
+                <a:spAutoFit/>
+              </a:bodyPr>
+              <a:lstStyle/>
+              <a:p>
+                <a:pPr algn="r"/>
+                <a:r>
+                  <a:rPr lang="en-US" sz="1200" dirty="0" err="1" smtClean="0"/>
+                  <a:t>Five_pt_scan_msg</a:t>
+                </a:r>
+                <a:endParaRPr lang="en-US" sz="1200" dirty="0" smtClean="0"/>
+              </a:p>
+            </p:txBody>
+          </p:sp>
+          <p:sp>
+            <p:nvSpPr>
+              <p:cNvPr id="111" name="TextBox 110"/>
+              <p:cNvSpPr txBox="1"/>
+              <p:nvPr/>
+            </p:nvSpPr>
+            <p:spPr>
+              <a:xfrm>
+                <a:off x="926709" y="3130118"/>
+                <a:ext cx="1392920" cy="430887"/>
+              </a:xfrm>
+              <a:prstGeom prst="rect">
+                <a:avLst/>
+              </a:prstGeom>
+              <a:noFill/>
+            </p:spPr>
+            <p:txBody>
+              <a:bodyPr wrap="square" rtlCol="0">
+                <a:spAutoFit/>
+              </a:bodyPr>
+              <a:lstStyle/>
+              <a:p>
+                <a:r>
+                  <a:rPr lang="en-US" sz="1100" i="1" dirty="0" err="1" smtClean="0"/>
+                  <a:t>Servo.h</a:t>
+                </a:r>
+                <a:r>
+                  <a:rPr lang="en-US" sz="1100" i="1" dirty="0" smtClean="0"/>
+                  <a:t> x2</a:t>
+                </a:r>
+              </a:p>
+              <a:p>
+                <a:r>
+                  <a:rPr lang="en-US" sz="1100" i="1" dirty="0" smtClean="0"/>
+                  <a:t>Parallax PING))) x 1</a:t>
+                </a:r>
+                <a:endParaRPr lang="en-US" sz="1100" i="1" dirty="0" smtClean="0"/>
+              </a:p>
+            </p:txBody>
+          </p:sp>
+        </p:grpSp>
+      </p:grpSp>
+      <p:sp>
+        <p:nvSpPr>
+          <p:cNvPr id="13" name="TextBox 12"/>
+          <p:cNvSpPr txBox="1"/>
+          <p:nvPr/>
+        </p:nvSpPr>
+        <p:spPr>
+          <a:xfrm>
+            <a:off x="7013678" y="2782795"/>
+            <a:ext cx="954977" cy="276999"/>
+          </a:xfrm>
+          <a:prstGeom prst="rect">
+            <a:avLst/>
+          </a:prstGeom>
+          <a:noFill/>
+        </p:spPr>
+        <p:txBody>
+          <a:bodyPr wrap="square" rtlCol="0">
+            <a:spAutoFit/>
+          </a:bodyPr>
+          <a:lstStyle/>
+          <a:p>
+            <a:pPr algn="r"/>
+            <a:endParaRPr lang="en-US" sz="1200" dirty="0" smtClean="0"/>
+          </a:p>
+        </p:txBody>
+      </p:sp>
+      <p:grpSp>
+        <p:nvGrpSpPr>
+          <p:cNvPr id="2" name="Group 1"/>
+          <p:cNvGrpSpPr/>
+          <p:nvPr/>
+        </p:nvGrpSpPr>
+        <p:grpSpPr>
+          <a:xfrm>
+            <a:off x="6344101" y="2591909"/>
+            <a:ext cx="1569936" cy="1277617"/>
+            <a:chOff x="6344101" y="2591909"/>
+            <a:chExt cx="1569936" cy="1277617"/>
+          </a:xfrm>
+        </p:grpSpPr>
+        <p:sp>
+          <p:nvSpPr>
+            <p:cNvPr id="9" name="TextBox 8"/>
+            <p:cNvSpPr txBox="1"/>
+            <p:nvPr/>
+          </p:nvSpPr>
+          <p:spPr>
+            <a:xfrm>
+              <a:off x="6488989" y="3581400"/>
+              <a:ext cx="1280160" cy="274320"/>
+            </a:xfrm>
+            <a:prstGeom prst="rect">
+              <a:avLst/>
+            </a:prstGeom>
+            <a:noFill/>
+          </p:spPr>
+          <p:txBody>
+            <a:bodyPr wrap="square" rtlCol="0">
+              <a:spAutoFit/>
+            </a:bodyPr>
+            <a:lstStyle/>
+            <a:p>
+              <a:pPr algn="ctr"/>
+              <a:r>
+                <a:rPr lang="en-US" sz="1200" b="1" dirty="0" err="1" smtClean="0"/>
+                <a:t>Rover_plant</a:t>
+              </a:r>
+              <a:endParaRPr lang="en-US" sz="1200" b="1" dirty="0" smtClean="0"/>
+            </a:p>
+          </p:txBody>
+        </p:sp>
+        <p:grpSp>
+          <p:nvGrpSpPr>
+            <p:cNvPr id="22" name="Group 21"/>
+            <p:cNvGrpSpPr/>
+            <p:nvPr/>
+          </p:nvGrpSpPr>
+          <p:grpSpPr>
+            <a:xfrm>
+              <a:off x="6344101" y="2591909"/>
+              <a:ext cx="1569936" cy="1277617"/>
+              <a:chOff x="6338034" y="2591909"/>
+              <a:chExt cx="1569936" cy="1277617"/>
+            </a:xfrm>
+          </p:grpSpPr>
+          <p:sp>
+            <p:nvSpPr>
+              <p:cNvPr id="6" name="Rectangle 5"/>
+              <p:cNvSpPr/>
+              <p:nvPr/>
+            </p:nvSpPr>
+            <p:spPr>
+              <a:xfrm>
+                <a:off x="6338034" y="2591909"/>
+                <a:ext cx="1569936" cy="1277617"/>
+              </a:xfrm>
+              <a:prstGeom prst="rect">
+                <a:avLst/>
+              </a:prstGeom>
+              <a:noFill/>
+            </p:spPr>
+            <p:style>
+              <a:lnRef idx="2">
+                <a:schemeClr val="accent1">
+                  <a:shade val="50000"/>
+                </a:schemeClr>
+              </a:lnRef>
+              <a:fillRef idx="1">
+                <a:schemeClr val="accent1"/>
+              </a:fillRef>
+              <a:effectRef idx="0">
+                <a:schemeClr val="accent1"/>
+              </a:effectRef>
+              <a:fontRef idx="minor">
+                <a:schemeClr val="lt1"/>
+              </a:fontRef>
+            </p:style>
+            <p:txBody>
+              <a:bodyPr rot="0" spcFirstLastPara="0" vertOverflow="overflow" horzOverflow="overflow" vert="horz" wrap="square" lIns="91440" tIns="45720" rIns="91440" bIns="45720" numCol="1" spcCol="0" rtlCol="0" fromWordArt="0" anchor="ctr" anchorCtr="0" forceAA="0" compatLnSpc="1">
+                <a:prstTxWarp prst="textNoShape">
+                  <a:avLst/>
+                </a:prstTxWarp>
+                <a:noAutofit/>
+              </a:bodyPr>
+              <a:lstStyle/>
+              <a:p>
+                <a:pPr algn="ctr"/>
+                <a:endParaRPr lang="en-US"/>
+              </a:p>
+            </p:txBody>
+          </p:sp>
+          <p:sp>
+            <p:nvSpPr>
+              <p:cNvPr id="38" name="TextBox 37"/>
+              <p:cNvSpPr txBox="1"/>
+              <p:nvPr/>
+            </p:nvSpPr>
+            <p:spPr>
+              <a:xfrm>
+                <a:off x="6382054" y="3091190"/>
+                <a:ext cx="1392920" cy="261610"/>
+              </a:xfrm>
+              <a:prstGeom prst="rect">
+                <a:avLst/>
+              </a:prstGeom>
+              <a:noFill/>
+            </p:spPr>
+            <p:txBody>
+              <a:bodyPr wrap="square" rtlCol="0">
+                <a:spAutoFit/>
+              </a:bodyPr>
+              <a:lstStyle/>
+              <a:p>
+                <a:r>
+                  <a:rPr lang="en-US" sz="1100" i="1" dirty="0" err="1" smtClean="0"/>
+                  <a:t>gw</a:t>
+                </a:r>
+                <a:r>
+                  <a:rPr lang="en-US" sz="1100" i="1" dirty="0" smtClean="0"/>
+                  <a:t>::Motor*  2 </a:t>
+                </a:r>
+              </a:p>
+            </p:txBody>
+          </p:sp>
+        </p:grpSp>
+      </p:grpSp>
+      <p:cxnSp>
+        <p:nvCxnSpPr>
+          <p:cNvPr id="16" name="Straight Arrow Connector 15"/>
+          <p:cNvCxnSpPr/>
+          <p:nvPr/>
+        </p:nvCxnSpPr>
+        <p:spPr>
+          <a:xfrm>
+            <a:off x="2408138" y="2971800"/>
+            <a:ext cx="1176102" cy="0"/>
+          </a:xfrm>
+          <a:prstGeom prst="straightConnector1">
+            <a:avLst/>
+          </a:prstGeom>
+          <a:ln>
+            <a:tailEnd type="arrow"/>
+          </a:ln>
+        </p:spPr>
+        <p:style>
+          <a:lnRef idx="1">
+            <a:schemeClr val="accent1"/>
+          </a:lnRef>
+          <a:fillRef idx="0">
+            <a:schemeClr val="accent1"/>
+          </a:fillRef>
+          <a:effectRef idx="0">
+            <a:schemeClr val="accent1"/>
+          </a:effectRef>
+          <a:fontRef idx="minor">
+            <a:schemeClr val="tx1"/>
+          </a:fontRef>
+        </p:style>
+      </p:cxnSp>
+      <p:cxnSp>
+        <p:nvCxnSpPr>
+          <p:cNvPr id="54" name="Straight Arrow Connector 53"/>
+          <p:cNvCxnSpPr/>
+          <p:nvPr/>
+        </p:nvCxnSpPr>
+        <p:spPr>
+          <a:xfrm>
+            <a:off x="5181600" y="2971800"/>
+            <a:ext cx="1176102" cy="0"/>
+          </a:xfrm>
+          <a:prstGeom prst="straightConnector1">
+            <a:avLst/>
+          </a:prstGeom>
+          <a:ln>
+            <a:tailEnd type="arrow"/>
+          </a:ln>
+        </p:spPr>
+        <p:style>
+          <a:lnRef idx="1">
+            <a:schemeClr val="accent1"/>
+          </a:lnRef>
+          <a:fillRef idx="0">
+            <a:schemeClr val="accent1"/>
+          </a:fillRef>
+          <a:effectRef idx="0">
+            <a:schemeClr val="accent1"/>
+          </a:effectRef>
+          <a:fontRef idx="minor">
+            <a:schemeClr val="tx1"/>
+          </a:fontRef>
+        </p:style>
+      </p:cxnSp>
+      <p:sp>
+        <p:nvSpPr>
+          <p:cNvPr id="24" name="TextBox 23"/>
+          <p:cNvSpPr txBox="1"/>
+          <p:nvPr/>
+        </p:nvSpPr>
+        <p:spPr>
+          <a:xfrm>
+            <a:off x="285790" y="1600199"/>
+            <a:ext cx="3298450" cy="461665"/>
+          </a:xfrm>
+          <a:prstGeom prst="rect">
+            <a:avLst/>
+          </a:prstGeom>
+          <a:noFill/>
+          <a:ln>
+            <a:solidFill>
+              <a:schemeClr val="bg2">
+                <a:lumMod val="75000"/>
+              </a:schemeClr>
+            </a:solidFill>
+          </a:ln>
+        </p:spPr>
+        <p:txBody>
+          <a:bodyPr wrap="square" rtlCol="0">
+            <a:spAutoFit/>
+          </a:bodyPr>
+          <a:lstStyle/>
+          <a:p>
+            <a:r>
+              <a:rPr lang="en-US" sz="2400" dirty="0" err="1" smtClean="0">
+                <a:solidFill>
+                  <a:schemeClr val="bg2">
+                    <a:lumMod val="50000"/>
+                  </a:schemeClr>
+                </a:solidFill>
+                <a:latin typeface="Cooper Black" panose="0208090404030B020404" pitchFamily="18" charset="0"/>
+              </a:rPr>
+              <a:t>Whisker</a:t>
+            </a:r>
+            <a:r>
+              <a:rPr lang="en-US" sz="2400" dirty="0" err="1" smtClean="0">
+                <a:solidFill>
+                  <a:schemeClr val="bg2">
+                    <a:lumMod val="50000"/>
+                  </a:schemeClr>
+                </a:solidFill>
+                <a:latin typeface="Cooper Black" panose="0208090404030B020404" pitchFamily="18" charset="0"/>
+              </a:rPr>
+              <a:t>_bot.ino</a:t>
+            </a:r>
+            <a:endParaRPr lang="en-US" sz="2400" dirty="0" smtClean="0">
+              <a:solidFill>
+                <a:schemeClr val="bg2">
+                  <a:lumMod val="50000"/>
+                </a:schemeClr>
+              </a:solidFill>
+              <a:latin typeface="Cooper Black" panose="0208090404030B020404" pitchFamily="18" charset="0"/>
+            </a:endParaRPr>
+          </a:p>
+        </p:txBody>
+      </p:sp>
+    </p:spTree>
+    <p:extLst>
+      <p:ext uri="{BB962C8B-B14F-4D97-AF65-F5344CB8AC3E}">
+        <p14:creationId xmlns:p14="http://schemas.microsoft.com/office/powerpoint/2010/main" val="271953676"/>
       </p:ext>
     </p:extLst>
   </p:cSld>

</xml_diff>

<commit_message>
troubleshooting light plant with whiskers
</commit_message>
<xml_diff>
--- a/System_diagrams.pptx
+++ b/System_diagrams.pptx
@@ -8,6 +8,7 @@
     <p:sldId id="257" r:id="rId2"/>
     <p:sldId id="258" r:id="rId3"/>
     <p:sldId id="259" r:id="rId4"/>
+    <p:sldId id="260" r:id="rId5"/>
   </p:sldIdLst>
   <p:sldSz cx="9144000" cy="6858000" type="screen4x3"/>
   <p:notesSz cx="6894513" cy="9180513"/>
@@ -4804,11 +4805,7 @@
           <a:p>
             <a:r>
               <a:rPr lang="en-US" dirty="0" smtClean="0"/>
-              <a:t>ALFRED: </a:t>
-            </a:r>
-            <a:r>
-              <a:rPr lang="en-US" dirty="0" smtClean="0"/>
-              <a:t>Scan and Wander</a:t>
+              <a:t>ALFRED: Scan and Wander</a:t>
             </a:r>
             <a:endParaRPr lang="en-US" dirty="0"/>
           </a:p>
@@ -4853,11 +4850,7 @@
               <a:pPr algn="ctr"/>
               <a:r>
                 <a:rPr lang="en-US" sz="1200" b="1" dirty="0" err="1" smtClean="0"/>
-                <a:t>Whisker</a:t>
-              </a:r>
-              <a:r>
-                <a:rPr lang="en-US" sz="1200" b="1" dirty="0" err="1" smtClean="0"/>
-                <a:t>_controller</a:t>
+                <a:t>Whisker_controller</a:t>
               </a:r>
               <a:endParaRPr lang="en-US" sz="1200" b="1" dirty="0" smtClean="0"/>
             </a:p>
@@ -5009,7 +5002,6 @@
               <a:rPr lang="en-US" sz="1200" dirty="0" smtClean="0"/>
               <a:t>The Scanner_5pt block hides the implementation and control details for controlling the scan.</a:t>
             </a:r>
-            <a:endParaRPr lang="en-US" sz="1200" dirty="0" smtClean="0"/>
           </a:p>
         </p:txBody>
       </p:sp>
@@ -5054,7 +5046,6 @@
                 <a:rPr lang="en-US" sz="1200" b="1" dirty="0" smtClean="0"/>
                 <a:t>Scanner_5pt</a:t>
               </a:r>
-              <a:endParaRPr lang="en-US" sz="1200" b="1" dirty="0" smtClean="0"/>
             </a:p>
           </p:txBody>
         </p:sp>
@@ -5185,7 +5176,6 @@
                   <a:rPr lang="en-US" sz="1100" i="1" dirty="0" smtClean="0"/>
                   <a:t>Parallax PING))) x 1</a:t>
                 </a:r>
-                <a:endParaRPr lang="en-US" sz="1100" i="1" dirty="0" smtClean="0"/>
               </a:p>
             </p:txBody>
           </p:sp>
@@ -5462,8 +5452,579 @@
                 </a:solidFill>
                 <a:latin typeface="Cooper Black" panose="0208090404030B020404" pitchFamily="18" charset="0"/>
               </a:rPr>
-              <a:t>Whisker</a:t>
-            </a:r>
+              <a:t>Whisker_bot.ino</a:t>
+            </a:r>
+            <a:endParaRPr lang="en-US" sz="2400" dirty="0" smtClean="0">
+              <a:solidFill>
+                <a:schemeClr val="bg2">
+                  <a:lumMod val="50000"/>
+                </a:schemeClr>
+              </a:solidFill>
+              <a:latin typeface="Cooper Black" panose="0208090404030B020404" pitchFamily="18" charset="0"/>
+            </a:endParaRPr>
+          </a:p>
+        </p:txBody>
+      </p:sp>
+    </p:spTree>
+    <p:extLst>
+      <p:ext uri="{BB962C8B-B14F-4D97-AF65-F5344CB8AC3E}">
+        <p14:creationId xmlns:p14="http://schemas.microsoft.com/office/powerpoint/2010/main" val="271953676"/>
+      </p:ext>
+    </p:extLst>
+  </p:cSld>
+  <p:clrMapOvr>
+    <a:masterClrMapping/>
+  </p:clrMapOvr>
+</p:sld>
+</file>
+
+<file path=ppt/slides/slide4.xml><?xml version="1.0" encoding="utf-8"?>
+<p:sld xmlns:a="http://schemas.openxmlformats.org/drawingml/2006/main" xmlns:r="http://schemas.openxmlformats.org/officeDocument/2006/relationships" xmlns:p="http://schemas.openxmlformats.org/presentationml/2006/main">
+  <p:cSld>
+    <p:spTree>
+      <p:nvGrpSpPr>
+        <p:cNvPr id="1" name=""/>
+        <p:cNvGrpSpPr/>
+        <p:nvPr/>
+      </p:nvGrpSpPr>
+      <p:grpSpPr>
+        <a:xfrm>
+          <a:off x="0" y="0"/>
+          <a:ext cx="0" cy="0"/>
+          <a:chOff x="0" y="0"/>
+          <a:chExt cx="0" cy="0"/>
+        </a:xfrm>
+      </p:grpSpPr>
+      <p:sp>
+        <p:nvSpPr>
+          <p:cNvPr id="72" name="Title 71"/>
+          <p:cNvSpPr>
+            <a:spLocks noGrp="1"/>
+          </p:cNvSpPr>
+          <p:nvPr>
+            <p:ph type="title"/>
+          </p:nvPr>
+        </p:nvSpPr>
+        <p:spPr>
+          <a:xfrm>
+            <a:off x="457200" y="76200"/>
+            <a:ext cx="8229600" cy="1143000"/>
+          </a:xfrm>
+        </p:spPr>
+        <p:txBody>
+          <a:bodyPr/>
+          <a:lstStyle/>
+          <a:p>
+            <a:r>
+              <a:rPr lang="en-US" dirty="0" smtClean="0"/>
+              <a:t>ALFRED: </a:t>
+            </a:r>
+            <a:r>
+              <a:rPr lang="en-US" dirty="0" smtClean="0"/>
+              <a:t>Scan, Bump and </a:t>
+            </a:r>
+            <a:r>
+              <a:rPr lang="en-US" dirty="0" smtClean="0"/>
+              <a:t>Wander</a:t>
+            </a:r>
+            <a:endParaRPr lang="en-US" dirty="0"/>
+          </a:p>
+        </p:txBody>
+      </p:sp>
+      <p:sp>
+        <p:nvSpPr>
+          <p:cNvPr id="108" name="TextBox 107"/>
+          <p:cNvSpPr txBox="1"/>
+          <p:nvPr/>
+        </p:nvSpPr>
+        <p:spPr>
+          <a:xfrm>
+            <a:off x="913410" y="4953000"/>
+            <a:ext cx="3429001" cy="1200329"/>
+          </a:xfrm>
+          <a:prstGeom prst="rect">
+            <a:avLst/>
+          </a:prstGeom>
+          <a:noFill/>
+          <a:ln>
+            <a:solidFill>
+              <a:schemeClr val="bg2">
+                <a:lumMod val="50000"/>
+              </a:schemeClr>
+            </a:solidFill>
+          </a:ln>
+        </p:spPr>
+        <p:txBody>
+          <a:bodyPr wrap="square" rtlCol="0">
+            <a:spAutoFit/>
+          </a:bodyPr>
+          <a:lstStyle/>
+          <a:p>
+            <a:r>
+              <a:rPr lang="en-US" sz="1200" dirty="0" smtClean="0"/>
+              <a:t>NOTES:</a:t>
+            </a:r>
+          </a:p>
+          <a:p>
+            <a:pPr marL="171450" indent="-171450">
+              <a:buFontTx/>
+              <a:buChar char="-"/>
+            </a:pPr>
+            <a:r>
+              <a:rPr lang="en-US" sz="1200" dirty="0" smtClean="0"/>
+              <a:t>This bot implements obstacle avoidance by rotating an ultrasonic sensor with an attached servo.  </a:t>
+            </a:r>
+          </a:p>
+          <a:p>
+            <a:pPr marL="171450" indent="-171450">
+              <a:buFontTx/>
+              <a:buChar char="-"/>
+            </a:pPr>
+            <a:r>
+              <a:rPr lang="en-US" sz="1200" dirty="0" smtClean="0"/>
+              <a:t>The Scanner_5pt block hides the implementation and control details for controlling the scan.</a:t>
+            </a:r>
+          </a:p>
+        </p:txBody>
+      </p:sp>
+      <p:grpSp>
+        <p:nvGrpSpPr>
+          <p:cNvPr id="21" name="Group 20"/>
+          <p:cNvGrpSpPr/>
+          <p:nvPr/>
+        </p:nvGrpSpPr>
+        <p:grpSpPr>
+          <a:xfrm>
+            <a:off x="838200" y="3048000"/>
+            <a:ext cx="1638381" cy="1277618"/>
+            <a:chOff x="838200" y="2615714"/>
+            <a:chExt cx="1638381" cy="1277618"/>
+          </a:xfrm>
+        </p:grpSpPr>
+        <p:sp>
+          <p:nvSpPr>
+            <p:cNvPr id="42" name="TextBox 41"/>
+            <p:cNvSpPr txBox="1"/>
+            <p:nvPr/>
+          </p:nvSpPr>
+          <p:spPr>
+            <a:xfrm>
+              <a:off x="1017310" y="3581400"/>
+              <a:ext cx="1280160" cy="274320"/>
+            </a:xfrm>
+            <a:prstGeom prst="rect">
+              <a:avLst/>
+            </a:prstGeom>
+            <a:noFill/>
+          </p:spPr>
+          <p:txBody>
+            <a:bodyPr wrap="square" rtlCol="0">
+              <a:spAutoFit/>
+            </a:bodyPr>
+            <a:lstStyle/>
+            <a:p>
+              <a:pPr algn="ctr"/>
+              <a:r>
+                <a:rPr lang="en-US" sz="1200" b="1" dirty="0" smtClean="0"/>
+                <a:t>Scanner_5pt</a:t>
+              </a:r>
+            </a:p>
+          </p:txBody>
+        </p:sp>
+        <p:grpSp>
+          <p:nvGrpSpPr>
+            <p:cNvPr id="18" name="Group 17"/>
+            <p:cNvGrpSpPr/>
+            <p:nvPr/>
+          </p:nvGrpSpPr>
+          <p:grpSpPr>
+            <a:xfrm>
+              <a:off x="838200" y="2615714"/>
+              <a:ext cx="1638381" cy="1277618"/>
+              <a:chOff x="838200" y="2615714"/>
+              <a:chExt cx="1638381" cy="1277618"/>
+            </a:xfrm>
+          </p:grpSpPr>
+          <p:sp>
+            <p:nvSpPr>
+              <p:cNvPr id="41" name="Rectangle 40"/>
+              <p:cNvSpPr/>
+              <p:nvPr/>
+            </p:nvSpPr>
+            <p:spPr>
+              <a:xfrm>
+                <a:off x="838200" y="2615714"/>
+                <a:ext cx="1569938" cy="1277618"/>
+              </a:xfrm>
+              <a:prstGeom prst="rect">
+                <a:avLst/>
+              </a:prstGeom>
+              <a:noFill/>
+            </p:spPr>
+            <p:style>
+              <a:lnRef idx="2">
+                <a:schemeClr val="accent1">
+                  <a:shade val="50000"/>
+                </a:schemeClr>
+              </a:lnRef>
+              <a:fillRef idx="1">
+                <a:schemeClr val="accent1"/>
+              </a:fillRef>
+              <a:effectRef idx="0">
+                <a:schemeClr val="accent1"/>
+              </a:effectRef>
+              <a:fontRef idx="minor">
+                <a:schemeClr val="lt1"/>
+              </a:fontRef>
+            </p:style>
+            <p:txBody>
+              <a:bodyPr rot="0" spcFirstLastPara="0" vertOverflow="overflow" horzOverflow="overflow" vert="horz" wrap="square" lIns="91440" tIns="45720" rIns="91440" bIns="45720" numCol="1" spcCol="0" rtlCol="0" fromWordArt="0" anchor="ctr" anchorCtr="0" forceAA="0" compatLnSpc="1">
+                <a:prstTxWarp prst="textNoShape">
+                  <a:avLst/>
+                </a:prstTxWarp>
+                <a:noAutofit/>
+              </a:bodyPr>
+              <a:lstStyle/>
+              <a:p>
+                <a:pPr algn="ctr"/>
+                <a:endParaRPr lang="en-US"/>
+              </a:p>
+            </p:txBody>
+          </p:sp>
+          <p:sp>
+            <p:nvSpPr>
+              <p:cNvPr id="43" name="TextBox 42"/>
+              <p:cNvSpPr txBox="1"/>
+              <p:nvPr/>
+            </p:nvSpPr>
+            <p:spPr>
+              <a:xfrm>
+                <a:off x="1006736" y="2806600"/>
+                <a:ext cx="1469845" cy="276999"/>
+              </a:xfrm>
+              <a:prstGeom prst="rect">
+                <a:avLst/>
+              </a:prstGeom>
+              <a:noFill/>
+            </p:spPr>
+            <p:txBody>
+              <a:bodyPr wrap="square" rtlCol="0">
+                <a:spAutoFit/>
+              </a:bodyPr>
+              <a:lstStyle/>
+              <a:p>
+                <a:pPr algn="r"/>
+                <a:r>
+                  <a:rPr lang="en-US" sz="1200" dirty="0" err="1" smtClean="0"/>
+                  <a:t>Five_pt_scan_msg</a:t>
+                </a:r>
+                <a:endParaRPr lang="en-US" sz="1200" dirty="0" smtClean="0"/>
+              </a:p>
+            </p:txBody>
+          </p:sp>
+          <p:sp>
+            <p:nvSpPr>
+              <p:cNvPr id="111" name="TextBox 110"/>
+              <p:cNvSpPr txBox="1"/>
+              <p:nvPr/>
+            </p:nvSpPr>
+            <p:spPr>
+              <a:xfrm>
+                <a:off x="926709" y="3130118"/>
+                <a:ext cx="1392920" cy="430887"/>
+              </a:xfrm>
+              <a:prstGeom prst="rect">
+                <a:avLst/>
+              </a:prstGeom>
+              <a:noFill/>
+            </p:spPr>
+            <p:txBody>
+              <a:bodyPr wrap="square" rtlCol="0">
+                <a:spAutoFit/>
+              </a:bodyPr>
+              <a:lstStyle/>
+              <a:p>
+                <a:r>
+                  <a:rPr lang="en-US" sz="1100" i="1" dirty="0" err="1" smtClean="0"/>
+                  <a:t>Servo.h</a:t>
+                </a:r>
+                <a:r>
+                  <a:rPr lang="en-US" sz="1100" i="1" dirty="0" smtClean="0"/>
+                  <a:t> x2</a:t>
+                </a:r>
+              </a:p>
+              <a:p>
+                <a:r>
+                  <a:rPr lang="en-US" sz="1100" i="1" dirty="0" smtClean="0"/>
+                  <a:t>Parallax PING))) x 1</a:t>
+                </a:r>
+              </a:p>
+            </p:txBody>
+          </p:sp>
+        </p:grpSp>
+      </p:grpSp>
+      <p:sp>
+        <p:nvSpPr>
+          <p:cNvPr id="13" name="TextBox 12"/>
+          <p:cNvSpPr txBox="1"/>
+          <p:nvPr/>
+        </p:nvSpPr>
+        <p:spPr>
+          <a:xfrm>
+            <a:off x="7013678" y="3392395"/>
+            <a:ext cx="954977" cy="276999"/>
+          </a:xfrm>
+          <a:prstGeom prst="rect">
+            <a:avLst/>
+          </a:prstGeom>
+          <a:noFill/>
+        </p:spPr>
+        <p:txBody>
+          <a:bodyPr wrap="square" rtlCol="0">
+            <a:spAutoFit/>
+          </a:bodyPr>
+          <a:lstStyle/>
+          <a:p>
+            <a:pPr algn="r"/>
+            <a:endParaRPr lang="en-US" sz="1200" dirty="0" smtClean="0"/>
+          </a:p>
+        </p:txBody>
+      </p:sp>
+      <p:grpSp>
+        <p:nvGrpSpPr>
+          <p:cNvPr id="2" name="Group 1"/>
+          <p:cNvGrpSpPr/>
+          <p:nvPr/>
+        </p:nvGrpSpPr>
+        <p:grpSpPr>
+          <a:xfrm>
+            <a:off x="6344101" y="3048000"/>
+            <a:ext cx="1569936" cy="1277617"/>
+            <a:chOff x="6344101" y="2591909"/>
+            <a:chExt cx="1569936" cy="1277617"/>
+          </a:xfrm>
+        </p:grpSpPr>
+        <p:sp>
+          <p:nvSpPr>
+            <p:cNvPr id="9" name="TextBox 8"/>
+            <p:cNvSpPr txBox="1"/>
+            <p:nvPr/>
+          </p:nvSpPr>
+          <p:spPr>
+            <a:xfrm>
+              <a:off x="6488989" y="3581400"/>
+              <a:ext cx="1280160" cy="274320"/>
+            </a:xfrm>
+            <a:prstGeom prst="rect">
+              <a:avLst/>
+            </a:prstGeom>
+            <a:noFill/>
+          </p:spPr>
+          <p:txBody>
+            <a:bodyPr wrap="square" rtlCol="0">
+              <a:spAutoFit/>
+            </a:bodyPr>
+            <a:lstStyle/>
+            <a:p>
+              <a:pPr algn="ctr"/>
+              <a:r>
+                <a:rPr lang="en-US" sz="1200" b="1" dirty="0" err="1" smtClean="0"/>
+                <a:t>Rover_plant</a:t>
+              </a:r>
+              <a:endParaRPr lang="en-US" sz="1200" b="1" dirty="0" smtClean="0"/>
+            </a:p>
+          </p:txBody>
+        </p:sp>
+        <p:grpSp>
+          <p:nvGrpSpPr>
+            <p:cNvPr id="22" name="Group 21"/>
+            <p:cNvGrpSpPr/>
+            <p:nvPr/>
+          </p:nvGrpSpPr>
+          <p:grpSpPr>
+            <a:xfrm>
+              <a:off x="6344101" y="2591909"/>
+              <a:ext cx="1569936" cy="1277617"/>
+              <a:chOff x="6338034" y="2591909"/>
+              <a:chExt cx="1569936" cy="1277617"/>
+            </a:xfrm>
+          </p:grpSpPr>
+          <p:sp>
+            <p:nvSpPr>
+              <p:cNvPr id="6" name="Rectangle 5"/>
+              <p:cNvSpPr/>
+              <p:nvPr/>
+            </p:nvSpPr>
+            <p:spPr>
+              <a:xfrm>
+                <a:off x="6338034" y="2591909"/>
+                <a:ext cx="1569936" cy="1277617"/>
+              </a:xfrm>
+              <a:prstGeom prst="rect">
+                <a:avLst/>
+              </a:prstGeom>
+              <a:noFill/>
+            </p:spPr>
+            <p:style>
+              <a:lnRef idx="2">
+                <a:schemeClr val="accent1">
+                  <a:shade val="50000"/>
+                </a:schemeClr>
+              </a:lnRef>
+              <a:fillRef idx="1">
+                <a:schemeClr val="accent1"/>
+              </a:fillRef>
+              <a:effectRef idx="0">
+                <a:schemeClr val="accent1"/>
+              </a:effectRef>
+              <a:fontRef idx="minor">
+                <a:schemeClr val="lt1"/>
+              </a:fontRef>
+            </p:style>
+            <p:txBody>
+              <a:bodyPr rot="0" spcFirstLastPara="0" vertOverflow="overflow" horzOverflow="overflow" vert="horz" wrap="square" lIns="91440" tIns="45720" rIns="91440" bIns="45720" numCol="1" spcCol="0" rtlCol="0" fromWordArt="0" anchor="ctr" anchorCtr="0" forceAA="0" compatLnSpc="1">
+                <a:prstTxWarp prst="textNoShape">
+                  <a:avLst/>
+                </a:prstTxWarp>
+                <a:noAutofit/>
+              </a:bodyPr>
+              <a:lstStyle/>
+              <a:p>
+                <a:pPr algn="ctr"/>
+                <a:endParaRPr lang="en-US"/>
+              </a:p>
+            </p:txBody>
+          </p:sp>
+          <p:sp>
+            <p:nvSpPr>
+              <p:cNvPr id="38" name="TextBox 37"/>
+              <p:cNvSpPr txBox="1"/>
+              <p:nvPr/>
+            </p:nvSpPr>
+            <p:spPr>
+              <a:xfrm>
+                <a:off x="6382054" y="3091190"/>
+                <a:ext cx="1392920" cy="261610"/>
+              </a:xfrm>
+              <a:prstGeom prst="rect">
+                <a:avLst/>
+              </a:prstGeom>
+              <a:noFill/>
+            </p:spPr>
+            <p:txBody>
+              <a:bodyPr wrap="square" rtlCol="0">
+                <a:spAutoFit/>
+              </a:bodyPr>
+              <a:lstStyle/>
+              <a:p>
+                <a:r>
+                  <a:rPr lang="en-US" sz="1100" i="1" dirty="0" err="1" smtClean="0"/>
+                  <a:t>gw</a:t>
+                </a:r>
+                <a:r>
+                  <a:rPr lang="en-US" sz="1100" i="1" dirty="0" smtClean="0"/>
+                  <a:t>::Motor*  2 </a:t>
+                </a:r>
+              </a:p>
+            </p:txBody>
+          </p:sp>
+        </p:grpSp>
+      </p:grpSp>
+      <p:cxnSp>
+        <p:nvCxnSpPr>
+          <p:cNvPr id="16" name="Straight Arrow Connector 15"/>
+          <p:cNvCxnSpPr/>
+          <p:nvPr/>
+        </p:nvCxnSpPr>
+        <p:spPr>
+          <a:xfrm>
+            <a:off x="2408138" y="3398142"/>
+            <a:ext cx="1176102" cy="0"/>
+          </a:xfrm>
+          <a:prstGeom prst="straightConnector1">
+            <a:avLst/>
+          </a:prstGeom>
+          <a:ln>
+            <a:tailEnd type="arrow"/>
+          </a:ln>
+        </p:spPr>
+        <p:style>
+          <a:lnRef idx="1">
+            <a:schemeClr val="accent1"/>
+          </a:lnRef>
+          <a:fillRef idx="0">
+            <a:schemeClr val="accent1"/>
+          </a:fillRef>
+          <a:effectRef idx="0">
+            <a:schemeClr val="accent1"/>
+          </a:effectRef>
+          <a:fontRef idx="minor">
+            <a:schemeClr val="tx1"/>
+          </a:fontRef>
+        </p:style>
+      </p:cxnSp>
+      <p:cxnSp>
+        <p:nvCxnSpPr>
+          <p:cNvPr id="54" name="Straight Arrow Connector 53"/>
+          <p:cNvCxnSpPr/>
+          <p:nvPr/>
+        </p:nvCxnSpPr>
+        <p:spPr>
+          <a:xfrm>
+            <a:off x="5181600" y="3581400"/>
+            <a:ext cx="1176102" cy="0"/>
+          </a:xfrm>
+          <a:prstGeom prst="straightConnector1">
+            <a:avLst/>
+          </a:prstGeom>
+          <a:ln>
+            <a:tailEnd type="arrow"/>
+          </a:ln>
+        </p:spPr>
+        <p:style>
+          <a:lnRef idx="1">
+            <a:schemeClr val="accent1"/>
+          </a:lnRef>
+          <a:fillRef idx="0">
+            <a:schemeClr val="accent1"/>
+          </a:fillRef>
+          <a:effectRef idx="0">
+            <a:schemeClr val="accent1"/>
+          </a:effectRef>
+          <a:fontRef idx="minor">
+            <a:schemeClr val="tx1"/>
+          </a:fontRef>
+        </p:style>
+      </p:cxnSp>
+      <p:sp>
+        <p:nvSpPr>
+          <p:cNvPr id="24" name="TextBox 23"/>
+          <p:cNvSpPr txBox="1"/>
+          <p:nvPr/>
+        </p:nvSpPr>
+        <p:spPr>
+          <a:xfrm>
+            <a:off x="285790" y="1600199"/>
+            <a:ext cx="3298450" cy="461665"/>
+          </a:xfrm>
+          <a:prstGeom prst="rect">
+            <a:avLst/>
+          </a:prstGeom>
+          <a:noFill/>
+          <a:ln>
+            <a:solidFill>
+              <a:schemeClr val="bg2">
+                <a:lumMod val="75000"/>
+              </a:schemeClr>
+            </a:solidFill>
+          </a:ln>
+        </p:spPr>
+        <p:txBody>
+          <a:bodyPr wrap="square" rtlCol="0">
+            <a:spAutoFit/>
+          </a:bodyPr>
+          <a:lstStyle/>
+          <a:p>
             <a:r>
               <a:rPr lang="en-US" sz="2400" dirty="0" err="1" smtClean="0">
                 <a:solidFill>
@@ -5473,7 +6034,7 @@
                 </a:solidFill>
                 <a:latin typeface="Cooper Black" panose="0208090404030B020404" pitchFamily="18" charset="0"/>
               </a:rPr>
-              <a:t>_bot.ino</a:t>
+              <a:t>Whisker_bot.ino</a:t>
             </a:r>
             <a:endParaRPr lang="en-US" sz="2400" dirty="0" smtClean="0">
               <a:solidFill>
@@ -5486,10 +6047,408 @@
           </a:p>
         </p:txBody>
       </p:sp>
+      <p:grpSp>
+        <p:nvGrpSpPr>
+          <p:cNvPr id="25" name="Group 24"/>
+          <p:cNvGrpSpPr/>
+          <p:nvPr/>
+        </p:nvGrpSpPr>
+        <p:grpSpPr>
+          <a:xfrm>
+            <a:off x="3581400" y="3048000"/>
+            <a:ext cx="1587715" cy="1284728"/>
+            <a:chOff x="3584240" y="2600379"/>
+            <a:chExt cx="1596794" cy="1297567"/>
+          </a:xfrm>
+        </p:grpSpPr>
+        <p:sp>
+          <p:nvSpPr>
+            <p:cNvPr id="26" name="TextBox 25"/>
+            <p:cNvSpPr txBox="1"/>
+            <p:nvPr/>
+          </p:nvSpPr>
+          <p:spPr>
+            <a:xfrm>
+              <a:off x="3737511" y="3431667"/>
+              <a:ext cx="1309877" cy="466279"/>
+            </a:xfrm>
+            <a:prstGeom prst="rect">
+              <a:avLst/>
+            </a:prstGeom>
+            <a:noFill/>
+          </p:spPr>
+          <p:txBody>
+            <a:bodyPr wrap="square" rtlCol="0">
+              <a:spAutoFit/>
+            </a:bodyPr>
+            <a:lstStyle/>
+            <a:p>
+              <a:pPr algn="ctr"/>
+              <a:r>
+                <a:rPr lang="en-US" sz="1200" b="1" dirty="0" err="1" smtClean="0"/>
+                <a:t>Whisker_bumper</a:t>
+              </a:r>
+              <a:r>
+                <a:rPr lang="en-US" sz="1200" b="1" dirty="0" err="1" smtClean="0"/>
+                <a:t>controller</a:t>
+              </a:r>
+              <a:endParaRPr lang="en-US" sz="1200" b="1" dirty="0" smtClean="0"/>
+            </a:p>
+          </p:txBody>
+        </p:sp>
+        <p:grpSp>
+          <p:nvGrpSpPr>
+            <p:cNvPr id="27" name="Group 26"/>
+            <p:cNvGrpSpPr/>
+            <p:nvPr/>
+          </p:nvGrpSpPr>
+          <p:grpSpPr>
+            <a:xfrm>
+              <a:off x="3584240" y="2600379"/>
+              <a:ext cx="1596794" cy="1277619"/>
+              <a:chOff x="3584240" y="2600379"/>
+              <a:chExt cx="1596794" cy="1277619"/>
+            </a:xfrm>
+          </p:grpSpPr>
+          <p:sp>
+            <p:nvSpPr>
+              <p:cNvPr id="28" name="Rectangle 27"/>
+              <p:cNvSpPr/>
+              <p:nvPr/>
+            </p:nvSpPr>
+            <p:spPr>
+              <a:xfrm>
+                <a:off x="3584240" y="2600379"/>
+                <a:ext cx="1569936" cy="1277619"/>
+              </a:xfrm>
+              <a:prstGeom prst="rect">
+                <a:avLst/>
+              </a:prstGeom>
+              <a:noFill/>
+            </p:spPr>
+            <p:style>
+              <a:lnRef idx="2">
+                <a:schemeClr val="accent1">
+                  <a:shade val="50000"/>
+                </a:schemeClr>
+              </a:lnRef>
+              <a:fillRef idx="1">
+                <a:schemeClr val="accent1"/>
+              </a:fillRef>
+              <a:effectRef idx="0">
+                <a:schemeClr val="accent1"/>
+              </a:effectRef>
+              <a:fontRef idx="minor">
+                <a:schemeClr val="lt1"/>
+              </a:fontRef>
+            </p:style>
+            <p:txBody>
+              <a:bodyPr rot="0" spcFirstLastPara="0" vertOverflow="overflow" horzOverflow="overflow" vert="horz" wrap="square" lIns="91440" tIns="45720" rIns="91440" bIns="45720" numCol="1" spcCol="0" rtlCol="0" fromWordArt="0" anchor="ctr" anchorCtr="0" forceAA="0" compatLnSpc="1">
+                <a:prstTxWarp prst="textNoShape">
+                  <a:avLst/>
+                </a:prstTxWarp>
+                <a:noAutofit/>
+              </a:bodyPr>
+              <a:lstStyle/>
+              <a:p>
+                <a:pPr algn="ctr"/>
+                <a:endParaRPr lang="en-US"/>
+              </a:p>
+            </p:txBody>
+          </p:sp>
+          <p:sp>
+            <p:nvSpPr>
+              <p:cNvPr id="29" name="TextBox 28"/>
+              <p:cNvSpPr txBox="1"/>
+              <p:nvPr/>
+            </p:nvSpPr>
+            <p:spPr>
+              <a:xfrm>
+                <a:off x="3760312" y="2791265"/>
+                <a:ext cx="1420722" cy="461665"/>
+              </a:xfrm>
+              <a:prstGeom prst="rect">
+                <a:avLst/>
+              </a:prstGeom>
+              <a:noFill/>
+            </p:spPr>
+            <p:txBody>
+              <a:bodyPr wrap="square" rtlCol="0">
+                <a:spAutoFit/>
+              </a:bodyPr>
+              <a:lstStyle/>
+              <a:p>
+                <a:pPr algn="r"/>
+                <a:r>
+                  <a:rPr lang="en-US" sz="1200" dirty="0" err="1" smtClean="0"/>
+                  <a:t>Cmd_led_msg</a:t>
+                </a:r>
+                <a:endParaRPr lang="en-US" sz="1200" dirty="0" smtClean="0"/>
+              </a:p>
+              <a:p>
+                <a:pPr algn="r"/>
+                <a:r>
+                  <a:rPr lang="en-US" sz="1200" dirty="0" err="1" smtClean="0"/>
+                  <a:t>Cmd_velocity_msg</a:t>
+                </a:r>
+                <a:endParaRPr lang="en-US" sz="1200" dirty="0" smtClean="0"/>
+              </a:p>
+            </p:txBody>
+          </p:sp>
+        </p:grpSp>
+      </p:grpSp>
+      <p:grpSp>
+        <p:nvGrpSpPr>
+          <p:cNvPr id="30" name="Group 29"/>
+          <p:cNvGrpSpPr/>
+          <p:nvPr/>
+        </p:nvGrpSpPr>
+        <p:grpSpPr>
+          <a:xfrm>
+            <a:off x="6352024" y="1524000"/>
+            <a:ext cx="1569936" cy="1277617"/>
+            <a:chOff x="6344101" y="3118177"/>
+            <a:chExt cx="1569936" cy="1277617"/>
+          </a:xfrm>
+        </p:grpSpPr>
+        <p:sp>
+          <p:nvSpPr>
+            <p:cNvPr id="31" name="TextBox 30"/>
+            <p:cNvSpPr txBox="1"/>
+            <p:nvPr/>
+          </p:nvSpPr>
+          <p:spPr>
+            <a:xfrm>
+              <a:off x="6488989" y="4107668"/>
+              <a:ext cx="1280160" cy="274320"/>
+            </a:xfrm>
+            <a:prstGeom prst="rect">
+              <a:avLst/>
+            </a:prstGeom>
+            <a:noFill/>
+          </p:spPr>
+          <p:txBody>
+            <a:bodyPr wrap="square" rtlCol="0">
+              <a:spAutoFit/>
+            </a:bodyPr>
+            <a:lstStyle/>
+            <a:p>
+              <a:pPr algn="ctr"/>
+              <a:r>
+                <a:rPr lang="en-US" sz="1200" b="1" dirty="0" err="1" smtClean="0"/>
+                <a:t>Light_plant</a:t>
+              </a:r>
+              <a:endParaRPr lang="en-US" sz="1200" b="1" dirty="0" smtClean="0"/>
+            </a:p>
+          </p:txBody>
+        </p:sp>
+        <p:grpSp>
+          <p:nvGrpSpPr>
+            <p:cNvPr id="32" name="Group 31"/>
+            <p:cNvGrpSpPr/>
+            <p:nvPr/>
+          </p:nvGrpSpPr>
+          <p:grpSpPr>
+            <a:xfrm>
+              <a:off x="6344101" y="3118177"/>
+              <a:ext cx="1569936" cy="1277617"/>
+              <a:chOff x="6338034" y="2591909"/>
+              <a:chExt cx="1569936" cy="1277617"/>
+            </a:xfrm>
+          </p:grpSpPr>
+          <p:sp>
+            <p:nvSpPr>
+              <p:cNvPr id="33" name="Rectangle 32"/>
+              <p:cNvSpPr/>
+              <p:nvPr/>
+            </p:nvSpPr>
+            <p:spPr>
+              <a:xfrm>
+                <a:off x="6338034" y="2591909"/>
+                <a:ext cx="1569936" cy="1277617"/>
+              </a:xfrm>
+              <a:prstGeom prst="rect">
+                <a:avLst/>
+              </a:prstGeom>
+              <a:noFill/>
+            </p:spPr>
+            <p:style>
+              <a:lnRef idx="2">
+                <a:schemeClr val="accent1">
+                  <a:shade val="50000"/>
+                </a:schemeClr>
+              </a:lnRef>
+              <a:fillRef idx="1">
+                <a:schemeClr val="accent1"/>
+              </a:fillRef>
+              <a:effectRef idx="0">
+                <a:schemeClr val="accent1"/>
+              </a:effectRef>
+              <a:fontRef idx="minor">
+                <a:schemeClr val="lt1"/>
+              </a:fontRef>
+            </p:style>
+            <p:txBody>
+              <a:bodyPr rot="0" spcFirstLastPara="0" vertOverflow="overflow" horzOverflow="overflow" vert="horz" wrap="square" lIns="91440" tIns="45720" rIns="91440" bIns="45720" numCol="1" spcCol="0" rtlCol="0" fromWordArt="0" anchor="ctr" anchorCtr="0" forceAA="0" compatLnSpc="1">
+                <a:prstTxWarp prst="textNoShape">
+                  <a:avLst/>
+                </a:prstTxWarp>
+                <a:noAutofit/>
+              </a:bodyPr>
+              <a:lstStyle/>
+              <a:p>
+                <a:pPr algn="ctr"/>
+                <a:endParaRPr lang="en-US"/>
+              </a:p>
+            </p:txBody>
+          </p:sp>
+          <p:sp>
+            <p:nvSpPr>
+              <p:cNvPr id="34" name="TextBox 33"/>
+              <p:cNvSpPr txBox="1"/>
+              <p:nvPr/>
+            </p:nvSpPr>
+            <p:spPr>
+              <a:xfrm>
+                <a:off x="6382054" y="3091190"/>
+                <a:ext cx="1392920" cy="261610"/>
+              </a:xfrm>
+              <a:prstGeom prst="rect">
+                <a:avLst/>
+              </a:prstGeom>
+              <a:noFill/>
+            </p:spPr>
+            <p:txBody>
+              <a:bodyPr wrap="square" rtlCol="0">
+                <a:spAutoFit/>
+              </a:bodyPr>
+              <a:lstStyle/>
+              <a:p>
+                <a:r>
+                  <a:rPr lang="en-US" sz="1100" i="1" dirty="0" err="1" smtClean="0"/>
+                  <a:t>gw</a:t>
+                </a:r>
+                <a:r>
+                  <a:rPr lang="en-US" sz="1100" i="1" dirty="0" smtClean="0"/>
+                  <a:t>::Led*  5 </a:t>
+                </a:r>
+              </a:p>
+            </p:txBody>
+          </p:sp>
+        </p:grpSp>
+      </p:grpSp>
+      <p:grpSp>
+        <p:nvGrpSpPr>
+          <p:cNvPr id="35" name="Group 34"/>
+          <p:cNvGrpSpPr/>
+          <p:nvPr/>
+        </p:nvGrpSpPr>
+        <p:grpSpPr>
+          <a:xfrm>
+            <a:off x="5174007" y="1878456"/>
+            <a:ext cx="1170424" cy="1535430"/>
+            <a:chOff x="5154176" y="1912132"/>
+            <a:chExt cx="1170424" cy="1535430"/>
+          </a:xfrm>
+        </p:grpSpPr>
+        <p:cxnSp>
+          <p:nvCxnSpPr>
+            <p:cNvPr id="36" name="Straight Connector 35"/>
+            <p:cNvCxnSpPr/>
+            <p:nvPr/>
+          </p:nvCxnSpPr>
+          <p:spPr>
+            <a:xfrm flipV="1">
+              <a:off x="5638800" y="1912132"/>
+              <a:ext cx="0" cy="1535430"/>
+            </a:xfrm>
+            <a:prstGeom prst="line">
+              <a:avLst/>
+            </a:prstGeom>
+          </p:spPr>
+          <p:style>
+            <a:lnRef idx="1">
+              <a:schemeClr val="accent1"/>
+            </a:lnRef>
+            <a:fillRef idx="0">
+              <a:schemeClr val="accent1"/>
+            </a:fillRef>
+            <a:effectRef idx="0">
+              <a:schemeClr val="accent1"/>
+            </a:effectRef>
+            <a:fontRef idx="minor">
+              <a:schemeClr val="tx1"/>
+            </a:fontRef>
+          </p:style>
+        </p:cxnSp>
+        <p:cxnSp>
+          <p:nvCxnSpPr>
+            <p:cNvPr id="37" name="Straight Arrow Connector 36"/>
+            <p:cNvCxnSpPr/>
+            <p:nvPr/>
+          </p:nvCxnSpPr>
+          <p:spPr>
+            <a:xfrm>
+              <a:off x="5638800" y="1912132"/>
+              <a:ext cx="685800" cy="0"/>
+            </a:xfrm>
+            <a:prstGeom prst="straightConnector1">
+              <a:avLst/>
+            </a:prstGeom>
+            <a:ln>
+              <a:tailEnd type="arrow"/>
+            </a:ln>
+          </p:spPr>
+          <p:style>
+            <a:lnRef idx="1">
+              <a:schemeClr val="accent1"/>
+            </a:lnRef>
+            <a:fillRef idx="0">
+              <a:schemeClr val="accent1"/>
+            </a:fillRef>
+            <a:effectRef idx="0">
+              <a:schemeClr val="accent1"/>
+            </a:effectRef>
+            <a:fontRef idx="minor">
+              <a:schemeClr val="tx1"/>
+            </a:fontRef>
+          </p:style>
+        </p:cxnSp>
+        <p:cxnSp>
+          <p:nvCxnSpPr>
+            <p:cNvPr id="39" name="Straight Connector 38"/>
+            <p:cNvCxnSpPr/>
+            <p:nvPr/>
+          </p:nvCxnSpPr>
+          <p:spPr>
+            <a:xfrm>
+              <a:off x="5154176" y="3447562"/>
+              <a:ext cx="484624" cy="0"/>
+            </a:xfrm>
+            <a:prstGeom prst="line">
+              <a:avLst/>
+            </a:prstGeom>
+          </p:spPr>
+          <p:style>
+            <a:lnRef idx="1">
+              <a:schemeClr val="accent1"/>
+            </a:lnRef>
+            <a:fillRef idx="0">
+              <a:schemeClr val="accent1"/>
+            </a:fillRef>
+            <a:effectRef idx="0">
+              <a:schemeClr val="accent1"/>
+            </a:effectRef>
+            <a:fontRef idx="minor">
+              <a:schemeClr val="tx1"/>
+            </a:fontRef>
+          </p:style>
+        </p:cxnSp>
+      </p:grpSp>
     </p:spTree>
     <p:extLst>
       <p:ext uri="{BB962C8B-B14F-4D97-AF65-F5344CB8AC3E}">
-        <p14:creationId xmlns:p14="http://schemas.microsoft.com/office/powerpoint/2010/main" val="271953676"/>
+        <p14:creationId xmlns:p14="http://schemas.microsoft.com/office/powerpoint/2010/main" val="2737365561"/>
       </p:ext>
     </p:extLst>
   </p:cSld>

</xml_diff>

<commit_message>
updated system diagram for lights and whiskers
</commit_message>
<xml_diff>
--- a/System_diagrams.pptx
+++ b/System_diagrams.pptx
@@ -8,6 +8,7 @@
     <p:sldId id="257" r:id="rId2"/>
     <p:sldId id="258" r:id="rId3"/>
     <p:sldId id="259" r:id="rId4"/>
+    <p:sldId id="260" r:id="rId5"/>
   </p:sldIdLst>
   <p:sldSz cx="9144000" cy="6858000" type="screen4x3"/>
   <p:notesSz cx="6894513" cy="9180513"/>
@@ -4804,11 +4805,7 @@
           <a:p>
             <a:r>
               <a:rPr lang="en-US" dirty="0" smtClean="0"/>
-              <a:t>ALFRED: </a:t>
-            </a:r>
-            <a:r>
-              <a:rPr lang="en-US" dirty="0" smtClean="0"/>
-              <a:t>Scan and Wander</a:t>
+              <a:t>ALFRED: Scan and Wander</a:t>
             </a:r>
             <a:endParaRPr lang="en-US" dirty="0"/>
           </a:p>
@@ -4853,11 +4850,7 @@
               <a:pPr algn="ctr"/>
               <a:r>
                 <a:rPr lang="en-US" sz="1200" b="1" dirty="0" err="1" smtClean="0"/>
-                <a:t>Whisker</a:t>
-              </a:r>
-              <a:r>
-                <a:rPr lang="en-US" sz="1200" b="1" dirty="0" err="1" smtClean="0"/>
-                <a:t>_controller</a:t>
+                <a:t>Whisker_controller</a:t>
               </a:r>
               <a:endParaRPr lang="en-US" sz="1200" b="1" dirty="0" smtClean="0"/>
             </a:p>
@@ -5009,7 +5002,6 @@
               <a:rPr lang="en-US" sz="1200" dirty="0" smtClean="0"/>
               <a:t>The Scanner_5pt block hides the implementation and control details for controlling the scan.</a:t>
             </a:r>
-            <a:endParaRPr lang="en-US" sz="1200" dirty="0" smtClean="0"/>
           </a:p>
         </p:txBody>
       </p:sp>
@@ -5054,7 +5046,6 @@
                 <a:rPr lang="en-US" sz="1200" b="1" dirty="0" smtClean="0"/>
                 <a:t>Scanner_5pt</a:t>
               </a:r>
-              <a:endParaRPr lang="en-US" sz="1200" b="1" dirty="0" smtClean="0"/>
             </a:p>
           </p:txBody>
         </p:sp>
@@ -5185,7 +5176,6 @@
                   <a:rPr lang="en-US" sz="1100" i="1" dirty="0" smtClean="0"/>
                   <a:t>Parallax PING))) x 1</a:t>
                 </a:r>
-                <a:endParaRPr lang="en-US" sz="1100" i="1" dirty="0" smtClean="0"/>
               </a:p>
             </p:txBody>
           </p:sp>
@@ -5462,8 +5452,585 @@
                 </a:solidFill>
                 <a:latin typeface="Cooper Black" panose="0208090404030B020404" pitchFamily="18" charset="0"/>
               </a:rPr>
-              <a:t>Whisker</a:t>
-            </a:r>
+              <a:t>Whisker_bot.ino</a:t>
+            </a:r>
+            <a:endParaRPr lang="en-US" sz="2400" dirty="0" smtClean="0">
+              <a:solidFill>
+                <a:schemeClr val="bg2">
+                  <a:lumMod val="50000"/>
+                </a:schemeClr>
+              </a:solidFill>
+              <a:latin typeface="Cooper Black" panose="0208090404030B020404" pitchFamily="18" charset="0"/>
+            </a:endParaRPr>
+          </a:p>
+        </p:txBody>
+      </p:sp>
+    </p:spTree>
+    <p:extLst>
+      <p:ext uri="{BB962C8B-B14F-4D97-AF65-F5344CB8AC3E}">
+        <p14:creationId xmlns:p14="http://schemas.microsoft.com/office/powerpoint/2010/main" val="271953676"/>
+      </p:ext>
+    </p:extLst>
+  </p:cSld>
+  <p:clrMapOvr>
+    <a:masterClrMapping/>
+  </p:clrMapOvr>
+</p:sld>
+</file>
+
+<file path=ppt/slides/slide4.xml><?xml version="1.0" encoding="utf-8"?>
+<p:sld xmlns:a="http://schemas.openxmlformats.org/drawingml/2006/main" xmlns:r="http://schemas.openxmlformats.org/officeDocument/2006/relationships" xmlns:p="http://schemas.openxmlformats.org/presentationml/2006/main">
+  <p:cSld>
+    <p:spTree>
+      <p:nvGrpSpPr>
+        <p:cNvPr id="1" name=""/>
+        <p:cNvGrpSpPr/>
+        <p:nvPr/>
+      </p:nvGrpSpPr>
+      <p:grpSpPr>
+        <a:xfrm>
+          <a:off x="0" y="0"/>
+          <a:ext cx="0" cy="0"/>
+          <a:chOff x="0" y="0"/>
+          <a:chExt cx="0" cy="0"/>
+        </a:xfrm>
+      </p:grpSpPr>
+      <p:sp>
+        <p:nvSpPr>
+          <p:cNvPr id="72" name="Title 71"/>
+          <p:cNvSpPr>
+            <a:spLocks noGrp="1"/>
+          </p:cNvSpPr>
+          <p:nvPr>
+            <p:ph type="title"/>
+          </p:nvPr>
+        </p:nvSpPr>
+        <p:spPr>
+          <a:xfrm>
+            <a:off x="457200" y="76200"/>
+            <a:ext cx="8229600" cy="1143000"/>
+          </a:xfrm>
+        </p:spPr>
+        <p:txBody>
+          <a:bodyPr>
+            <a:normAutofit fontScale="90000"/>
+          </a:bodyPr>
+          <a:lstStyle/>
+          <a:p>
+            <a:r>
+              <a:rPr lang="en-US" dirty="0" smtClean="0"/>
+              <a:t>ALFRED: </a:t>
+            </a:r>
+            <a:r>
+              <a:rPr lang="en-US" dirty="0" smtClean="0"/>
+              <a:t>Scan and Wander</a:t>
+            </a:r>
+            <a:br>
+              <a:rPr lang="en-US" dirty="0" smtClean="0"/>
+            </a:br>
+            <a:r>
+              <a:rPr lang="en-US" smtClean="0"/>
+              <a:t>with Lights</a:t>
+            </a:r>
+            <a:endParaRPr lang="en-US" dirty="0"/>
+          </a:p>
+        </p:txBody>
+      </p:sp>
+      <p:sp>
+        <p:nvSpPr>
+          <p:cNvPr id="108" name="TextBox 107"/>
+          <p:cNvSpPr txBox="1"/>
+          <p:nvPr/>
+        </p:nvSpPr>
+        <p:spPr>
+          <a:xfrm>
+            <a:off x="913410" y="4953000"/>
+            <a:ext cx="3429001" cy="1384995"/>
+          </a:xfrm>
+          <a:prstGeom prst="rect">
+            <a:avLst/>
+          </a:prstGeom>
+          <a:noFill/>
+          <a:ln>
+            <a:solidFill>
+              <a:schemeClr val="bg2">
+                <a:lumMod val="50000"/>
+              </a:schemeClr>
+            </a:solidFill>
+          </a:ln>
+        </p:spPr>
+        <p:txBody>
+          <a:bodyPr wrap="square" rtlCol="0">
+            <a:spAutoFit/>
+          </a:bodyPr>
+          <a:lstStyle/>
+          <a:p>
+            <a:r>
+              <a:rPr lang="en-US" sz="1200" dirty="0" smtClean="0"/>
+              <a:t>NOTES:</a:t>
+            </a:r>
+          </a:p>
+          <a:p>
+            <a:pPr marL="171450" indent="-171450">
+              <a:buFontTx/>
+              <a:buChar char="-"/>
+            </a:pPr>
+            <a:r>
+              <a:rPr lang="en-US" sz="1200" dirty="0" smtClean="0"/>
+              <a:t>This bot implements obstacle avoidance by rotating an ultrasonic sensor with an attached servo.  </a:t>
+            </a:r>
+          </a:p>
+          <a:p>
+            <a:pPr marL="171450" indent="-171450">
+              <a:buFontTx/>
+              <a:buChar char="-"/>
+            </a:pPr>
+            <a:r>
+              <a:rPr lang="en-US" sz="1200" dirty="0" smtClean="0"/>
+              <a:t>This version adds the light plant to give a visual indication of which “whisker” was tripped by an obstacle.</a:t>
+            </a:r>
+            <a:endParaRPr lang="en-US" sz="1200" dirty="0" smtClean="0"/>
+          </a:p>
+        </p:txBody>
+      </p:sp>
+      <p:grpSp>
+        <p:nvGrpSpPr>
+          <p:cNvPr id="21" name="Group 20"/>
+          <p:cNvGrpSpPr/>
+          <p:nvPr/>
+        </p:nvGrpSpPr>
+        <p:grpSpPr>
+          <a:xfrm>
+            <a:off x="838200" y="3048000"/>
+            <a:ext cx="1638381" cy="1277618"/>
+            <a:chOff x="838200" y="2615714"/>
+            <a:chExt cx="1638381" cy="1277618"/>
+          </a:xfrm>
+        </p:grpSpPr>
+        <p:sp>
+          <p:nvSpPr>
+            <p:cNvPr id="42" name="TextBox 41"/>
+            <p:cNvSpPr txBox="1"/>
+            <p:nvPr/>
+          </p:nvSpPr>
+          <p:spPr>
+            <a:xfrm>
+              <a:off x="1017310" y="3581400"/>
+              <a:ext cx="1280160" cy="274320"/>
+            </a:xfrm>
+            <a:prstGeom prst="rect">
+              <a:avLst/>
+            </a:prstGeom>
+            <a:noFill/>
+          </p:spPr>
+          <p:txBody>
+            <a:bodyPr wrap="square" rtlCol="0">
+              <a:spAutoFit/>
+            </a:bodyPr>
+            <a:lstStyle/>
+            <a:p>
+              <a:pPr algn="ctr"/>
+              <a:r>
+                <a:rPr lang="en-US" sz="1200" b="1" dirty="0" smtClean="0"/>
+                <a:t>Scanner_5pt</a:t>
+              </a:r>
+            </a:p>
+          </p:txBody>
+        </p:sp>
+        <p:grpSp>
+          <p:nvGrpSpPr>
+            <p:cNvPr id="18" name="Group 17"/>
+            <p:cNvGrpSpPr/>
+            <p:nvPr/>
+          </p:nvGrpSpPr>
+          <p:grpSpPr>
+            <a:xfrm>
+              <a:off x="838200" y="2615714"/>
+              <a:ext cx="1638381" cy="1277618"/>
+              <a:chOff x="838200" y="2615714"/>
+              <a:chExt cx="1638381" cy="1277618"/>
+            </a:xfrm>
+          </p:grpSpPr>
+          <p:sp>
+            <p:nvSpPr>
+              <p:cNvPr id="41" name="Rectangle 40"/>
+              <p:cNvSpPr/>
+              <p:nvPr/>
+            </p:nvSpPr>
+            <p:spPr>
+              <a:xfrm>
+                <a:off x="838200" y="2615714"/>
+                <a:ext cx="1569938" cy="1277618"/>
+              </a:xfrm>
+              <a:prstGeom prst="rect">
+                <a:avLst/>
+              </a:prstGeom>
+              <a:noFill/>
+            </p:spPr>
+            <p:style>
+              <a:lnRef idx="2">
+                <a:schemeClr val="accent1">
+                  <a:shade val="50000"/>
+                </a:schemeClr>
+              </a:lnRef>
+              <a:fillRef idx="1">
+                <a:schemeClr val="accent1"/>
+              </a:fillRef>
+              <a:effectRef idx="0">
+                <a:schemeClr val="accent1"/>
+              </a:effectRef>
+              <a:fontRef idx="minor">
+                <a:schemeClr val="lt1"/>
+              </a:fontRef>
+            </p:style>
+            <p:txBody>
+              <a:bodyPr rot="0" spcFirstLastPara="0" vertOverflow="overflow" horzOverflow="overflow" vert="horz" wrap="square" lIns="91440" tIns="45720" rIns="91440" bIns="45720" numCol="1" spcCol="0" rtlCol="0" fromWordArt="0" anchor="ctr" anchorCtr="0" forceAA="0" compatLnSpc="1">
+                <a:prstTxWarp prst="textNoShape">
+                  <a:avLst/>
+                </a:prstTxWarp>
+                <a:noAutofit/>
+              </a:bodyPr>
+              <a:lstStyle/>
+              <a:p>
+                <a:pPr algn="ctr"/>
+                <a:endParaRPr lang="en-US"/>
+              </a:p>
+            </p:txBody>
+          </p:sp>
+          <p:sp>
+            <p:nvSpPr>
+              <p:cNvPr id="43" name="TextBox 42"/>
+              <p:cNvSpPr txBox="1"/>
+              <p:nvPr/>
+            </p:nvSpPr>
+            <p:spPr>
+              <a:xfrm>
+                <a:off x="1006736" y="2806600"/>
+                <a:ext cx="1469845" cy="276999"/>
+              </a:xfrm>
+              <a:prstGeom prst="rect">
+                <a:avLst/>
+              </a:prstGeom>
+              <a:noFill/>
+            </p:spPr>
+            <p:txBody>
+              <a:bodyPr wrap="square" rtlCol="0">
+                <a:spAutoFit/>
+              </a:bodyPr>
+              <a:lstStyle/>
+              <a:p>
+                <a:pPr algn="r"/>
+                <a:r>
+                  <a:rPr lang="en-US" sz="1200" dirty="0" err="1" smtClean="0"/>
+                  <a:t>Five_pt_scan_msg</a:t>
+                </a:r>
+                <a:endParaRPr lang="en-US" sz="1200" dirty="0" smtClean="0"/>
+              </a:p>
+            </p:txBody>
+          </p:sp>
+          <p:sp>
+            <p:nvSpPr>
+              <p:cNvPr id="111" name="TextBox 110"/>
+              <p:cNvSpPr txBox="1"/>
+              <p:nvPr/>
+            </p:nvSpPr>
+            <p:spPr>
+              <a:xfrm>
+                <a:off x="926709" y="3130118"/>
+                <a:ext cx="1392920" cy="430887"/>
+              </a:xfrm>
+              <a:prstGeom prst="rect">
+                <a:avLst/>
+              </a:prstGeom>
+              <a:noFill/>
+            </p:spPr>
+            <p:txBody>
+              <a:bodyPr wrap="square" rtlCol="0">
+                <a:spAutoFit/>
+              </a:bodyPr>
+              <a:lstStyle/>
+              <a:p>
+                <a:r>
+                  <a:rPr lang="en-US" sz="1100" i="1" dirty="0" err="1" smtClean="0"/>
+                  <a:t>Servo.h</a:t>
+                </a:r>
+                <a:r>
+                  <a:rPr lang="en-US" sz="1100" i="1" dirty="0" smtClean="0"/>
+                  <a:t> x2</a:t>
+                </a:r>
+              </a:p>
+              <a:p>
+                <a:r>
+                  <a:rPr lang="en-US" sz="1100" i="1" dirty="0" smtClean="0"/>
+                  <a:t>Parallax PING))) x 1</a:t>
+                </a:r>
+              </a:p>
+            </p:txBody>
+          </p:sp>
+        </p:grpSp>
+      </p:grpSp>
+      <p:sp>
+        <p:nvSpPr>
+          <p:cNvPr id="13" name="TextBox 12"/>
+          <p:cNvSpPr txBox="1"/>
+          <p:nvPr/>
+        </p:nvSpPr>
+        <p:spPr>
+          <a:xfrm>
+            <a:off x="7013678" y="3392395"/>
+            <a:ext cx="954977" cy="276999"/>
+          </a:xfrm>
+          <a:prstGeom prst="rect">
+            <a:avLst/>
+          </a:prstGeom>
+          <a:noFill/>
+        </p:spPr>
+        <p:txBody>
+          <a:bodyPr wrap="square" rtlCol="0">
+            <a:spAutoFit/>
+          </a:bodyPr>
+          <a:lstStyle/>
+          <a:p>
+            <a:pPr algn="r"/>
+            <a:endParaRPr lang="en-US" sz="1200" dirty="0" smtClean="0"/>
+          </a:p>
+        </p:txBody>
+      </p:sp>
+      <p:grpSp>
+        <p:nvGrpSpPr>
+          <p:cNvPr id="2" name="Group 1"/>
+          <p:cNvGrpSpPr/>
+          <p:nvPr/>
+        </p:nvGrpSpPr>
+        <p:grpSpPr>
+          <a:xfrm>
+            <a:off x="6344101" y="3048000"/>
+            <a:ext cx="1569936" cy="1277617"/>
+            <a:chOff x="6344101" y="2591909"/>
+            <a:chExt cx="1569936" cy="1277617"/>
+          </a:xfrm>
+        </p:grpSpPr>
+        <p:sp>
+          <p:nvSpPr>
+            <p:cNvPr id="9" name="TextBox 8"/>
+            <p:cNvSpPr txBox="1"/>
+            <p:nvPr/>
+          </p:nvSpPr>
+          <p:spPr>
+            <a:xfrm>
+              <a:off x="6488989" y="3581400"/>
+              <a:ext cx="1280160" cy="274320"/>
+            </a:xfrm>
+            <a:prstGeom prst="rect">
+              <a:avLst/>
+            </a:prstGeom>
+            <a:noFill/>
+          </p:spPr>
+          <p:txBody>
+            <a:bodyPr wrap="square" rtlCol="0">
+              <a:spAutoFit/>
+            </a:bodyPr>
+            <a:lstStyle/>
+            <a:p>
+              <a:pPr algn="ctr"/>
+              <a:r>
+                <a:rPr lang="en-US" sz="1200" b="1" dirty="0" err="1" smtClean="0"/>
+                <a:t>Rover_plant</a:t>
+              </a:r>
+              <a:endParaRPr lang="en-US" sz="1200" b="1" dirty="0" smtClean="0"/>
+            </a:p>
+          </p:txBody>
+        </p:sp>
+        <p:grpSp>
+          <p:nvGrpSpPr>
+            <p:cNvPr id="22" name="Group 21"/>
+            <p:cNvGrpSpPr/>
+            <p:nvPr/>
+          </p:nvGrpSpPr>
+          <p:grpSpPr>
+            <a:xfrm>
+              <a:off x="6344101" y="2591909"/>
+              <a:ext cx="1569936" cy="1277617"/>
+              <a:chOff x="6338034" y="2591909"/>
+              <a:chExt cx="1569936" cy="1277617"/>
+            </a:xfrm>
+          </p:grpSpPr>
+          <p:sp>
+            <p:nvSpPr>
+              <p:cNvPr id="6" name="Rectangle 5"/>
+              <p:cNvSpPr/>
+              <p:nvPr/>
+            </p:nvSpPr>
+            <p:spPr>
+              <a:xfrm>
+                <a:off x="6338034" y="2591909"/>
+                <a:ext cx="1569936" cy="1277617"/>
+              </a:xfrm>
+              <a:prstGeom prst="rect">
+                <a:avLst/>
+              </a:prstGeom>
+              <a:noFill/>
+            </p:spPr>
+            <p:style>
+              <a:lnRef idx="2">
+                <a:schemeClr val="accent1">
+                  <a:shade val="50000"/>
+                </a:schemeClr>
+              </a:lnRef>
+              <a:fillRef idx="1">
+                <a:schemeClr val="accent1"/>
+              </a:fillRef>
+              <a:effectRef idx="0">
+                <a:schemeClr val="accent1"/>
+              </a:effectRef>
+              <a:fontRef idx="minor">
+                <a:schemeClr val="lt1"/>
+              </a:fontRef>
+            </p:style>
+            <p:txBody>
+              <a:bodyPr rot="0" spcFirstLastPara="0" vertOverflow="overflow" horzOverflow="overflow" vert="horz" wrap="square" lIns="91440" tIns="45720" rIns="91440" bIns="45720" numCol="1" spcCol="0" rtlCol="0" fromWordArt="0" anchor="ctr" anchorCtr="0" forceAA="0" compatLnSpc="1">
+                <a:prstTxWarp prst="textNoShape">
+                  <a:avLst/>
+                </a:prstTxWarp>
+                <a:noAutofit/>
+              </a:bodyPr>
+              <a:lstStyle/>
+              <a:p>
+                <a:pPr algn="ctr"/>
+                <a:endParaRPr lang="en-US"/>
+              </a:p>
+            </p:txBody>
+          </p:sp>
+          <p:sp>
+            <p:nvSpPr>
+              <p:cNvPr id="38" name="TextBox 37"/>
+              <p:cNvSpPr txBox="1"/>
+              <p:nvPr/>
+            </p:nvSpPr>
+            <p:spPr>
+              <a:xfrm>
+                <a:off x="6382054" y="3091190"/>
+                <a:ext cx="1392920" cy="261610"/>
+              </a:xfrm>
+              <a:prstGeom prst="rect">
+                <a:avLst/>
+              </a:prstGeom>
+              <a:noFill/>
+            </p:spPr>
+            <p:txBody>
+              <a:bodyPr wrap="square" rtlCol="0">
+                <a:spAutoFit/>
+              </a:bodyPr>
+              <a:lstStyle/>
+              <a:p>
+                <a:r>
+                  <a:rPr lang="en-US" sz="1100" i="1" dirty="0" err="1" smtClean="0"/>
+                  <a:t>gw</a:t>
+                </a:r>
+                <a:r>
+                  <a:rPr lang="en-US" sz="1100" i="1" dirty="0" smtClean="0"/>
+                  <a:t>::Motor*  2 </a:t>
+                </a:r>
+              </a:p>
+            </p:txBody>
+          </p:sp>
+        </p:grpSp>
+      </p:grpSp>
+      <p:cxnSp>
+        <p:nvCxnSpPr>
+          <p:cNvPr id="16" name="Straight Arrow Connector 15"/>
+          <p:cNvCxnSpPr/>
+          <p:nvPr/>
+        </p:nvCxnSpPr>
+        <p:spPr>
+          <a:xfrm>
+            <a:off x="2408138" y="3398142"/>
+            <a:ext cx="1176102" cy="0"/>
+          </a:xfrm>
+          <a:prstGeom prst="straightConnector1">
+            <a:avLst/>
+          </a:prstGeom>
+          <a:ln>
+            <a:tailEnd type="arrow"/>
+          </a:ln>
+        </p:spPr>
+        <p:style>
+          <a:lnRef idx="1">
+            <a:schemeClr val="accent1"/>
+          </a:lnRef>
+          <a:fillRef idx="0">
+            <a:schemeClr val="accent1"/>
+          </a:fillRef>
+          <a:effectRef idx="0">
+            <a:schemeClr val="accent1"/>
+          </a:effectRef>
+          <a:fontRef idx="minor">
+            <a:schemeClr val="tx1"/>
+          </a:fontRef>
+        </p:style>
+      </p:cxnSp>
+      <p:cxnSp>
+        <p:nvCxnSpPr>
+          <p:cNvPr id="54" name="Straight Arrow Connector 53"/>
+          <p:cNvCxnSpPr/>
+          <p:nvPr/>
+        </p:nvCxnSpPr>
+        <p:spPr>
+          <a:xfrm>
+            <a:off x="5181600" y="3581400"/>
+            <a:ext cx="1176102" cy="0"/>
+          </a:xfrm>
+          <a:prstGeom prst="straightConnector1">
+            <a:avLst/>
+          </a:prstGeom>
+          <a:ln>
+            <a:tailEnd type="arrow"/>
+          </a:ln>
+        </p:spPr>
+        <p:style>
+          <a:lnRef idx="1">
+            <a:schemeClr val="accent1"/>
+          </a:lnRef>
+          <a:fillRef idx="0">
+            <a:schemeClr val="accent1"/>
+          </a:fillRef>
+          <a:effectRef idx="0">
+            <a:schemeClr val="accent1"/>
+          </a:effectRef>
+          <a:fontRef idx="minor">
+            <a:schemeClr val="tx1"/>
+          </a:fontRef>
+        </p:style>
+      </p:cxnSp>
+      <p:sp>
+        <p:nvSpPr>
+          <p:cNvPr id="24" name="TextBox 23"/>
+          <p:cNvSpPr txBox="1"/>
+          <p:nvPr/>
+        </p:nvSpPr>
+        <p:spPr>
+          <a:xfrm>
+            <a:off x="285790" y="1600199"/>
+            <a:ext cx="3298450" cy="461665"/>
+          </a:xfrm>
+          <a:prstGeom prst="rect">
+            <a:avLst/>
+          </a:prstGeom>
+          <a:noFill/>
+          <a:ln>
+            <a:solidFill>
+              <a:schemeClr val="bg2">
+                <a:lumMod val="75000"/>
+              </a:schemeClr>
+            </a:solidFill>
+          </a:ln>
+        </p:spPr>
+        <p:txBody>
+          <a:bodyPr wrap="square" rtlCol="0">
+            <a:spAutoFit/>
+          </a:bodyPr>
+          <a:lstStyle/>
+          <a:p>
             <a:r>
               <a:rPr lang="en-US" sz="2400" dirty="0" err="1" smtClean="0">
                 <a:solidFill>
@@ -5473,7 +6040,7 @@
                 </a:solidFill>
                 <a:latin typeface="Cooper Black" panose="0208090404030B020404" pitchFamily="18" charset="0"/>
               </a:rPr>
-              <a:t>_bot.ino</a:t>
+              <a:t>Whisker_bot.ino</a:t>
             </a:r>
             <a:endParaRPr lang="en-US" sz="2400" dirty="0" smtClean="0">
               <a:solidFill>
@@ -5486,10 +6053,408 @@
           </a:p>
         </p:txBody>
       </p:sp>
+      <p:grpSp>
+        <p:nvGrpSpPr>
+          <p:cNvPr id="25" name="Group 24"/>
+          <p:cNvGrpSpPr/>
+          <p:nvPr/>
+        </p:nvGrpSpPr>
+        <p:grpSpPr>
+          <a:xfrm>
+            <a:off x="3581400" y="3048000"/>
+            <a:ext cx="1587715" cy="1284728"/>
+            <a:chOff x="3584240" y="2600379"/>
+            <a:chExt cx="1596794" cy="1297567"/>
+          </a:xfrm>
+        </p:grpSpPr>
+        <p:sp>
+          <p:nvSpPr>
+            <p:cNvPr id="26" name="TextBox 25"/>
+            <p:cNvSpPr txBox="1"/>
+            <p:nvPr/>
+          </p:nvSpPr>
+          <p:spPr>
+            <a:xfrm>
+              <a:off x="3737511" y="3431667"/>
+              <a:ext cx="1309877" cy="466279"/>
+            </a:xfrm>
+            <a:prstGeom prst="rect">
+              <a:avLst/>
+            </a:prstGeom>
+            <a:noFill/>
+          </p:spPr>
+          <p:txBody>
+            <a:bodyPr wrap="square" rtlCol="0">
+              <a:spAutoFit/>
+            </a:bodyPr>
+            <a:lstStyle/>
+            <a:p>
+              <a:pPr algn="ctr"/>
+              <a:r>
+                <a:rPr lang="en-US" sz="1200" b="1" dirty="0" err="1" smtClean="0"/>
+                <a:t>Whisker_bumper</a:t>
+              </a:r>
+              <a:r>
+                <a:rPr lang="en-US" sz="1200" b="1" dirty="0" err="1" smtClean="0"/>
+                <a:t>controller</a:t>
+              </a:r>
+              <a:endParaRPr lang="en-US" sz="1200" b="1" dirty="0" smtClean="0"/>
+            </a:p>
+          </p:txBody>
+        </p:sp>
+        <p:grpSp>
+          <p:nvGrpSpPr>
+            <p:cNvPr id="27" name="Group 26"/>
+            <p:cNvGrpSpPr/>
+            <p:nvPr/>
+          </p:nvGrpSpPr>
+          <p:grpSpPr>
+            <a:xfrm>
+              <a:off x="3584240" y="2600379"/>
+              <a:ext cx="1596794" cy="1277619"/>
+              <a:chOff x="3584240" y="2600379"/>
+              <a:chExt cx="1596794" cy="1277619"/>
+            </a:xfrm>
+          </p:grpSpPr>
+          <p:sp>
+            <p:nvSpPr>
+              <p:cNvPr id="28" name="Rectangle 27"/>
+              <p:cNvSpPr/>
+              <p:nvPr/>
+            </p:nvSpPr>
+            <p:spPr>
+              <a:xfrm>
+                <a:off x="3584240" y="2600379"/>
+                <a:ext cx="1569936" cy="1277619"/>
+              </a:xfrm>
+              <a:prstGeom prst="rect">
+                <a:avLst/>
+              </a:prstGeom>
+              <a:noFill/>
+            </p:spPr>
+            <p:style>
+              <a:lnRef idx="2">
+                <a:schemeClr val="accent1">
+                  <a:shade val="50000"/>
+                </a:schemeClr>
+              </a:lnRef>
+              <a:fillRef idx="1">
+                <a:schemeClr val="accent1"/>
+              </a:fillRef>
+              <a:effectRef idx="0">
+                <a:schemeClr val="accent1"/>
+              </a:effectRef>
+              <a:fontRef idx="minor">
+                <a:schemeClr val="lt1"/>
+              </a:fontRef>
+            </p:style>
+            <p:txBody>
+              <a:bodyPr rot="0" spcFirstLastPara="0" vertOverflow="overflow" horzOverflow="overflow" vert="horz" wrap="square" lIns="91440" tIns="45720" rIns="91440" bIns="45720" numCol="1" spcCol="0" rtlCol="0" fromWordArt="0" anchor="ctr" anchorCtr="0" forceAA="0" compatLnSpc="1">
+                <a:prstTxWarp prst="textNoShape">
+                  <a:avLst/>
+                </a:prstTxWarp>
+                <a:noAutofit/>
+              </a:bodyPr>
+              <a:lstStyle/>
+              <a:p>
+                <a:pPr algn="ctr"/>
+                <a:endParaRPr lang="en-US"/>
+              </a:p>
+            </p:txBody>
+          </p:sp>
+          <p:sp>
+            <p:nvSpPr>
+              <p:cNvPr id="29" name="TextBox 28"/>
+              <p:cNvSpPr txBox="1"/>
+              <p:nvPr/>
+            </p:nvSpPr>
+            <p:spPr>
+              <a:xfrm>
+                <a:off x="3760312" y="2791265"/>
+                <a:ext cx="1420722" cy="461665"/>
+              </a:xfrm>
+              <a:prstGeom prst="rect">
+                <a:avLst/>
+              </a:prstGeom>
+              <a:noFill/>
+            </p:spPr>
+            <p:txBody>
+              <a:bodyPr wrap="square" rtlCol="0">
+                <a:spAutoFit/>
+              </a:bodyPr>
+              <a:lstStyle/>
+              <a:p>
+                <a:pPr algn="r"/>
+                <a:r>
+                  <a:rPr lang="en-US" sz="1200" dirty="0" err="1" smtClean="0"/>
+                  <a:t>Cmd_led_msg</a:t>
+                </a:r>
+                <a:endParaRPr lang="en-US" sz="1200" dirty="0" smtClean="0"/>
+              </a:p>
+              <a:p>
+                <a:pPr algn="r"/>
+                <a:r>
+                  <a:rPr lang="en-US" sz="1200" dirty="0" err="1" smtClean="0"/>
+                  <a:t>Cmd_velocity_msg</a:t>
+                </a:r>
+                <a:endParaRPr lang="en-US" sz="1200" dirty="0" smtClean="0"/>
+              </a:p>
+            </p:txBody>
+          </p:sp>
+        </p:grpSp>
+      </p:grpSp>
+      <p:grpSp>
+        <p:nvGrpSpPr>
+          <p:cNvPr id="30" name="Group 29"/>
+          <p:cNvGrpSpPr/>
+          <p:nvPr/>
+        </p:nvGrpSpPr>
+        <p:grpSpPr>
+          <a:xfrm>
+            <a:off x="6352024" y="1524000"/>
+            <a:ext cx="1569936" cy="1277617"/>
+            <a:chOff x="6344101" y="3118177"/>
+            <a:chExt cx="1569936" cy="1277617"/>
+          </a:xfrm>
+        </p:grpSpPr>
+        <p:sp>
+          <p:nvSpPr>
+            <p:cNvPr id="31" name="TextBox 30"/>
+            <p:cNvSpPr txBox="1"/>
+            <p:nvPr/>
+          </p:nvSpPr>
+          <p:spPr>
+            <a:xfrm>
+              <a:off x="6488989" y="4107668"/>
+              <a:ext cx="1280160" cy="274320"/>
+            </a:xfrm>
+            <a:prstGeom prst="rect">
+              <a:avLst/>
+            </a:prstGeom>
+            <a:noFill/>
+          </p:spPr>
+          <p:txBody>
+            <a:bodyPr wrap="square" rtlCol="0">
+              <a:spAutoFit/>
+            </a:bodyPr>
+            <a:lstStyle/>
+            <a:p>
+              <a:pPr algn="ctr"/>
+              <a:r>
+                <a:rPr lang="en-US" sz="1200" b="1" dirty="0" err="1" smtClean="0"/>
+                <a:t>Light_plant</a:t>
+              </a:r>
+              <a:endParaRPr lang="en-US" sz="1200" b="1" dirty="0" smtClean="0"/>
+            </a:p>
+          </p:txBody>
+        </p:sp>
+        <p:grpSp>
+          <p:nvGrpSpPr>
+            <p:cNvPr id="32" name="Group 31"/>
+            <p:cNvGrpSpPr/>
+            <p:nvPr/>
+          </p:nvGrpSpPr>
+          <p:grpSpPr>
+            <a:xfrm>
+              <a:off x="6344101" y="3118177"/>
+              <a:ext cx="1569936" cy="1277617"/>
+              <a:chOff x="6338034" y="2591909"/>
+              <a:chExt cx="1569936" cy="1277617"/>
+            </a:xfrm>
+          </p:grpSpPr>
+          <p:sp>
+            <p:nvSpPr>
+              <p:cNvPr id="33" name="Rectangle 32"/>
+              <p:cNvSpPr/>
+              <p:nvPr/>
+            </p:nvSpPr>
+            <p:spPr>
+              <a:xfrm>
+                <a:off x="6338034" y="2591909"/>
+                <a:ext cx="1569936" cy="1277617"/>
+              </a:xfrm>
+              <a:prstGeom prst="rect">
+                <a:avLst/>
+              </a:prstGeom>
+              <a:noFill/>
+            </p:spPr>
+            <p:style>
+              <a:lnRef idx="2">
+                <a:schemeClr val="accent1">
+                  <a:shade val="50000"/>
+                </a:schemeClr>
+              </a:lnRef>
+              <a:fillRef idx="1">
+                <a:schemeClr val="accent1"/>
+              </a:fillRef>
+              <a:effectRef idx="0">
+                <a:schemeClr val="accent1"/>
+              </a:effectRef>
+              <a:fontRef idx="minor">
+                <a:schemeClr val="lt1"/>
+              </a:fontRef>
+            </p:style>
+            <p:txBody>
+              <a:bodyPr rot="0" spcFirstLastPara="0" vertOverflow="overflow" horzOverflow="overflow" vert="horz" wrap="square" lIns="91440" tIns="45720" rIns="91440" bIns="45720" numCol="1" spcCol="0" rtlCol="0" fromWordArt="0" anchor="ctr" anchorCtr="0" forceAA="0" compatLnSpc="1">
+                <a:prstTxWarp prst="textNoShape">
+                  <a:avLst/>
+                </a:prstTxWarp>
+                <a:noAutofit/>
+              </a:bodyPr>
+              <a:lstStyle/>
+              <a:p>
+                <a:pPr algn="ctr"/>
+                <a:endParaRPr lang="en-US"/>
+              </a:p>
+            </p:txBody>
+          </p:sp>
+          <p:sp>
+            <p:nvSpPr>
+              <p:cNvPr id="34" name="TextBox 33"/>
+              <p:cNvSpPr txBox="1"/>
+              <p:nvPr/>
+            </p:nvSpPr>
+            <p:spPr>
+              <a:xfrm>
+                <a:off x="6382054" y="3091190"/>
+                <a:ext cx="1392920" cy="261610"/>
+              </a:xfrm>
+              <a:prstGeom prst="rect">
+                <a:avLst/>
+              </a:prstGeom>
+              <a:noFill/>
+            </p:spPr>
+            <p:txBody>
+              <a:bodyPr wrap="square" rtlCol="0">
+                <a:spAutoFit/>
+              </a:bodyPr>
+              <a:lstStyle/>
+              <a:p>
+                <a:r>
+                  <a:rPr lang="en-US" sz="1100" i="1" dirty="0" err="1" smtClean="0"/>
+                  <a:t>gw</a:t>
+                </a:r>
+                <a:r>
+                  <a:rPr lang="en-US" sz="1100" i="1" dirty="0" smtClean="0"/>
+                  <a:t>::Led*  5 </a:t>
+                </a:r>
+              </a:p>
+            </p:txBody>
+          </p:sp>
+        </p:grpSp>
+      </p:grpSp>
+      <p:grpSp>
+        <p:nvGrpSpPr>
+          <p:cNvPr id="35" name="Group 34"/>
+          <p:cNvGrpSpPr/>
+          <p:nvPr/>
+        </p:nvGrpSpPr>
+        <p:grpSpPr>
+          <a:xfrm>
+            <a:off x="5174007" y="1878456"/>
+            <a:ext cx="1170424" cy="1535430"/>
+            <a:chOff x="5154176" y="1912132"/>
+            <a:chExt cx="1170424" cy="1535430"/>
+          </a:xfrm>
+        </p:grpSpPr>
+        <p:cxnSp>
+          <p:nvCxnSpPr>
+            <p:cNvPr id="36" name="Straight Connector 35"/>
+            <p:cNvCxnSpPr/>
+            <p:nvPr/>
+          </p:nvCxnSpPr>
+          <p:spPr>
+            <a:xfrm flipV="1">
+              <a:off x="5638800" y="1912132"/>
+              <a:ext cx="0" cy="1535430"/>
+            </a:xfrm>
+            <a:prstGeom prst="line">
+              <a:avLst/>
+            </a:prstGeom>
+          </p:spPr>
+          <p:style>
+            <a:lnRef idx="1">
+              <a:schemeClr val="accent1"/>
+            </a:lnRef>
+            <a:fillRef idx="0">
+              <a:schemeClr val="accent1"/>
+            </a:fillRef>
+            <a:effectRef idx="0">
+              <a:schemeClr val="accent1"/>
+            </a:effectRef>
+            <a:fontRef idx="minor">
+              <a:schemeClr val="tx1"/>
+            </a:fontRef>
+          </p:style>
+        </p:cxnSp>
+        <p:cxnSp>
+          <p:nvCxnSpPr>
+            <p:cNvPr id="37" name="Straight Arrow Connector 36"/>
+            <p:cNvCxnSpPr/>
+            <p:nvPr/>
+          </p:nvCxnSpPr>
+          <p:spPr>
+            <a:xfrm>
+              <a:off x="5638800" y="1912132"/>
+              <a:ext cx="685800" cy="0"/>
+            </a:xfrm>
+            <a:prstGeom prst="straightConnector1">
+              <a:avLst/>
+            </a:prstGeom>
+            <a:ln>
+              <a:tailEnd type="arrow"/>
+            </a:ln>
+          </p:spPr>
+          <p:style>
+            <a:lnRef idx="1">
+              <a:schemeClr val="accent1"/>
+            </a:lnRef>
+            <a:fillRef idx="0">
+              <a:schemeClr val="accent1"/>
+            </a:fillRef>
+            <a:effectRef idx="0">
+              <a:schemeClr val="accent1"/>
+            </a:effectRef>
+            <a:fontRef idx="minor">
+              <a:schemeClr val="tx1"/>
+            </a:fontRef>
+          </p:style>
+        </p:cxnSp>
+        <p:cxnSp>
+          <p:nvCxnSpPr>
+            <p:cNvPr id="39" name="Straight Connector 38"/>
+            <p:cNvCxnSpPr/>
+            <p:nvPr/>
+          </p:nvCxnSpPr>
+          <p:spPr>
+            <a:xfrm>
+              <a:off x="5154176" y="3447562"/>
+              <a:ext cx="484624" cy="0"/>
+            </a:xfrm>
+            <a:prstGeom prst="line">
+              <a:avLst/>
+            </a:prstGeom>
+          </p:spPr>
+          <p:style>
+            <a:lnRef idx="1">
+              <a:schemeClr val="accent1"/>
+            </a:lnRef>
+            <a:fillRef idx="0">
+              <a:schemeClr val="accent1"/>
+            </a:fillRef>
+            <a:effectRef idx="0">
+              <a:schemeClr val="accent1"/>
+            </a:effectRef>
+            <a:fontRef idx="minor">
+              <a:schemeClr val="tx1"/>
+            </a:fontRef>
+          </p:style>
+        </p:cxnSp>
+      </p:grpSp>
     </p:spTree>
     <p:extLst>
       <p:ext uri="{BB962C8B-B14F-4D97-AF65-F5344CB8AC3E}">
-        <p14:creationId xmlns:p14="http://schemas.microsoft.com/office/powerpoint/2010/main" val="271953676"/>
+        <p14:creationId xmlns:p14="http://schemas.microsoft.com/office/powerpoint/2010/main" val="2737365561"/>
       </p:ext>
     </p:extLst>
   </p:cSld>

</xml_diff>

<commit_message>
updated diagrams for SBW_bot
</commit_message>
<xml_diff>
--- a/System_diagrams.pptx
+++ b/System_diagrams.pptx
@@ -9,6 +9,7 @@
     <p:sldId id="258" r:id="rId3"/>
     <p:sldId id="259" r:id="rId4"/>
     <p:sldId id="260" r:id="rId5"/>
+    <p:sldId id="261" r:id="rId6"/>
   </p:sldIdLst>
   <p:sldSz cx="9144000" cy="6858000" type="screen4x3"/>
   <p:notesSz cx="6894513" cy="9180513"/>
@@ -3255,10 +3256,9 @@
               <a:p>
                 <a:pPr algn="r"/>
                 <a:r>
-                  <a:rPr lang="en-US" sz="1200" dirty="0" err="1" smtClean="0"/>
+                  <a:rPr lang="en-US" sz="1200" dirty="0" smtClean="0"/>
                   <a:t>Cmd_velocity_msg</a:t>
                 </a:r>
-                <a:endParaRPr lang="en-US" sz="1200" dirty="0" smtClean="0"/>
               </a:p>
             </p:txBody>
           </p:sp>
@@ -3477,12 +3477,8 @@
               <a:lstStyle/>
               <a:p>
                 <a:r>
-                  <a:rPr lang="en-US" sz="1100" i="1" dirty="0" err="1" smtClean="0"/>
-                  <a:t>gw</a:t>
-                </a:r>
-                <a:r>
                   <a:rPr lang="en-US" sz="1100" i="1" dirty="0" smtClean="0"/>
-                  <a:t>::Bumper* x2</a:t>
+                  <a:t>gw::Bumper* x2</a:t>
                 </a:r>
               </a:p>
             </p:txBody>
@@ -3554,10 +3550,9 @@
             <a:p>
               <a:pPr algn="ctr"/>
               <a:r>
-                <a:rPr lang="en-US" sz="1200" b="1" dirty="0" err="1" smtClean="0"/>
+                <a:rPr lang="en-US" sz="1200" b="1" dirty="0" smtClean="0"/>
                 <a:t>Rover_plant</a:t>
               </a:r>
-              <a:endParaRPr lang="en-US" sz="1200" b="1" dirty="0" smtClean="0"/>
             </a:p>
           </p:txBody>
         </p:sp>
@@ -3644,12 +3639,8 @@
               <a:lstStyle/>
               <a:p>
                 <a:r>
-                  <a:rPr lang="en-US" sz="1100" i="1" dirty="0" err="1" smtClean="0"/>
-                  <a:t>gw</a:t>
-                </a:r>
-                <a:r>
                   <a:rPr lang="en-US" sz="1100" i="1" dirty="0" smtClean="0"/>
-                  <a:t>::Motor*  2 </a:t>
+                  <a:t>gw::Motor*  2 </a:t>
                 </a:r>
               </a:p>
             </p:txBody>
@@ -3969,18 +3960,16 @@
               <a:p>
                 <a:pPr algn="r"/>
                 <a:r>
-                  <a:rPr lang="en-US" sz="1200" dirty="0" err="1" smtClean="0"/>
+                  <a:rPr lang="en-US" sz="1200" dirty="0" smtClean="0"/>
                   <a:t>Cmd_led_msg</a:t>
                 </a:r>
-                <a:endParaRPr lang="en-US" sz="1200" dirty="0" smtClean="0"/>
               </a:p>
               <a:p>
                 <a:pPr algn="r"/>
                 <a:r>
-                  <a:rPr lang="en-US" sz="1200" dirty="0" err="1" smtClean="0"/>
+                  <a:rPr lang="en-US" sz="1200" dirty="0" smtClean="0"/>
                   <a:t>Cmd_velocity_msg</a:t>
                 </a:r>
-                <a:endParaRPr lang="en-US" sz="1200" dirty="0" smtClean="0"/>
               </a:p>
             </p:txBody>
           </p:sp>
@@ -4209,12 +4198,8 @@
               <a:lstStyle/>
               <a:p>
                 <a:r>
-                  <a:rPr lang="en-US" sz="1100" i="1" dirty="0" err="1" smtClean="0"/>
-                  <a:t>gw</a:t>
-                </a:r>
-                <a:r>
                   <a:rPr lang="en-US" sz="1100" i="1" dirty="0" smtClean="0"/>
-                  <a:t>::Bumper* x2</a:t>
+                  <a:t>gw::Bumper* x2</a:t>
                 </a:r>
               </a:p>
             </p:txBody>
@@ -4286,10 +4271,9 @@
             <a:p>
               <a:pPr algn="ctr"/>
               <a:r>
-                <a:rPr lang="en-US" sz="1200" b="1" dirty="0" err="1" smtClean="0"/>
+                <a:rPr lang="en-US" sz="1200" b="1" dirty="0" smtClean="0"/>
                 <a:t>Rover_plant</a:t>
               </a:r>
-              <a:endParaRPr lang="en-US" sz="1200" b="1" dirty="0" smtClean="0"/>
             </a:p>
           </p:txBody>
         </p:sp>
@@ -4376,12 +4360,8 @@
               <a:lstStyle/>
               <a:p>
                 <a:r>
-                  <a:rPr lang="en-US" sz="1100" i="1" dirty="0" err="1" smtClean="0"/>
-                  <a:t>gw</a:t>
-                </a:r>
-                <a:r>
                   <a:rPr lang="en-US" sz="1100" i="1" dirty="0" smtClean="0"/>
-                  <a:t>::Motor*  2 </a:t>
+                  <a:t>gw::Motor*  2 </a:t>
                 </a:r>
               </a:p>
             </p:txBody>
@@ -4492,10 +4472,9 @@
             <a:p>
               <a:pPr algn="ctr"/>
               <a:r>
-                <a:rPr lang="en-US" sz="1200" b="1" dirty="0" err="1" smtClean="0"/>
+                <a:rPr lang="en-US" sz="1200" b="1" dirty="0" smtClean="0"/>
                 <a:t>Light_plant</a:t>
               </a:r>
-              <a:endParaRPr lang="en-US" sz="1200" b="1" dirty="0" smtClean="0"/>
             </a:p>
           </p:txBody>
         </p:sp>
@@ -4582,12 +4561,8 @@
               <a:lstStyle/>
               <a:p>
                 <a:r>
-                  <a:rPr lang="en-US" sz="1100" i="1" dirty="0" err="1" smtClean="0"/>
-                  <a:t>gw</a:t>
-                </a:r>
-                <a:r>
                   <a:rPr lang="en-US" sz="1100" i="1" dirty="0" smtClean="0"/>
-                  <a:t>::Led*  5 </a:t>
+                  <a:t>gw::Led*  5 </a:t>
                 </a:r>
               </a:p>
             </p:txBody>
@@ -4849,10 +4824,9 @@
             <a:p>
               <a:pPr algn="ctr"/>
               <a:r>
-                <a:rPr lang="en-US" sz="1200" b="1" dirty="0" err="1" smtClean="0"/>
+                <a:rPr lang="en-US" sz="1200" b="1" dirty="0" smtClean="0"/>
                 <a:t>Whisker_controller</a:t>
               </a:r>
-              <a:endParaRPr lang="en-US" sz="1200" b="1" dirty="0" smtClean="0"/>
             </a:p>
           </p:txBody>
         </p:sp>
@@ -4940,10 +4914,9 @@
               <a:p>
                 <a:pPr algn="r"/>
                 <a:r>
-                  <a:rPr lang="en-US" sz="1200" dirty="0" err="1" smtClean="0"/>
+                  <a:rPr lang="en-US" sz="1200" dirty="0" smtClean="0"/>
                   <a:t>Cmd_velocity_msg</a:t>
                 </a:r>
-                <a:endParaRPr lang="en-US" sz="1200" dirty="0" smtClean="0"/>
               </a:p>
             </p:txBody>
           </p:sp>
@@ -5133,10 +5106,9 @@
               <a:p>
                 <a:pPr algn="r"/>
                 <a:r>
-                  <a:rPr lang="en-US" sz="1200" dirty="0" err="1" smtClean="0"/>
+                  <a:rPr lang="en-US" sz="1200" dirty="0" smtClean="0"/>
                   <a:t>Five_pt_scan_msg</a:t>
                 </a:r>
-                <a:endParaRPr lang="en-US" sz="1200" dirty="0" smtClean="0"/>
               </a:p>
             </p:txBody>
           </p:sp>
@@ -5163,12 +5135,8 @@
               <a:lstStyle/>
               <a:p>
                 <a:r>
-                  <a:rPr lang="en-US" sz="1100" i="1" dirty="0" err="1" smtClean="0"/>
-                  <a:t>Servo.h</a:t>
-                </a:r>
-                <a:r>
                   <a:rPr lang="en-US" sz="1100" i="1" dirty="0" smtClean="0"/>
-                  <a:t> x2</a:t>
+                  <a:t>Servo.h x2</a:t>
                 </a:r>
               </a:p>
               <a:p>
@@ -5246,10 +5214,9 @@
             <a:p>
               <a:pPr algn="ctr"/>
               <a:r>
-                <a:rPr lang="en-US" sz="1200" b="1" dirty="0" err="1" smtClean="0"/>
+                <a:rPr lang="en-US" sz="1200" b="1" dirty="0" smtClean="0"/>
                 <a:t>Rover_plant</a:t>
               </a:r>
-              <a:endParaRPr lang="en-US" sz="1200" b="1" dirty="0" smtClean="0"/>
             </a:p>
           </p:txBody>
         </p:sp>
@@ -5336,12 +5303,8 @@
               <a:lstStyle/>
               <a:p>
                 <a:r>
-                  <a:rPr lang="en-US" sz="1100" i="1" dirty="0" err="1" smtClean="0"/>
-                  <a:t>gw</a:t>
-                </a:r>
-                <a:r>
                   <a:rPr lang="en-US" sz="1100" i="1" dirty="0" smtClean="0"/>
-                  <a:t>::Motor*  2 </a:t>
+                  <a:t>gw::Motor*  2 </a:t>
                 </a:r>
               </a:p>
             </p:txBody>
@@ -5610,7 +5573,7 @@
           </p:nvSpPr>
           <p:spPr>
             <a:xfrm>
-              <a:off x="1017310" y="3581400"/>
+              <a:off x="1017310" y="3604071"/>
               <a:ext cx="1280160" cy="274320"/>
             </a:xfrm>
             <a:prstGeom prst="rect">
@@ -5716,10 +5679,9 @@
               <a:p>
                 <a:pPr algn="r"/>
                 <a:r>
-                  <a:rPr lang="en-US" sz="1200" dirty="0" err="1" smtClean="0"/>
+                  <a:rPr lang="en-US" sz="1200" dirty="0" smtClean="0"/>
                   <a:t>Five_pt_scan_msg</a:t>
                 </a:r>
-                <a:endParaRPr lang="en-US" sz="1200" dirty="0" smtClean="0"/>
               </a:p>
             </p:txBody>
           </p:sp>
@@ -5746,12 +5708,8 @@
               <a:lstStyle/>
               <a:p>
                 <a:r>
-                  <a:rPr lang="en-US" sz="1100" i="1" dirty="0" err="1" smtClean="0"/>
-                  <a:t>Servo.h</a:t>
-                </a:r>
-                <a:r>
                   <a:rPr lang="en-US" sz="1100" i="1" dirty="0" smtClean="0"/>
-                  <a:t> x2</a:t>
+                  <a:t>Servo.h x2</a:t>
                 </a:r>
               </a:p>
               <a:p>
@@ -5829,10 +5787,9 @@
             <a:p>
               <a:pPr algn="ctr"/>
               <a:r>
-                <a:rPr lang="en-US" sz="1200" b="1" dirty="0" err="1" smtClean="0"/>
+                <a:rPr lang="en-US" sz="1200" b="1" dirty="0" smtClean="0"/>
                 <a:t>Rover_plant</a:t>
               </a:r>
-              <a:endParaRPr lang="en-US" sz="1200" b="1" dirty="0" smtClean="0"/>
             </a:p>
           </p:txBody>
         </p:sp>
@@ -5919,12 +5876,8 @@
               <a:lstStyle/>
               <a:p>
                 <a:r>
-                  <a:rPr lang="en-US" sz="1100" i="1" dirty="0" err="1" smtClean="0"/>
-                  <a:t>gw</a:t>
-                </a:r>
-                <a:r>
                   <a:rPr lang="en-US" sz="1100" i="1" dirty="0" smtClean="0"/>
-                  <a:t>::Motor*  2 </a:t>
+                  <a:t>gw::Motor*  2 </a:t>
                 </a:r>
               </a:p>
             </p:txBody>
@@ -6005,8 +5958,8 @@
         </p:nvSpPr>
         <p:spPr>
           <a:xfrm>
-            <a:off x="285790" y="1600199"/>
-            <a:ext cx="3298450" cy="461665"/>
+            <a:off x="285789" y="1600199"/>
+            <a:ext cx="4076115" cy="461665"/>
           </a:xfrm>
           <a:prstGeom prst="rect">
             <a:avLst/>
@@ -6035,7 +5988,18 @@
                 </a:solidFill>
                 <a:latin typeface="Cooper Black" panose="0208090404030B020404" pitchFamily="18" charset="0"/>
               </a:rPr>
-              <a:t>Whisker_bot.ino</a:t>
+              <a:t>Light_whisker</a:t>
+            </a:r>
+            <a:r>
+              <a:rPr lang="en-US" sz="2400" dirty="0" err="1" smtClean="0">
+                <a:solidFill>
+                  <a:schemeClr val="bg2">
+                    <a:lumMod val="50000"/>
+                  </a:schemeClr>
+                </a:solidFill>
+                <a:latin typeface="Cooper Black" panose="0208090404030B020404" pitchFamily="18" charset="0"/>
+              </a:rPr>
+              <a:t>_bot.ino</a:t>
             </a:r>
             <a:endParaRPr lang="en-US" sz="2400" dirty="0" smtClean="0">
               <a:solidFill>
@@ -6056,10 +6020,10 @@
         </p:nvGrpSpPr>
         <p:grpSpPr>
           <a:xfrm>
-            <a:off x="3581400" y="3048000"/>
-            <a:ext cx="1587715" cy="1284728"/>
+            <a:off x="3581400" y="3048003"/>
+            <a:ext cx="1587715" cy="1264979"/>
             <a:chOff x="3584240" y="2600379"/>
-            <a:chExt cx="1596794" cy="1297567"/>
+            <a:chExt cx="1596794" cy="1277619"/>
           </a:xfrm>
         </p:grpSpPr>
         <p:sp>
@@ -6070,8 +6034,8 @@
           </p:nvSpPr>
           <p:spPr>
             <a:xfrm>
-              <a:off x="3737511" y="3431667"/>
-              <a:ext cx="1309877" cy="466279"/>
+              <a:off x="3638075" y="3590796"/>
+              <a:ext cx="1493301" cy="279767"/>
             </a:xfrm>
             <a:prstGeom prst="rect">
               <a:avLst/>
@@ -6086,8 +6050,8 @@
             <a:p>
               <a:pPr algn="ctr"/>
               <a:r>
-                <a:rPr lang="en-US" sz="1200" b="1" dirty="0" err="1" smtClean="0"/>
-                <a:t>Whisker_bumpercontroller</a:t>
+                <a:rPr lang="en-US" sz="1200" b="1" dirty="0" smtClean="0"/>
+                <a:t>Whisker_controller</a:t>
               </a:r>
               <a:endParaRPr lang="en-US" sz="1200" b="1" dirty="0" smtClean="0"/>
             </a:p>
@@ -6177,18 +6141,16 @@
               <a:p>
                 <a:pPr algn="r"/>
                 <a:r>
-                  <a:rPr lang="en-US" sz="1200" dirty="0" err="1" smtClean="0"/>
+                  <a:rPr lang="en-US" sz="1200" dirty="0" smtClean="0"/>
                   <a:t>Cmd_led_msg</a:t>
                 </a:r>
-                <a:endParaRPr lang="en-US" sz="1200" dirty="0" smtClean="0"/>
               </a:p>
               <a:p>
                 <a:pPr algn="r"/>
                 <a:r>
-                  <a:rPr lang="en-US" sz="1200" dirty="0" err="1" smtClean="0"/>
+                  <a:rPr lang="en-US" sz="1200" dirty="0" smtClean="0"/>
                   <a:t>Cmd_velocity_msg</a:t>
                 </a:r>
-                <a:endParaRPr lang="en-US" sz="1200" dirty="0" smtClean="0"/>
               </a:p>
             </p:txBody>
           </p:sp>
@@ -6232,10 +6194,9 @@
             <a:p>
               <a:pPr algn="ctr"/>
               <a:r>
-                <a:rPr lang="en-US" sz="1200" b="1" dirty="0" err="1" smtClean="0"/>
+                <a:rPr lang="en-US" sz="1200" b="1" dirty="0" smtClean="0"/>
                 <a:t>Light_plant</a:t>
               </a:r>
-              <a:endParaRPr lang="en-US" sz="1200" b="1" dirty="0" smtClean="0"/>
             </a:p>
           </p:txBody>
         </p:sp>
@@ -6322,12 +6283,8 @@
               <a:lstStyle/>
               <a:p>
                 <a:r>
-                  <a:rPr lang="en-US" sz="1100" i="1" dirty="0" err="1" smtClean="0"/>
-                  <a:t>gw</a:t>
-                </a:r>
-                <a:r>
                   <a:rPr lang="en-US" sz="1100" i="1" dirty="0" smtClean="0"/>
-                  <a:t>::Led*  5 </a:t>
+                  <a:t>gw::Led*  5 </a:t>
                 </a:r>
               </a:p>
             </p:txBody>
@@ -6446,6 +6403,1260 @@
     <p:extLst>
       <p:ext uri="{BB962C8B-B14F-4D97-AF65-F5344CB8AC3E}">
         <p14:creationId xmlns:p14="http://schemas.microsoft.com/office/powerpoint/2010/main" val="2737365561"/>
+      </p:ext>
+    </p:extLst>
+  </p:cSld>
+  <p:clrMapOvr>
+    <a:masterClrMapping/>
+  </p:clrMapOvr>
+</p:sld>
+</file>
+
+<file path=ppt/slides/slide5.xml><?xml version="1.0" encoding="utf-8"?>
+<p:sld xmlns:a="http://schemas.openxmlformats.org/drawingml/2006/main" xmlns:r="http://schemas.openxmlformats.org/officeDocument/2006/relationships" xmlns:p="http://schemas.openxmlformats.org/presentationml/2006/main">
+  <p:cSld>
+    <p:spTree>
+      <p:nvGrpSpPr>
+        <p:cNvPr id="1" name=""/>
+        <p:cNvGrpSpPr/>
+        <p:nvPr/>
+      </p:nvGrpSpPr>
+      <p:grpSpPr>
+        <a:xfrm>
+          <a:off x="0" y="0"/>
+          <a:ext cx="0" cy="0"/>
+          <a:chOff x="0" y="0"/>
+          <a:chExt cx="0" cy="0"/>
+        </a:xfrm>
+      </p:grpSpPr>
+      <p:sp>
+        <p:nvSpPr>
+          <p:cNvPr id="72" name="Title 71"/>
+          <p:cNvSpPr>
+            <a:spLocks noGrp="1"/>
+          </p:cNvSpPr>
+          <p:nvPr>
+            <p:ph type="title"/>
+          </p:nvPr>
+        </p:nvSpPr>
+        <p:spPr>
+          <a:xfrm>
+            <a:off x="457200" y="76200"/>
+            <a:ext cx="8229600" cy="1143000"/>
+          </a:xfrm>
+        </p:spPr>
+        <p:txBody>
+          <a:bodyPr>
+            <a:normAutofit fontScale="90000"/>
+          </a:bodyPr>
+          <a:lstStyle/>
+          <a:p>
+            <a:r>
+              <a:rPr lang="en-US" dirty="0" smtClean="0"/>
+              <a:t>ALFRED: </a:t>
+            </a:r>
+            <a:r>
+              <a:rPr lang="en-US" dirty="0" smtClean="0"/>
+              <a:t>Scan, Bump and </a:t>
+            </a:r>
+            <a:r>
+              <a:rPr lang="en-US" dirty="0" smtClean="0"/>
+              <a:t>Wander</a:t>
+            </a:r>
+            <a:br>
+              <a:rPr lang="en-US" dirty="0" smtClean="0"/>
+            </a:br>
+            <a:r>
+              <a:rPr lang="en-US" dirty="0" smtClean="0"/>
+              <a:t>with Lights</a:t>
+            </a:r>
+            <a:endParaRPr lang="en-US" dirty="0"/>
+          </a:p>
+        </p:txBody>
+      </p:sp>
+      <p:sp>
+        <p:nvSpPr>
+          <p:cNvPr id="108" name="TextBox 107"/>
+          <p:cNvSpPr txBox="1"/>
+          <p:nvPr/>
+        </p:nvSpPr>
+        <p:spPr>
+          <a:xfrm>
+            <a:off x="913410" y="4953000"/>
+            <a:ext cx="3429001" cy="1384995"/>
+          </a:xfrm>
+          <a:prstGeom prst="rect">
+            <a:avLst/>
+          </a:prstGeom>
+          <a:noFill/>
+          <a:ln>
+            <a:solidFill>
+              <a:schemeClr val="bg2">
+                <a:lumMod val="50000"/>
+              </a:schemeClr>
+            </a:solidFill>
+          </a:ln>
+        </p:spPr>
+        <p:txBody>
+          <a:bodyPr wrap="square" rtlCol="0">
+            <a:spAutoFit/>
+          </a:bodyPr>
+          <a:lstStyle/>
+          <a:p>
+            <a:r>
+              <a:rPr lang="en-US" sz="1200" dirty="0" smtClean="0"/>
+              <a:t>NOTES:</a:t>
+            </a:r>
+          </a:p>
+          <a:p>
+            <a:pPr marL="171450" indent="-171450">
+              <a:buFontTx/>
+              <a:buChar char="-"/>
+            </a:pPr>
+            <a:r>
+              <a:rPr lang="en-US" sz="1200" dirty="0" smtClean="0"/>
+              <a:t>This bot implements obstacle avoidance by rotating an ultrasonic sensor with an attached servo.  </a:t>
+            </a:r>
+          </a:p>
+          <a:p>
+            <a:pPr marL="171450" indent="-171450">
+              <a:buFontTx/>
+              <a:buChar char="-"/>
+            </a:pPr>
+            <a:r>
+              <a:rPr lang="en-US" sz="1200" dirty="0" smtClean="0"/>
+              <a:t>This version adds the light plant to give a visual indication of which “whisker” was tripped by an obstacle.</a:t>
+            </a:r>
+          </a:p>
+        </p:txBody>
+      </p:sp>
+      <p:grpSp>
+        <p:nvGrpSpPr>
+          <p:cNvPr id="21" name="Group 20"/>
+          <p:cNvGrpSpPr/>
+          <p:nvPr/>
+        </p:nvGrpSpPr>
+        <p:grpSpPr>
+          <a:xfrm>
+            <a:off x="838200" y="3429000"/>
+            <a:ext cx="1638381" cy="1277618"/>
+            <a:chOff x="838200" y="2615714"/>
+            <a:chExt cx="1638381" cy="1277618"/>
+          </a:xfrm>
+        </p:grpSpPr>
+        <p:sp>
+          <p:nvSpPr>
+            <p:cNvPr id="42" name="TextBox 41"/>
+            <p:cNvSpPr txBox="1"/>
+            <p:nvPr/>
+          </p:nvSpPr>
+          <p:spPr>
+            <a:xfrm>
+              <a:off x="1017310" y="3604071"/>
+              <a:ext cx="1280160" cy="274320"/>
+            </a:xfrm>
+            <a:prstGeom prst="rect">
+              <a:avLst/>
+            </a:prstGeom>
+            <a:noFill/>
+          </p:spPr>
+          <p:txBody>
+            <a:bodyPr wrap="square" rtlCol="0">
+              <a:spAutoFit/>
+            </a:bodyPr>
+            <a:lstStyle/>
+            <a:p>
+              <a:pPr algn="ctr"/>
+              <a:r>
+                <a:rPr lang="en-US" sz="1200" b="1" dirty="0" smtClean="0"/>
+                <a:t>Scanner_5pt</a:t>
+              </a:r>
+            </a:p>
+          </p:txBody>
+        </p:sp>
+        <p:grpSp>
+          <p:nvGrpSpPr>
+            <p:cNvPr id="18" name="Group 17"/>
+            <p:cNvGrpSpPr/>
+            <p:nvPr/>
+          </p:nvGrpSpPr>
+          <p:grpSpPr>
+            <a:xfrm>
+              <a:off x="838200" y="2615714"/>
+              <a:ext cx="1638381" cy="1277618"/>
+              <a:chOff x="838200" y="2615714"/>
+              <a:chExt cx="1638381" cy="1277618"/>
+            </a:xfrm>
+          </p:grpSpPr>
+          <p:sp>
+            <p:nvSpPr>
+              <p:cNvPr id="41" name="Rectangle 40"/>
+              <p:cNvSpPr/>
+              <p:nvPr/>
+            </p:nvSpPr>
+            <p:spPr>
+              <a:xfrm>
+                <a:off x="838200" y="2615714"/>
+                <a:ext cx="1569938" cy="1277618"/>
+              </a:xfrm>
+              <a:prstGeom prst="rect">
+                <a:avLst/>
+              </a:prstGeom>
+              <a:noFill/>
+            </p:spPr>
+            <p:style>
+              <a:lnRef idx="2">
+                <a:schemeClr val="accent1">
+                  <a:shade val="50000"/>
+                </a:schemeClr>
+              </a:lnRef>
+              <a:fillRef idx="1">
+                <a:schemeClr val="accent1"/>
+              </a:fillRef>
+              <a:effectRef idx="0">
+                <a:schemeClr val="accent1"/>
+              </a:effectRef>
+              <a:fontRef idx="minor">
+                <a:schemeClr val="lt1"/>
+              </a:fontRef>
+            </p:style>
+            <p:txBody>
+              <a:bodyPr rot="0" spcFirstLastPara="0" vertOverflow="overflow" horzOverflow="overflow" vert="horz" wrap="square" lIns="91440" tIns="45720" rIns="91440" bIns="45720" numCol="1" spcCol="0" rtlCol="0" fromWordArt="0" anchor="ctr" anchorCtr="0" forceAA="0" compatLnSpc="1">
+                <a:prstTxWarp prst="textNoShape">
+                  <a:avLst/>
+                </a:prstTxWarp>
+                <a:noAutofit/>
+              </a:bodyPr>
+              <a:lstStyle/>
+              <a:p>
+                <a:pPr algn="ctr"/>
+                <a:endParaRPr lang="en-US"/>
+              </a:p>
+            </p:txBody>
+          </p:sp>
+          <p:sp>
+            <p:nvSpPr>
+              <p:cNvPr id="43" name="TextBox 42"/>
+              <p:cNvSpPr txBox="1"/>
+              <p:nvPr/>
+            </p:nvSpPr>
+            <p:spPr>
+              <a:xfrm>
+                <a:off x="1006736" y="2872115"/>
+                <a:ext cx="1469845" cy="276999"/>
+              </a:xfrm>
+              <a:prstGeom prst="rect">
+                <a:avLst/>
+              </a:prstGeom>
+              <a:noFill/>
+            </p:spPr>
+            <p:txBody>
+              <a:bodyPr wrap="square" rtlCol="0">
+                <a:spAutoFit/>
+              </a:bodyPr>
+              <a:lstStyle/>
+              <a:p>
+                <a:pPr algn="r"/>
+                <a:r>
+                  <a:rPr lang="en-US" sz="1200" dirty="0" smtClean="0"/>
+                  <a:t>Five_pt_scan_msg</a:t>
+                </a:r>
+              </a:p>
+            </p:txBody>
+          </p:sp>
+          <p:sp>
+            <p:nvSpPr>
+              <p:cNvPr id="111" name="TextBox 110"/>
+              <p:cNvSpPr txBox="1"/>
+              <p:nvPr/>
+            </p:nvSpPr>
+            <p:spPr>
+              <a:xfrm>
+                <a:off x="926709" y="3130118"/>
+                <a:ext cx="1392920" cy="430887"/>
+              </a:xfrm>
+              <a:prstGeom prst="rect">
+                <a:avLst/>
+              </a:prstGeom>
+              <a:noFill/>
+            </p:spPr>
+            <p:txBody>
+              <a:bodyPr wrap="square" rtlCol="0">
+                <a:spAutoFit/>
+              </a:bodyPr>
+              <a:lstStyle/>
+              <a:p>
+                <a:r>
+                  <a:rPr lang="en-US" sz="1100" i="1" dirty="0" smtClean="0"/>
+                  <a:t>Servo.h x2</a:t>
+                </a:r>
+              </a:p>
+              <a:p>
+                <a:r>
+                  <a:rPr lang="en-US" sz="1100" i="1" dirty="0" smtClean="0"/>
+                  <a:t>Parallax PING))) x 1</a:t>
+                </a:r>
+              </a:p>
+            </p:txBody>
+          </p:sp>
+        </p:grpSp>
+      </p:grpSp>
+      <p:sp>
+        <p:nvSpPr>
+          <p:cNvPr id="13" name="TextBox 12"/>
+          <p:cNvSpPr txBox="1"/>
+          <p:nvPr/>
+        </p:nvSpPr>
+        <p:spPr>
+          <a:xfrm>
+            <a:off x="7013678" y="3773395"/>
+            <a:ext cx="954977" cy="276999"/>
+          </a:xfrm>
+          <a:prstGeom prst="rect">
+            <a:avLst/>
+          </a:prstGeom>
+          <a:noFill/>
+        </p:spPr>
+        <p:txBody>
+          <a:bodyPr wrap="square" rtlCol="0">
+            <a:spAutoFit/>
+          </a:bodyPr>
+          <a:lstStyle/>
+          <a:p>
+            <a:pPr algn="r"/>
+            <a:endParaRPr lang="en-US" sz="1200" dirty="0" smtClean="0"/>
+          </a:p>
+        </p:txBody>
+      </p:sp>
+      <p:grpSp>
+        <p:nvGrpSpPr>
+          <p:cNvPr id="2" name="Group 1"/>
+          <p:cNvGrpSpPr/>
+          <p:nvPr/>
+        </p:nvGrpSpPr>
+        <p:grpSpPr>
+          <a:xfrm>
+            <a:off x="6344101" y="3429000"/>
+            <a:ext cx="1569936" cy="1277617"/>
+            <a:chOff x="6344101" y="2591909"/>
+            <a:chExt cx="1569936" cy="1277617"/>
+          </a:xfrm>
+        </p:grpSpPr>
+        <p:sp>
+          <p:nvSpPr>
+            <p:cNvPr id="9" name="TextBox 8"/>
+            <p:cNvSpPr txBox="1"/>
+            <p:nvPr/>
+          </p:nvSpPr>
+          <p:spPr>
+            <a:xfrm>
+              <a:off x="6488989" y="3581400"/>
+              <a:ext cx="1280160" cy="274320"/>
+            </a:xfrm>
+            <a:prstGeom prst="rect">
+              <a:avLst/>
+            </a:prstGeom>
+            <a:noFill/>
+          </p:spPr>
+          <p:txBody>
+            <a:bodyPr wrap="square" rtlCol="0">
+              <a:spAutoFit/>
+            </a:bodyPr>
+            <a:lstStyle/>
+            <a:p>
+              <a:pPr algn="ctr"/>
+              <a:r>
+                <a:rPr lang="en-US" sz="1200" b="1" dirty="0" smtClean="0"/>
+                <a:t>Rover_plant</a:t>
+              </a:r>
+            </a:p>
+          </p:txBody>
+        </p:sp>
+        <p:grpSp>
+          <p:nvGrpSpPr>
+            <p:cNvPr id="22" name="Group 21"/>
+            <p:cNvGrpSpPr/>
+            <p:nvPr/>
+          </p:nvGrpSpPr>
+          <p:grpSpPr>
+            <a:xfrm>
+              <a:off x="6344101" y="2591909"/>
+              <a:ext cx="1569936" cy="1277617"/>
+              <a:chOff x="6338034" y="2591909"/>
+              <a:chExt cx="1569936" cy="1277617"/>
+            </a:xfrm>
+          </p:grpSpPr>
+          <p:sp>
+            <p:nvSpPr>
+              <p:cNvPr id="6" name="Rectangle 5"/>
+              <p:cNvSpPr/>
+              <p:nvPr/>
+            </p:nvSpPr>
+            <p:spPr>
+              <a:xfrm>
+                <a:off x="6338034" y="2591909"/>
+                <a:ext cx="1569936" cy="1277617"/>
+              </a:xfrm>
+              <a:prstGeom prst="rect">
+                <a:avLst/>
+              </a:prstGeom>
+              <a:noFill/>
+            </p:spPr>
+            <p:style>
+              <a:lnRef idx="2">
+                <a:schemeClr val="accent1">
+                  <a:shade val="50000"/>
+                </a:schemeClr>
+              </a:lnRef>
+              <a:fillRef idx="1">
+                <a:schemeClr val="accent1"/>
+              </a:fillRef>
+              <a:effectRef idx="0">
+                <a:schemeClr val="accent1"/>
+              </a:effectRef>
+              <a:fontRef idx="minor">
+                <a:schemeClr val="lt1"/>
+              </a:fontRef>
+            </p:style>
+            <p:txBody>
+              <a:bodyPr rot="0" spcFirstLastPara="0" vertOverflow="overflow" horzOverflow="overflow" vert="horz" wrap="square" lIns="91440" tIns="45720" rIns="91440" bIns="45720" numCol="1" spcCol="0" rtlCol="0" fromWordArt="0" anchor="ctr" anchorCtr="0" forceAA="0" compatLnSpc="1">
+                <a:prstTxWarp prst="textNoShape">
+                  <a:avLst/>
+                </a:prstTxWarp>
+                <a:noAutofit/>
+              </a:bodyPr>
+              <a:lstStyle/>
+              <a:p>
+                <a:pPr algn="ctr"/>
+                <a:endParaRPr lang="en-US"/>
+              </a:p>
+            </p:txBody>
+          </p:sp>
+          <p:sp>
+            <p:nvSpPr>
+              <p:cNvPr id="38" name="TextBox 37"/>
+              <p:cNvSpPr txBox="1"/>
+              <p:nvPr/>
+            </p:nvSpPr>
+            <p:spPr>
+              <a:xfrm>
+                <a:off x="6382054" y="3091190"/>
+                <a:ext cx="1392920" cy="261610"/>
+              </a:xfrm>
+              <a:prstGeom prst="rect">
+                <a:avLst/>
+              </a:prstGeom>
+              <a:noFill/>
+            </p:spPr>
+            <p:txBody>
+              <a:bodyPr wrap="square" rtlCol="0">
+                <a:spAutoFit/>
+              </a:bodyPr>
+              <a:lstStyle/>
+              <a:p>
+                <a:r>
+                  <a:rPr lang="en-US" sz="1100" i="1" dirty="0" smtClean="0"/>
+                  <a:t>gw::Motor*  2 </a:t>
+                </a:r>
+              </a:p>
+            </p:txBody>
+          </p:sp>
+        </p:grpSp>
+      </p:grpSp>
+      <p:cxnSp>
+        <p:nvCxnSpPr>
+          <p:cNvPr id="16" name="Straight Arrow Connector 15"/>
+          <p:cNvCxnSpPr/>
+          <p:nvPr/>
+        </p:nvCxnSpPr>
+        <p:spPr>
+          <a:xfrm>
+            <a:off x="2408138" y="3847155"/>
+            <a:ext cx="1176102" cy="0"/>
+          </a:xfrm>
+          <a:prstGeom prst="straightConnector1">
+            <a:avLst/>
+          </a:prstGeom>
+          <a:ln>
+            <a:tailEnd type="arrow"/>
+          </a:ln>
+        </p:spPr>
+        <p:style>
+          <a:lnRef idx="1">
+            <a:schemeClr val="accent1"/>
+          </a:lnRef>
+          <a:fillRef idx="0">
+            <a:schemeClr val="accent1"/>
+          </a:fillRef>
+          <a:effectRef idx="0">
+            <a:schemeClr val="accent1"/>
+          </a:effectRef>
+          <a:fontRef idx="minor">
+            <a:schemeClr val="tx1"/>
+          </a:fontRef>
+        </p:style>
+      </p:cxnSp>
+      <p:cxnSp>
+        <p:nvCxnSpPr>
+          <p:cNvPr id="54" name="Straight Arrow Connector 53"/>
+          <p:cNvCxnSpPr/>
+          <p:nvPr/>
+        </p:nvCxnSpPr>
+        <p:spPr>
+          <a:xfrm>
+            <a:off x="5181600" y="3962400"/>
+            <a:ext cx="1176102" cy="0"/>
+          </a:xfrm>
+          <a:prstGeom prst="straightConnector1">
+            <a:avLst/>
+          </a:prstGeom>
+          <a:ln>
+            <a:tailEnd type="arrow"/>
+          </a:ln>
+        </p:spPr>
+        <p:style>
+          <a:lnRef idx="1">
+            <a:schemeClr val="accent1"/>
+          </a:lnRef>
+          <a:fillRef idx="0">
+            <a:schemeClr val="accent1"/>
+          </a:fillRef>
+          <a:effectRef idx="0">
+            <a:schemeClr val="accent1"/>
+          </a:effectRef>
+          <a:fontRef idx="minor">
+            <a:schemeClr val="tx1"/>
+          </a:fontRef>
+        </p:style>
+      </p:cxnSp>
+      <p:sp>
+        <p:nvSpPr>
+          <p:cNvPr id="24" name="TextBox 23"/>
+          <p:cNvSpPr txBox="1"/>
+          <p:nvPr/>
+        </p:nvSpPr>
+        <p:spPr>
+          <a:xfrm>
+            <a:off x="285790" y="1371600"/>
+            <a:ext cx="3298450" cy="461665"/>
+          </a:xfrm>
+          <a:prstGeom prst="rect">
+            <a:avLst/>
+          </a:prstGeom>
+          <a:noFill/>
+          <a:ln>
+            <a:solidFill>
+              <a:schemeClr val="bg2">
+                <a:lumMod val="75000"/>
+              </a:schemeClr>
+            </a:solidFill>
+          </a:ln>
+        </p:spPr>
+        <p:txBody>
+          <a:bodyPr wrap="square" rtlCol="0">
+            <a:spAutoFit/>
+          </a:bodyPr>
+          <a:lstStyle/>
+          <a:p>
+            <a:r>
+              <a:rPr lang="en-US" sz="2400" dirty="0" err="1" smtClean="0">
+                <a:solidFill>
+                  <a:schemeClr val="bg2">
+                    <a:lumMod val="50000"/>
+                  </a:schemeClr>
+                </a:solidFill>
+                <a:latin typeface="Cooper Black" panose="0208090404030B020404" pitchFamily="18" charset="0"/>
+              </a:rPr>
+              <a:t>SBW</a:t>
+            </a:r>
+            <a:r>
+              <a:rPr lang="en-US" sz="2400" dirty="0" err="1" smtClean="0">
+                <a:solidFill>
+                  <a:schemeClr val="bg2">
+                    <a:lumMod val="50000"/>
+                  </a:schemeClr>
+                </a:solidFill>
+                <a:latin typeface="Cooper Black" panose="0208090404030B020404" pitchFamily="18" charset="0"/>
+              </a:rPr>
+              <a:t>_bot.ino</a:t>
+            </a:r>
+            <a:endParaRPr lang="en-US" sz="2400" dirty="0" smtClean="0">
+              <a:solidFill>
+                <a:schemeClr val="bg2">
+                  <a:lumMod val="50000"/>
+                </a:schemeClr>
+              </a:solidFill>
+              <a:latin typeface="Cooper Black" panose="0208090404030B020404" pitchFamily="18" charset="0"/>
+            </a:endParaRPr>
+          </a:p>
+        </p:txBody>
+      </p:sp>
+      <p:grpSp>
+        <p:nvGrpSpPr>
+          <p:cNvPr id="25" name="Group 24"/>
+          <p:cNvGrpSpPr/>
+          <p:nvPr/>
+        </p:nvGrpSpPr>
+        <p:grpSpPr>
+          <a:xfrm>
+            <a:off x="3581400" y="3429003"/>
+            <a:ext cx="1587715" cy="1264979"/>
+            <a:chOff x="3584240" y="2600379"/>
+            <a:chExt cx="1596794" cy="1277619"/>
+          </a:xfrm>
+        </p:grpSpPr>
+        <p:sp>
+          <p:nvSpPr>
+            <p:cNvPr id="26" name="TextBox 25"/>
+            <p:cNvSpPr txBox="1"/>
+            <p:nvPr/>
+          </p:nvSpPr>
+          <p:spPr>
+            <a:xfrm>
+              <a:off x="3638075" y="3590796"/>
+              <a:ext cx="1493301" cy="279767"/>
+            </a:xfrm>
+            <a:prstGeom prst="rect">
+              <a:avLst/>
+            </a:prstGeom>
+            <a:noFill/>
+          </p:spPr>
+          <p:txBody>
+            <a:bodyPr wrap="square" rtlCol="0">
+              <a:spAutoFit/>
+            </a:bodyPr>
+            <a:lstStyle/>
+            <a:p>
+              <a:pPr algn="ctr"/>
+              <a:r>
+                <a:rPr lang="en-US" sz="1200" b="1" dirty="0" smtClean="0"/>
+                <a:t>Whisker_controller</a:t>
+              </a:r>
+              <a:endParaRPr lang="en-US" sz="1200" b="1" dirty="0" smtClean="0"/>
+            </a:p>
+          </p:txBody>
+        </p:sp>
+        <p:grpSp>
+          <p:nvGrpSpPr>
+            <p:cNvPr id="27" name="Group 26"/>
+            <p:cNvGrpSpPr/>
+            <p:nvPr/>
+          </p:nvGrpSpPr>
+          <p:grpSpPr>
+            <a:xfrm>
+              <a:off x="3584240" y="2600379"/>
+              <a:ext cx="1596794" cy="1277619"/>
+              <a:chOff x="3584240" y="2600379"/>
+              <a:chExt cx="1596794" cy="1277619"/>
+            </a:xfrm>
+          </p:grpSpPr>
+          <p:sp>
+            <p:nvSpPr>
+              <p:cNvPr id="28" name="Rectangle 27"/>
+              <p:cNvSpPr/>
+              <p:nvPr/>
+            </p:nvSpPr>
+            <p:spPr>
+              <a:xfrm>
+                <a:off x="3584240" y="2600379"/>
+                <a:ext cx="1569936" cy="1277619"/>
+              </a:xfrm>
+              <a:prstGeom prst="rect">
+                <a:avLst/>
+              </a:prstGeom>
+              <a:noFill/>
+            </p:spPr>
+            <p:style>
+              <a:lnRef idx="2">
+                <a:schemeClr val="accent1">
+                  <a:shade val="50000"/>
+                </a:schemeClr>
+              </a:lnRef>
+              <a:fillRef idx="1">
+                <a:schemeClr val="accent1"/>
+              </a:fillRef>
+              <a:effectRef idx="0">
+                <a:schemeClr val="accent1"/>
+              </a:effectRef>
+              <a:fontRef idx="minor">
+                <a:schemeClr val="lt1"/>
+              </a:fontRef>
+            </p:style>
+            <p:txBody>
+              <a:bodyPr rot="0" spcFirstLastPara="0" vertOverflow="overflow" horzOverflow="overflow" vert="horz" wrap="square" lIns="91440" tIns="45720" rIns="91440" bIns="45720" numCol="1" spcCol="0" rtlCol="0" fromWordArt="0" anchor="ctr" anchorCtr="0" forceAA="0" compatLnSpc="1">
+                <a:prstTxWarp prst="textNoShape">
+                  <a:avLst/>
+                </a:prstTxWarp>
+                <a:noAutofit/>
+              </a:bodyPr>
+              <a:lstStyle/>
+              <a:p>
+                <a:pPr algn="ctr"/>
+                <a:endParaRPr lang="en-US"/>
+              </a:p>
+            </p:txBody>
+          </p:sp>
+          <p:sp>
+            <p:nvSpPr>
+              <p:cNvPr id="29" name="TextBox 28"/>
+              <p:cNvSpPr txBox="1"/>
+              <p:nvPr/>
+            </p:nvSpPr>
+            <p:spPr>
+              <a:xfrm>
+                <a:off x="3760312" y="2791265"/>
+                <a:ext cx="1420722" cy="461665"/>
+              </a:xfrm>
+              <a:prstGeom prst="rect">
+                <a:avLst/>
+              </a:prstGeom>
+              <a:noFill/>
+            </p:spPr>
+            <p:txBody>
+              <a:bodyPr wrap="square" rtlCol="0">
+                <a:spAutoFit/>
+              </a:bodyPr>
+              <a:lstStyle/>
+              <a:p>
+                <a:pPr algn="r"/>
+                <a:r>
+                  <a:rPr lang="en-US" sz="1200" dirty="0" smtClean="0"/>
+                  <a:t>Cmd_led_msg</a:t>
+                </a:r>
+              </a:p>
+              <a:p>
+                <a:pPr algn="r"/>
+                <a:r>
+                  <a:rPr lang="en-US" sz="1200" dirty="0" smtClean="0"/>
+                  <a:t>Cmd_velocity_msg</a:t>
+                </a:r>
+              </a:p>
+            </p:txBody>
+          </p:sp>
+        </p:grpSp>
+      </p:grpSp>
+      <p:grpSp>
+        <p:nvGrpSpPr>
+          <p:cNvPr id="30" name="Group 29"/>
+          <p:cNvGrpSpPr/>
+          <p:nvPr/>
+        </p:nvGrpSpPr>
+        <p:grpSpPr>
+          <a:xfrm>
+            <a:off x="6352024" y="1905000"/>
+            <a:ext cx="1569936" cy="1277617"/>
+            <a:chOff x="6344101" y="3118177"/>
+            <a:chExt cx="1569936" cy="1277617"/>
+          </a:xfrm>
+        </p:grpSpPr>
+        <p:sp>
+          <p:nvSpPr>
+            <p:cNvPr id="31" name="TextBox 30"/>
+            <p:cNvSpPr txBox="1"/>
+            <p:nvPr/>
+          </p:nvSpPr>
+          <p:spPr>
+            <a:xfrm>
+              <a:off x="6488989" y="4107668"/>
+              <a:ext cx="1280160" cy="274320"/>
+            </a:xfrm>
+            <a:prstGeom prst="rect">
+              <a:avLst/>
+            </a:prstGeom>
+            <a:noFill/>
+          </p:spPr>
+          <p:txBody>
+            <a:bodyPr wrap="square" rtlCol="0">
+              <a:spAutoFit/>
+            </a:bodyPr>
+            <a:lstStyle/>
+            <a:p>
+              <a:pPr algn="ctr"/>
+              <a:r>
+                <a:rPr lang="en-US" sz="1200" b="1" dirty="0" smtClean="0"/>
+                <a:t>Light_plant</a:t>
+              </a:r>
+            </a:p>
+          </p:txBody>
+        </p:sp>
+        <p:grpSp>
+          <p:nvGrpSpPr>
+            <p:cNvPr id="32" name="Group 31"/>
+            <p:cNvGrpSpPr/>
+            <p:nvPr/>
+          </p:nvGrpSpPr>
+          <p:grpSpPr>
+            <a:xfrm>
+              <a:off x="6344101" y="3118177"/>
+              <a:ext cx="1569936" cy="1277617"/>
+              <a:chOff x="6338034" y="2591909"/>
+              <a:chExt cx="1569936" cy="1277617"/>
+            </a:xfrm>
+          </p:grpSpPr>
+          <p:sp>
+            <p:nvSpPr>
+              <p:cNvPr id="33" name="Rectangle 32"/>
+              <p:cNvSpPr/>
+              <p:nvPr/>
+            </p:nvSpPr>
+            <p:spPr>
+              <a:xfrm>
+                <a:off x="6338034" y="2591909"/>
+                <a:ext cx="1569936" cy="1277617"/>
+              </a:xfrm>
+              <a:prstGeom prst="rect">
+                <a:avLst/>
+              </a:prstGeom>
+              <a:noFill/>
+            </p:spPr>
+            <p:style>
+              <a:lnRef idx="2">
+                <a:schemeClr val="accent1">
+                  <a:shade val="50000"/>
+                </a:schemeClr>
+              </a:lnRef>
+              <a:fillRef idx="1">
+                <a:schemeClr val="accent1"/>
+              </a:fillRef>
+              <a:effectRef idx="0">
+                <a:schemeClr val="accent1"/>
+              </a:effectRef>
+              <a:fontRef idx="minor">
+                <a:schemeClr val="lt1"/>
+              </a:fontRef>
+            </p:style>
+            <p:txBody>
+              <a:bodyPr rot="0" spcFirstLastPara="0" vertOverflow="overflow" horzOverflow="overflow" vert="horz" wrap="square" lIns="91440" tIns="45720" rIns="91440" bIns="45720" numCol="1" spcCol="0" rtlCol="0" fromWordArt="0" anchor="ctr" anchorCtr="0" forceAA="0" compatLnSpc="1">
+                <a:prstTxWarp prst="textNoShape">
+                  <a:avLst/>
+                </a:prstTxWarp>
+                <a:noAutofit/>
+              </a:bodyPr>
+              <a:lstStyle/>
+              <a:p>
+                <a:pPr algn="ctr"/>
+                <a:endParaRPr lang="en-US"/>
+              </a:p>
+            </p:txBody>
+          </p:sp>
+          <p:sp>
+            <p:nvSpPr>
+              <p:cNvPr id="34" name="TextBox 33"/>
+              <p:cNvSpPr txBox="1"/>
+              <p:nvPr/>
+            </p:nvSpPr>
+            <p:spPr>
+              <a:xfrm>
+                <a:off x="6382054" y="3091190"/>
+                <a:ext cx="1392920" cy="261610"/>
+              </a:xfrm>
+              <a:prstGeom prst="rect">
+                <a:avLst/>
+              </a:prstGeom>
+              <a:noFill/>
+            </p:spPr>
+            <p:txBody>
+              <a:bodyPr wrap="square" rtlCol="0">
+                <a:spAutoFit/>
+              </a:bodyPr>
+              <a:lstStyle/>
+              <a:p>
+                <a:r>
+                  <a:rPr lang="en-US" sz="1100" i="1" dirty="0" smtClean="0"/>
+                  <a:t>gw::Led*  5 </a:t>
+                </a:r>
+              </a:p>
+            </p:txBody>
+          </p:sp>
+        </p:grpSp>
+      </p:grpSp>
+      <p:grpSp>
+        <p:nvGrpSpPr>
+          <p:cNvPr id="35" name="Group 34"/>
+          <p:cNvGrpSpPr/>
+          <p:nvPr/>
+        </p:nvGrpSpPr>
+        <p:grpSpPr>
+          <a:xfrm>
+            <a:off x="5174007" y="2259456"/>
+            <a:ext cx="1170424" cy="1535430"/>
+            <a:chOff x="5154176" y="1912132"/>
+            <a:chExt cx="1170424" cy="1535430"/>
+          </a:xfrm>
+        </p:grpSpPr>
+        <p:cxnSp>
+          <p:nvCxnSpPr>
+            <p:cNvPr id="36" name="Straight Connector 35"/>
+            <p:cNvCxnSpPr/>
+            <p:nvPr/>
+          </p:nvCxnSpPr>
+          <p:spPr>
+            <a:xfrm flipV="1">
+              <a:off x="5638800" y="1912132"/>
+              <a:ext cx="0" cy="1535430"/>
+            </a:xfrm>
+            <a:prstGeom prst="line">
+              <a:avLst/>
+            </a:prstGeom>
+          </p:spPr>
+          <p:style>
+            <a:lnRef idx="1">
+              <a:schemeClr val="accent1"/>
+            </a:lnRef>
+            <a:fillRef idx="0">
+              <a:schemeClr val="accent1"/>
+            </a:fillRef>
+            <a:effectRef idx="0">
+              <a:schemeClr val="accent1"/>
+            </a:effectRef>
+            <a:fontRef idx="minor">
+              <a:schemeClr val="tx1"/>
+            </a:fontRef>
+          </p:style>
+        </p:cxnSp>
+        <p:cxnSp>
+          <p:nvCxnSpPr>
+            <p:cNvPr id="37" name="Straight Arrow Connector 36"/>
+            <p:cNvCxnSpPr/>
+            <p:nvPr/>
+          </p:nvCxnSpPr>
+          <p:spPr>
+            <a:xfrm>
+              <a:off x="5638800" y="1912132"/>
+              <a:ext cx="685800" cy="0"/>
+            </a:xfrm>
+            <a:prstGeom prst="straightConnector1">
+              <a:avLst/>
+            </a:prstGeom>
+            <a:ln>
+              <a:tailEnd type="arrow"/>
+            </a:ln>
+          </p:spPr>
+          <p:style>
+            <a:lnRef idx="1">
+              <a:schemeClr val="accent1"/>
+            </a:lnRef>
+            <a:fillRef idx="0">
+              <a:schemeClr val="accent1"/>
+            </a:fillRef>
+            <a:effectRef idx="0">
+              <a:schemeClr val="accent1"/>
+            </a:effectRef>
+            <a:fontRef idx="minor">
+              <a:schemeClr val="tx1"/>
+            </a:fontRef>
+          </p:style>
+        </p:cxnSp>
+        <p:cxnSp>
+          <p:nvCxnSpPr>
+            <p:cNvPr id="39" name="Straight Connector 38"/>
+            <p:cNvCxnSpPr/>
+            <p:nvPr/>
+          </p:nvCxnSpPr>
+          <p:spPr>
+            <a:xfrm>
+              <a:off x="5154176" y="3447562"/>
+              <a:ext cx="484624" cy="0"/>
+            </a:xfrm>
+            <a:prstGeom prst="line">
+              <a:avLst/>
+            </a:prstGeom>
+          </p:spPr>
+          <p:style>
+            <a:lnRef idx="1">
+              <a:schemeClr val="accent1"/>
+            </a:lnRef>
+            <a:fillRef idx="0">
+              <a:schemeClr val="accent1"/>
+            </a:fillRef>
+            <a:effectRef idx="0">
+              <a:schemeClr val="accent1"/>
+            </a:effectRef>
+            <a:fontRef idx="minor">
+              <a:schemeClr val="tx1"/>
+            </a:fontRef>
+          </p:style>
+        </p:cxnSp>
+      </p:grpSp>
+      <p:grpSp>
+        <p:nvGrpSpPr>
+          <p:cNvPr id="40" name="Group 39"/>
+          <p:cNvGrpSpPr/>
+          <p:nvPr/>
+        </p:nvGrpSpPr>
+        <p:grpSpPr>
+          <a:xfrm>
+            <a:off x="838200" y="1981200"/>
+            <a:ext cx="1638381" cy="1277618"/>
+            <a:chOff x="838200" y="2615714"/>
+            <a:chExt cx="1638381" cy="1277618"/>
+          </a:xfrm>
+        </p:grpSpPr>
+        <p:sp>
+          <p:nvSpPr>
+            <p:cNvPr id="44" name="TextBox 43"/>
+            <p:cNvSpPr txBox="1"/>
+            <p:nvPr/>
+          </p:nvSpPr>
+          <p:spPr>
+            <a:xfrm>
+              <a:off x="1017310" y="3581400"/>
+              <a:ext cx="1280160" cy="274320"/>
+            </a:xfrm>
+            <a:prstGeom prst="rect">
+              <a:avLst/>
+            </a:prstGeom>
+            <a:noFill/>
+          </p:spPr>
+          <p:txBody>
+            <a:bodyPr wrap="square" rtlCol="0">
+              <a:spAutoFit/>
+            </a:bodyPr>
+            <a:lstStyle/>
+            <a:p>
+              <a:pPr algn="ctr"/>
+              <a:r>
+                <a:rPr lang="en-US" sz="1200" b="1" dirty="0" err="1" smtClean="0"/>
+                <a:t>Bumper_plant</a:t>
+              </a:r>
+              <a:endParaRPr lang="en-US" sz="1200" b="1" dirty="0" smtClean="0"/>
+            </a:p>
+          </p:txBody>
+        </p:sp>
+        <p:grpSp>
+          <p:nvGrpSpPr>
+            <p:cNvPr id="45" name="Group 44"/>
+            <p:cNvGrpSpPr/>
+            <p:nvPr/>
+          </p:nvGrpSpPr>
+          <p:grpSpPr>
+            <a:xfrm>
+              <a:off x="838200" y="2615714"/>
+              <a:ext cx="1638381" cy="1277618"/>
+              <a:chOff x="838200" y="2615714"/>
+              <a:chExt cx="1638381" cy="1277618"/>
+            </a:xfrm>
+          </p:grpSpPr>
+          <p:sp>
+            <p:nvSpPr>
+              <p:cNvPr id="46" name="Rectangle 45"/>
+              <p:cNvSpPr/>
+              <p:nvPr/>
+            </p:nvSpPr>
+            <p:spPr>
+              <a:xfrm>
+                <a:off x="838200" y="2615714"/>
+                <a:ext cx="1569938" cy="1277618"/>
+              </a:xfrm>
+              <a:prstGeom prst="rect">
+                <a:avLst/>
+              </a:prstGeom>
+              <a:noFill/>
+            </p:spPr>
+            <p:style>
+              <a:lnRef idx="2">
+                <a:schemeClr val="accent1">
+                  <a:shade val="50000"/>
+                </a:schemeClr>
+              </a:lnRef>
+              <a:fillRef idx="1">
+                <a:schemeClr val="accent1"/>
+              </a:fillRef>
+              <a:effectRef idx="0">
+                <a:schemeClr val="accent1"/>
+              </a:effectRef>
+              <a:fontRef idx="minor">
+                <a:schemeClr val="lt1"/>
+              </a:fontRef>
+            </p:style>
+            <p:txBody>
+              <a:bodyPr rot="0" spcFirstLastPara="0" vertOverflow="overflow" horzOverflow="overflow" vert="horz" wrap="square" lIns="91440" tIns="45720" rIns="91440" bIns="45720" numCol="1" spcCol="0" rtlCol="0" fromWordArt="0" anchor="ctr" anchorCtr="0" forceAA="0" compatLnSpc="1">
+                <a:prstTxWarp prst="textNoShape">
+                  <a:avLst/>
+                </a:prstTxWarp>
+                <a:noAutofit/>
+              </a:bodyPr>
+              <a:lstStyle/>
+              <a:p>
+                <a:pPr algn="ctr"/>
+                <a:endParaRPr lang="en-US"/>
+              </a:p>
+            </p:txBody>
+          </p:sp>
+          <p:sp>
+            <p:nvSpPr>
+              <p:cNvPr id="47" name="TextBox 46"/>
+              <p:cNvSpPr txBox="1"/>
+              <p:nvPr/>
+            </p:nvSpPr>
+            <p:spPr>
+              <a:xfrm>
+                <a:off x="1006736" y="2806600"/>
+                <a:ext cx="1469845" cy="276999"/>
+              </a:xfrm>
+              <a:prstGeom prst="rect">
+                <a:avLst/>
+              </a:prstGeom>
+              <a:noFill/>
+            </p:spPr>
+            <p:txBody>
+              <a:bodyPr wrap="square" rtlCol="0">
+                <a:spAutoFit/>
+              </a:bodyPr>
+              <a:lstStyle/>
+              <a:p>
+                <a:pPr algn="r"/>
+                <a:r>
+                  <a:rPr lang="en-US" sz="1200" dirty="0" err="1" smtClean="0"/>
+                  <a:t>Two_bumper_msg</a:t>
+                </a:r>
+                <a:endParaRPr lang="en-US" sz="1200" dirty="0" smtClean="0"/>
+              </a:p>
+            </p:txBody>
+          </p:sp>
+          <p:sp>
+            <p:nvSpPr>
+              <p:cNvPr id="48" name="TextBox 47"/>
+              <p:cNvSpPr txBox="1"/>
+              <p:nvPr/>
+            </p:nvSpPr>
+            <p:spPr>
+              <a:xfrm>
+                <a:off x="926709" y="3130118"/>
+                <a:ext cx="1392920" cy="261610"/>
+              </a:xfrm>
+              <a:prstGeom prst="rect">
+                <a:avLst/>
+              </a:prstGeom>
+              <a:noFill/>
+            </p:spPr>
+            <p:txBody>
+              <a:bodyPr wrap="square" rtlCol="0">
+                <a:spAutoFit/>
+              </a:bodyPr>
+              <a:lstStyle/>
+              <a:p>
+                <a:r>
+                  <a:rPr lang="en-US" sz="1100" i="1" dirty="0" smtClean="0"/>
+                  <a:t>gw::Bumper* x2</a:t>
+                </a:r>
+              </a:p>
+            </p:txBody>
+          </p:sp>
+        </p:grpSp>
+      </p:grpSp>
+      <p:grpSp>
+        <p:nvGrpSpPr>
+          <p:cNvPr id="14" name="Group 13"/>
+          <p:cNvGrpSpPr/>
+          <p:nvPr/>
+        </p:nvGrpSpPr>
+        <p:grpSpPr>
+          <a:xfrm>
+            <a:off x="2429521" y="2310585"/>
+            <a:ext cx="1144322" cy="1307415"/>
+            <a:chOff x="2437078" y="2310585"/>
+            <a:chExt cx="1144322" cy="1307415"/>
+          </a:xfrm>
+        </p:grpSpPr>
+        <p:cxnSp>
+          <p:nvCxnSpPr>
+            <p:cNvPr id="4" name="Straight Connector 3"/>
+            <p:cNvCxnSpPr/>
+            <p:nvPr/>
+          </p:nvCxnSpPr>
+          <p:spPr>
+            <a:xfrm>
+              <a:off x="2437078" y="2310585"/>
+              <a:ext cx="519608" cy="0"/>
+            </a:xfrm>
+            <a:prstGeom prst="line">
+              <a:avLst/>
+            </a:prstGeom>
+          </p:spPr>
+          <p:style>
+            <a:lnRef idx="1">
+              <a:schemeClr val="accent1"/>
+            </a:lnRef>
+            <a:fillRef idx="0">
+              <a:schemeClr val="accent1"/>
+            </a:fillRef>
+            <a:effectRef idx="0">
+              <a:schemeClr val="accent1"/>
+            </a:effectRef>
+            <a:fontRef idx="minor">
+              <a:schemeClr val="tx1"/>
+            </a:fontRef>
+          </p:style>
+        </p:cxnSp>
+        <p:cxnSp>
+          <p:nvCxnSpPr>
+            <p:cNvPr id="10" name="Straight Connector 9"/>
+            <p:cNvCxnSpPr/>
+            <p:nvPr/>
+          </p:nvCxnSpPr>
+          <p:spPr>
+            <a:xfrm>
+              <a:off x="2956686" y="2310585"/>
+              <a:ext cx="0" cy="1307415"/>
+            </a:xfrm>
+            <a:prstGeom prst="line">
+              <a:avLst/>
+            </a:prstGeom>
+          </p:spPr>
+          <p:style>
+            <a:lnRef idx="1">
+              <a:schemeClr val="accent1"/>
+            </a:lnRef>
+            <a:fillRef idx="0">
+              <a:schemeClr val="accent1"/>
+            </a:fillRef>
+            <a:effectRef idx="0">
+              <a:schemeClr val="accent1"/>
+            </a:effectRef>
+            <a:fontRef idx="minor">
+              <a:schemeClr val="tx1"/>
+            </a:fontRef>
+          </p:style>
+        </p:cxnSp>
+        <p:cxnSp>
+          <p:nvCxnSpPr>
+            <p:cNvPr id="12" name="Straight Arrow Connector 11"/>
+            <p:cNvCxnSpPr/>
+            <p:nvPr/>
+          </p:nvCxnSpPr>
+          <p:spPr>
+            <a:xfrm>
+              <a:off x="2956686" y="3618000"/>
+              <a:ext cx="624714" cy="0"/>
+            </a:xfrm>
+            <a:prstGeom prst="straightConnector1">
+              <a:avLst/>
+            </a:prstGeom>
+            <a:ln>
+              <a:tailEnd type="arrow"/>
+            </a:ln>
+          </p:spPr>
+          <p:style>
+            <a:lnRef idx="1">
+              <a:schemeClr val="accent1"/>
+            </a:lnRef>
+            <a:fillRef idx="0">
+              <a:schemeClr val="accent1"/>
+            </a:fillRef>
+            <a:effectRef idx="0">
+              <a:schemeClr val="accent1"/>
+            </a:effectRef>
+            <a:fontRef idx="minor">
+              <a:schemeClr val="tx1"/>
+            </a:fontRef>
+          </p:style>
+        </p:cxnSp>
+      </p:grpSp>
+    </p:spTree>
+    <p:extLst>
+      <p:ext uri="{BB962C8B-B14F-4D97-AF65-F5344CB8AC3E}">
+        <p14:creationId xmlns:p14="http://schemas.microsoft.com/office/powerpoint/2010/main" val="2156422956"/>
       </p:ext>
     </p:extLst>
   </p:cSld>

</xml_diff>

<commit_message>
Functioning SBL loaded on Alfred!!!
  - BIG NOTE: I had to decrease the buffer sized in wire.h,
    twi.h and hardwareSerial.h in order for there to be enough
    memory to load.
</commit_message>
<xml_diff>
--- a/System_diagrams.pptx
+++ b/System_diagrams.pptx
@@ -4795,9 +4795,9 @@
         <p:grpSpPr>
           <a:xfrm>
             <a:off x="3584240" y="2600379"/>
-            <a:ext cx="1646136" cy="1277619"/>
+            <a:ext cx="1608067" cy="1277619"/>
             <a:chOff x="3584240" y="2600379"/>
-            <a:chExt cx="1646136" cy="1277619"/>
+            <a:chExt cx="1608067" cy="1277619"/>
           </a:xfrm>
         </p:grpSpPr>
         <p:sp>
@@ -4839,9 +4839,9 @@
           <p:grpSpPr>
             <a:xfrm>
               <a:off x="3584240" y="2600379"/>
-              <a:ext cx="1646136" cy="1277619"/>
+              <a:ext cx="1608067" cy="1277619"/>
               <a:chOff x="3584240" y="2600379"/>
-              <a:chExt cx="1646136" cy="1277619"/>
+              <a:chExt cx="1608067" cy="1277619"/>
             </a:xfrm>
           </p:grpSpPr>
           <p:sp>
@@ -4898,7 +4898,7 @@
             </p:nvSpPr>
             <p:spPr>
               <a:xfrm>
-                <a:off x="3809654" y="2791265"/>
+                <a:off x="3771585" y="2806379"/>
                 <a:ext cx="1420722" cy="276999"/>
               </a:xfrm>
               <a:prstGeom prst="rect">
@@ -4987,9 +4987,9 @@
         <p:grpSpPr>
           <a:xfrm>
             <a:off x="838200" y="2608582"/>
-            <a:ext cx="1638381" cy="1277618"/>
+            <a:ext cx="1630824" cy="1277618"/>
             <a:chOff x="838200" y="2615714"/>
-            <a:chExt cx="1638381" cy="1277618"/>
+            <a:chExt cx="1630824" cy="1277618"/>
           </a:xfrm>
         </p:grpSpPr>
         <p:sp>
@@ -5031,9 +5031,9 @@
           <p:grpSpPr>
             <a:xfrm>
               <a:off x="838200" y="2615714"/>
-              <a:ext cx="1638381" cy="1277618"/>
+              <a:ext cx="1630824" cy="1277618"/>
               <a:chOff x="838200" y="2615714"/>
-              <a:chExt cx="1638381" cy="1277618"/>
+              <a:chExt cx="1630824" cy="1277618"/>
             </a:xfrm>
           </p:grpSpPr>
           <p:sp>
@@ -5090,7 +5090,7 @@
             </p:nvSpPr>
             <p:spPr>
               <a:xfrm>
-                <a:off x="1006736" y="2806600"/>
+                <a:off x="999179" y="2806600"/>
                 <a:ext cx="1469845" cy="276999"/>
               </a:xfrm>
               <a:prstGeom prst="rect">
@@ -5135,9 +5135,18 @@
               <a:lstStyle/>
               <a:p>
                 <a:r>
+                  <a:rPr lang="en-US" sz="1100" i="1" dirty="0" err="1" smtClean="0"/>
+                  <a:t>Servo.h</a:t>
+                </a:r>
+                <a:r>
                   <a:rPr lang="en-US" sz="1100" i="1" dirty="0" smtClean="0"/>
-                  <a:t>Servo.h x2</a:t>
+                  <a:t> </a:t>
                 </a:r>
+                <a:r>
+                  <a:rPr lang="en-US" sz="1100" i="1" dirty="0" smtClean="0"/>
+                  <a:t>x 1</a:t>
+                </a:r>
+                <a:endParaRPr lang="en-US" sz="1100" i="1" dirty="0" smtClean="0"/>
               </a:p>
               <a:p>
                 <a:r>
@@ -5708,9 +5717,18 @@
               <a:lstStyle/>
               <a:p>
                 <a:r>
+                  <a:rPr lang="en-US" sz="1100" i="1" dirty="0" err="1" smtClean="0"/>
+                  <a:t>Servo.h</a:t>
+                </a:r>
+                <a:r>
                   <a:rPr lang="en-US" sz="1100" i="1" dirty="0" smtClean="0"/>
-                  <a:t>Servo.h x2</a:t>
+                  <a:t> </a:t>
                 </a:r>
+                <a:r>
+                  <a:rPr lang="en-US" sz="1100" i="1" dirty="0" smtClean="0"/>
+                  <a:t>x 1</a:t>
+                </a:r>
+                <a:endParaRPr lang="en-US" sz="1100" i="1" dirty="0" smtClean="0"/>
               </a:p>
               <a:p>
                 <a:r>
@@ -5988,18 +6006,7 @@
                 </a:solidFill>
                 <a:latin typeface="Cooper Black" panose="0208090404030B020404" pitchFamily="18" charset="0"/>
               </a:rPr>
-              <a:t>Light_whisker</a:t>
-            </a:r>
-            <a:r>
-              <a:rPr lang="en-US" sz="2400" dirty="0" err="1" smtClean="0">
-                <a:solidFill>
-                  <a:schemeClr val="bg2">
-                    <a:lumMod val="50000"/>
-                  </a:schemeClr>
-                </a:solidFill>
-                <a:latin typeface="Cooper Black" panose="0208090404030B020404" pitchFamily="18" charset="0"/>
-              </a:rPr>
-              <a:t>_bot.ino</a:t>
+              <a:t>Light_whisker_bot.ino</a:t>
             </a:r>
             <a:endParaRPr lang="en-US" sz="2400" dirty="0" smtClean="0">
               <a:solidFill>
@@ -6053,7 +6060,6 @@
                 <a:rPr lang="en-US" sz="1200" b="1" dirty="0" smtClean="0"/>
                 <a:t>Whisker_controller</a:t>
               </a:r>
-              <a:endParaRPr lang="en-US" sz="1200" b="1" dirty="0" smtClean="0"/>
             </a:p>
           </p:txBody>
         </p:sp>
@@ -6457,18 +6463,14 @@
             </a:r>
             <a:r>
               <a:rPr lang="en-US" dirty="0" smtClean="0"/>
-              <a:t>Scan, Bump and </a:t>
-            </a:r>
-            <a:r>
-              <a:rPr lang="en-US" dirty="0" smtClean="0"/>
-              <a:t>Wander</a:t>
+              <a:t>Scanner, Bumpers</a:t>
             </a:r>
             <a:br>
               <a:rPr lang="en-US" dirty="0" smtClean="0"/>
             </a:br>
             <a:r>
               <a:rPr lang="en-US" dirty="0" smtClean="0"/>
-              <a:t>with Lights</a:t>
+              <a:t>and Lights</a:t>
             </a:r>
             <a:endParaRPr lang="en-US" dirty="0"/>
           </a:p>
@@ -6687,9 +6689,18 @@
               <a:lstStyle/>
               <a:p>
                 <a:r>
+                  <a:rPr lang="en-US" sz="1100" i="1" dirty="0" err="1" smtClean="0"/>
+                  <a:t>Servo.h</a:t>
+                </a:r>
+                <a:r>
                   <a:rPr lang="en-US" sz="1100" i="1" dirty="0" smtClean="0"/>
-                  <a:t>Servo.h x2</a:t>
+                  <a:t> </a:t>
                 </a:r>
+                <a:r>
+                  <a:rPr lang="en-US" sz="1100" i="1" dirty="0" smtClean="0"/>
+                  <a:t>x1</a:t>
+                </a:r>
+                <a:endParaRPr lang="en-US" sz="1100" i="1" dirty="0" smtClean="0"/>
               </a:p>
               <a:p>
                 <a:r>
@@ -6967,18 +6978,7 @@
                 </a:solidFill>
                 <a:latin typeface="Cooper Black" panose="0208090404030B020404" pitchFamily="18" charset="0"/>
               </a:rPr>
-              <a:t>SBW</a:t>
-            </a:r>
-            <a:r>
-              <a:rPr lang="en-US" sz="2400" dirty="0" err="1" smtClean="0">
-                <a:solidFill>
-                  <a:schemeClr val="bg2">
-                    <a:lumMod val="50000"/>
-                  </a:schemeClr>
-                </a:solidFill>
-                <a:latin typeface="Cooper Black" panose="0208090404030B020404" pitchFamily="18" charset="0"/>
-              </a:rPr>
-              <a:t>_bot.ino</a:t>
+              <a:t>Sbl_bot.ino</a:t>
             </a:r>
             <a:endParaRPr lang="en-US" sz="2400" dirty="0" smtClean="0">
               <a:solidFill>
@@ -7032,7 +7032,6 @@
                 <a:rPr lang="en-US" sz="1200" b="1" dirty="0" smtClean="0"/>
                 <a:t>Whisker_controller</a:t>
               </a:r>
-              <a:endParaRPr lang="en-US" sz="1200" b="1" dirty="0" smtClean="0"/>
             </a:p>
           </p:txBody>
         </p:sp>

</xml_diff>